<commit_message>
Updates to poster (2)
Finished first column, minus Sergio info needed
</commit_message>
<xml_diff>
--- a/POSTER.pptx
+++ b/POSTER.pptx
@@ -125,7 +125,7 @@
   </p:defaultTextStyle>
   <p:extLst>
     <p:ext uri="{EFAFB233-063F-42B5-8137-9DF3F51BA10A}">
-      <p15:sldGuideLst xmlns:p15="http://schemas.microsoft.com/office/powerpoint/2012/main" xmlns="">
+      <p15:sldGuideLst xmlns="" xmlns:p15="http://schemas.microsoft.com/office/powerpoint/2012/main">
         <p15:guide id="1" orient="horz" pos="9216">
           <p15:clr>
             <a:srgbClr val="A4A3A4"/>
@@ -394,7 +394,7 @@
     </p:spTree>
     <p:extLst>
       <p:ext uri="{BB962C8B-B14F-4D97-AF65-F5344CB8AC3E}">
-        <p14:creationId xmlns:p14="http://schemas.microsoft.com/office/powerpoint/2010/main" xmlns="" val="2325757360"/>
+        <p14:creationId xmlns="" xmlns:p14="http://schemas.microsoft.com/office/powerpoint/2010/main" val="2325757360"/>
       </p:ext>
     </p:extLst>
   </p:cSld>
@@ -569,7 +569,7 @@
     </p:spTree>
     <p:extLst>
       <p:ext uri="{BB962C8B-B14F-4D97-AF65-F5344CB8AC3E}">
-        <p14:creationId xmlns:p14="http://schemas.microsoft.com/office/powerpoint/2010/main" xmlns="" val="1271015422"/>
+        <p14:creationId xmlns="" xmlns:p14="http://schemas.microsoft.com/office/powerpoint/2010/main" val="1271015422"/>
       </p:ext>
     </p:extLst>
   </p:cSld>
@@ -3581,10 +3581,16 @@
           <a:p>
             <a:pPr algn="ctr"/>
             <a:r>
-              <a:rPr lang="en-US" dirty="0" smtClean="0"/>
+              <a:rPr lang="en-US" dirty="0" smtClean="0">
+                <a:latin typeface="+mj-lt"/>
+                <a:cs typeface="Times New Roman" pitchFamily="18" charset="0"/>
+              </a:rPr>
               <a:t>S</a:t>
             </a:r>
-            <a:endParaRPr lang="en-US" dirty="0"/>
+            <a:endParaRPr lang="en-US" dirty="0">
+              <a:latin typeface="+mj-lt"/>
+              <a:cs typeface="Times New Roman" pitchFamily="18" charset="0"/>
+            </a:endParaRPr>
           </a:p>
         </p:txBody>
       </p:sp>
@@ -3640,7 +3646,8 @@
                 <a:solidFill>
                   <a:srgbClr val="F8F8F8"/>
                 </a:solidFill>
-                <a:latin typeface="Verdana" pitchFamily="34" charset="0"/>
+                <a:latin typeface="+mj-lt"/>
+                <a:cs typeface="Times New Roman" pitchFamily="18" charset="0"/>
               </a:rPr>
               <a:t>Goals</a:t>
             </a:r>
@@ -3648,7 +3655,8 @@
               <a:solidFill>
                 <a:srgbClr val="F8F8F8"/>
               </a:solidFill>
-              <a:latin typeface="Verdana" pitchFamily="34" charset="0"/>
+              <a:latin typeface="+mj-lt"/>
+              <a:cs typeface="Times New Roman" pitchFamily="18" charset="0"/>
             </a:endParaRPr>
           </a:p>
         </p:txBody>
@@ -3705,15 +3713,17 @@
                 <a:solidFill>
                   <a:srgbClr val="F8F8F8"/>
                 </a:solidFill>
-                <a:latin typeface="Verdana" pitchFamily="34" charset="0"/>
+                <a:latin typeface="+mj-lt"/>
+                <a:cs typeface="Times New Roman" pitchFamily="18" charset="0"/>
               </a:rPr>
-              <a:t>Preliminary Results</a:t>
+              <a:t>Results</a:t>
             </a:r>
             <a:endParaRPr lang="en-US" sz="3600" b="1" dirty="0">
               <a:solidFill>
                 <a:srgbClr val="F8F8F8"/>
               </a:solidFill>
-              <a:latin typeface="Verdana" pitchFamily="34" charset="0"/>
+              <a:latin typeface="+mj-lt"/>
+              <a:cs typeface="Times New Roman" pitchFamily="18" charset="0"/>
             </a:endParaRPr>
           </a:p>
         </p:txBody>
@@ -3759,7 +3769,10 @@
           <a:lstStyle/>
           <a:p>
             <a:pPr algn="ctr"/>
-            <a:endParaRPr lang="en-US" dirty="0"/>
+            <a:endParaRPr lang="en-US" dirty="0">
+              <a:latin typeface="+mj-lt"/>
+              <a:cs typeface="Times New Roman" pitchFamily="18" charset="0"/>
+            </a:endParaRPr>
           </a:p>
         </p:txBody>
       </p:sp>
@@ -3810,7 +3823,10 @@
           <a:lstStyle/>
           <a:p>
             <a:pPr algn="ctr"/>
-            <a:endParaRPr lang="en-US" dirty="0"/>
+            <a:endParaRPr lang="en-US" dirty="0">
+              <a:latin typeface="+mj-lt"/>
+              <a:cs typeface="Times New Roman" pitchFamily="18" charset="0"/>
+            </a:endParaRPr>
           </a:p>
         </p:txBody>
       </p:sp>
@@ -3870,7 +3886,8 @@
                     </a:srgbClr>
                   </a:outerShdw>
                 </a:effectLst>
-                <a:latin typeface="Verdana" pitchFamily="34" charset="0"/>
+                <a:latin typeface="+mj-lt"/>
+                <a:cs typeface="Times New Roman" pitchFamily="18" charset="0"/>
               </a:rPr>
               <a:t>Methods for Increasing Classification Accuracy in Small Datasets</a:t>
             </a:r>
@@ -3881,7 +3898,8 @@
               <a:solidFill>
                 <a:schemeClr val="bg1"/>
               </a:solidFill>
-              <a:latin typeface="Verdana" pitchFamily="34" charset="0"/>
+              <a:latin typeface="+mj-lt"/>
+              <a:cs typeface="Times New Roman" pitchFamily="18" charset="0"/>
             </a:endParaRPr>
           </a:p>
           <a:p>
@@ -3891,7 +3909,8 @@
                 <a:solidFill>
                   <a:schemeClr val="bg1"/>
                 </a:solidFill>
-                <a:latin typeface="Verdana" pitchFamily="34" charset="0"/>
+                <a:latin typeface="+mj-lt"/>
+                <a:cs typeface="Times New Roman" pitchFamily="18" charset="0"/>
               </a:rPr>
               <a:t>Sergio García-Vergara</a:t>
             </a:r>
@@ -3900,9 +3919,9 @@
                 <a:solidFill>
                   <a:schemeClr val="bg1"/>
                 </a:solidFill>
-                <a:latin typeface="Verdana" pitchFamily="34" charset="0"/>
+                <a:latin typeface="+mj-lt"/>
                 <a:ea typeface="Verdana" pitchFamily="34" charset="0"/>
-                <a:cs typeface="Verdana" pitchFamily="34" charset="0"/>
+                <a:cs typeface="Times New Roman" pitchFamily="18" charset="0"/>
               </a:rPr>
               <a:t>¹, Stephanie Gillespie</a:t>
             </a:r>
@@ -3911,9 +3930,9 @@
                 <a:solidFill>
                   <a:schemeClr val="bg1"/>
                 </a:solidFill>
-                <a:latin typeface="Verdana" pitchFamily="34" charset="0"/>
+                <a:latin typeface="+mj-lt"/>
                 <a:ea typeface="Verdana" pitchFamily="34" charset="0"/>
-                <a:cs typeface="Verdana" pitchFamily="34" charset="0"/>
+                <a:cs typeface="Times New Roman" pitchFamily="18" charset="0"/>
               </a:rPr>
               <a:t>¹</a:t>
             </a:r>
@@ -3922,9 +3941,9 @@
                 <a:solidFill>
                   <a:schemeClr val="bg1"/>
                 </a:solidFill>
-                <a:latin typeface="Verdana" pitchFamily="34" charset="0"/>
+                <a:latin typeface="+mj-lt"/>
                 <a:ea typeface="Verdana" pitchFamily="34" charset="0"/>
-                <a:cs typeface="Verdana" pitchFamily="34" charset="0"/>
+                <a:cs typeface="Times New Roman" pitchFamily="18" charset="0"/>
               </a:rPr>
               <a:t>, </a:t>
             </a:r>
@@ -3933,9 +3952,9 @@
                 <a:solidFill>
                   <a:schemeClr val="bg1"/>
                 </a:solidFill>
-                <a:latin typeface="Verdana" pitchFamily="34" charset="0"/>
+                <a:latin typeface="+mj-lt"/>
                 <a:ea typeface="Verdana" pitchFamily="34" charset="0"/>
-                <a:cs typeface="Verdana" pitchFamily="34" charset="0"/>
+                <a:cs typeface="Times New Roman" pitchFamily="18" charset="0"/>
               </a:rPr>
               <a:t>Oludotun</a:t>
             </a:r>
@@ -3944,9 +3963,9 @@
                 <a:solidFill>
                   <a:schemeClr val="bg1"/>
                 </a:solidFill>
-                <a:latin typeface="Verdana" pitchFamily="34" charset="0"/>
+                <a:latin typeface="+mj-lt"/>
                 <a:ea typeface="Verdana" pitchFamily="34" charset="0"/>
-                <a:cs typeface="Verdana" pitchFamily="34" charset="0"/>
+                <a:cs typeface="Times New Roman" pitchFamily="18" charset="0"/>
               </a:rPr>
               <a:t> Ode¹, and Matthew Rice</a:t>
             </a:r>
@@ -3955,9 +3974,9 @@
                 <a:solidFill>
                   <a:schemeClr val="bg1"/>
                 </a:solidFill>
-                <a:latin typeface="Verdana" pitchFamily="34" charset="0"/>
+                <a:latin typeface="+mj-lt"/>
                 <a:ea typeface="Verdana" pitchFamily="34" charset="0"/>
-                <a:cs typeface="Verdana" pitchFamily="34" charset="0"/>
+                <a:cs typeface="Times New Roman" pitchFamily="18" charset="0"/>
               </a:rPr>
               <a:t>¹</a:t>
             </a:r>
@@ -3965,9 +3984,9 @@
               <a:solidFill>
                 <a:schemeClr val="bg1"/>
               </a:solidFill>
-              <a:latin typeface="Verdana" pitchFamily="34" charset="0"/>
+              <a:latin typeface="+mj-lt"/>
               <a:ea typeface="Verdana" pitchFamily="34" charset="0"/>
-              <a:cs typeface="Verdana" pitchFamily="34" charset="0"/>
+              <a:cs typeface="Times New Roman" pitchFamily="18" charset="0"/>
             </a:endParaRPr>
           </a:p>
           <a:p>
@@ -3977,9 +3996,9 @@
                 <a:solidFill>
                   <a:schemeClr val="bg1"/>
                 </a:solidFill>
-                <a:latin typeface="Verdana" pitchFamily="34" charset="0"/>
+                <a:latin typeface="+mj-lt"/>
                 <a:ea typeface="Verdana" pitchFamily="34" charset="0"/>
-                <a:cs typeface="Verdana" pitchFamily="34" charset="0"/>
+                <a:cs typeface="Times New Roman" pitchFamily="18" charset="0"/>
               </a:rPr>
               <a:t>¹</a:t>
             </a:r>
@@ -3988,23 +4007,27 @@
                 <a:solidFill>
                   <a:schemeClr val="bg1"/>
                 </a:solidFill>
-                <a:latin typeface="Verdana" pitchFamily="34" charset="0"/>
+                <a:latin typeface="+mj-lt"/>
+                <a:cs typeface="Times New Roman" pitchFamily="18" charset="0"/>
               </a:rPr>
               <a:t>School of Electrical and Computer Engineering, Georgia Institute of Technology</a:t>
             </a:r>
             <a:r>
               <a:rPr lang="en-US" sz="4000" b="1" dirty="0">
-                <a:latin typeface="Arial" charset="0"/>
+                <a:latin typeface="+mj-lt"/>
+                <a:cs typeface="Times New Roman" pitchFamily="18" charset="0"/>
               </a:rPr>
               <a:t/>
             </a:r>
             <a:br>
               <a:rPr lang="en-US" sz="4000" b="1" dirty="0">
-                <a:latin typeface="Arial" charset="0"/>
+                <a:latin typeface="+mj-lt"/>
+                <a:cs typeface="Times New Roman" pitchFamily="18" charset="0"/>
               </a:rPr>
             </a:br>
             <a:endParaRPr lang="en-US" sz="4000" b="1" dirty="0">
-              <a:latin typeface="Arial" charset="0"/>
+              <a:latin typeface="+mj-lt"/>
+              <a:cs typeface="Times New Roman" pitchFamily="18" charset="0"/>
             </a:endParaRPr>
           </a:p>
         </p:txBody>
@@ -4050,7 +4073,10 @@
           <a:lstStyle/>
           <a:p>
             <a:pPr algn="ctr"/>
-            <a:endParaRPr lang="en-US"/>
+            <a:endParaRPr lang="en-US">
+              <a:latin typeface="+mj-lt"/>
+              <a:cs typeface="Times New Roman" pitchFamily="18" charset="0"/>
+            </a:endParaRPr>
           </a:p>
         </p:txBody>
       </p:sp>
@@ -4106,7 +4132,8 @@
                 <a:solidFill>
                   <a:srgbClr val="F8F8F8"/>
                 </a:solidFill>
-                <a:latin typeface="Verdana" pitchFamily="34" charset="0"/>
+                <a:latin typeface="+mj-lt"/>
+                <a:cs typeface="Times New Roman" pitchFamily="18" charset="0"/>
               </a:rPr>
               <a:t>Background</a:t>
             </a:r>
@@ -4114,7 +4141,8 @@
               <a:solidFill>
                 <a:srgbClr val="F8F8F8"/>
               </a:solidFill>
-              <a:latin typeface="Verdana" pitchFamily="34" charset="0"/>
+              <a:latin typeface="+mj-lt"/>
+              <a:cs typeface="Times New Roman" pitchFamily="18" charset="0"/>
             </a:endParaRPr>
           </a:p>
         </p:txBody>
@@ -4171,7 +4199,8 @@
                 <a:solidFill>
                   <a:srgbClr val="F8F8F8"/>
                 </a:solidFill>
-                <a:latin typeface="Verdana" pitchFamily="34" charset="0"/>
+                <a:latin typeface="+mj-lt"/>
+                <a:cs typeface="Times New Roman" pitchFamily="18" charset="0"/>
               </a:rPr>
               <a:t>Methods Explored</a:t>
             </a:r>
@@ -4179,7 +4208,8 @@
               <a:solidFill>
                 <a:srgbClr val="F8F8F8"/>
               </a:solidFill>
-              <a:latin typeface="Verdana" pitchFamily="34" charset="0"/>
+              <a:latin typeface="+mj-lt"/>
+              <a:cs typeface="Times New Roman" pitchFamily="18" charset="0"/>
             </a:endParaRPr>
           </a:p>
         </p:txBody>
@@ -4195,7 +4225,7 @@
         <p:spPr bwMode="auto">
           <a:xfrm>
             <a:off x="622459" y="14305568"/>
-            <a:ext cx="12477942" cy="632970"/>
+            <a:ext cx="12477942" cy="1463966"/>
           </a:xfrm>
           <a:prstGeom prst="rect">
             <a:avLst/>
@@ -4236,15 +4266,24 @@
                 <a:solidFill>
                   <a:srgbClr val="F8F8F8"/>
                 </a:solidFill>
-                <a:latin typeface="Verdana" pitchFamily="34" charset="0"/>
+                <a:latin typeface="+mj-lt"/>
+                <a:cs typeface="Times New Roman" pitchFamily="18" charset="0"/>
               </a:rPr>
-              <a:t>Our</a:t>
-            </a:r>
+              <a:t>Our Dataset</a:t>
+            </a:r>
+          </a:p>
+          <a:p>
+            <a:pPr algn="ctr" eaLnBrk="0" hangingPunct="0">
+              <a:spcBef>
+                <a:spcPct val="50000"/>
+              </a:spcBef>
+            </a:pPr>
             <a:endParaRPr lang="en-US" sz="3600" b="1" dirty="0">
               <a:solidFill>
                 <a:srgbClr val="F8F8F8"/>
               </a:solidFill>
-              <a:latin typeface="Verdana" pitchFamily="34" charset="0"/>
+              <a:latin typeface="+mj-lt"/>
+              <a:cs typeface="Times New Roman" pitchFamily="18" charset="0"/>
             </a:endParaRPr>
           </a:p>
         </p:txBody>
@@ -4301,24 +4340,17 @@
                 <a:solidFill>
                   <a:srgbClr val="F8F8F8"/>
                 </a:solidFill>
-                <a:latin typeface="Verdana" pitchFamily="34" charset="0"/>
+                <a:latin typeface="+mj-lt"/>
+                <a:cs typeface="Times New Roman" pitchFamily="18" charset="0"/>
               </a:rPr>
-              <a:t>Conclusions and </a:t>
-            </a:r>
-            <a:r>
-              <a:rPr lang="en-US" sz="4000" b="1" dirty="0" smtClean="0">
-                <a:solidFill>
-                  <a:srgbClr val="F8F8F8"/>
-                </a:solidFill>
-                <a:latin typeface="Verdana" pitchFamily="34" charset="0"/>
-              </a:rPr>
-              <a:t>Remaining Work</a:t>
+              <a:t>Conclusions and Remaining Work</a:t>
             </a:r>
             <a:endParaRPr lang="en-US" sz="4000" b="1" dirty="0">
               <a:solidFill>
                 <a:srgbClr val="F8F8F8"/>
               </a:solidFill>
-              <a:latin typeface="Verdana" pitchFamily="34" charset="0"/>
+              <a:latin typeface="+mj-lt"/>
+              <a:cs typeface="Times New Roman" pitchFamily="18" charset="0"/>
             </a:endParaRPr>
           </a:p>
         </p:txBody>
@@ -4364,7 +4396,10 @@
           <a:lstStyle/>
           <a:p>
             <a:pPr algn="ctr"/>
-            <a:endParaRPr lang="en-US"/>
+            <a:endParaRPr lang="en-US">
+              <a:latin typeface="+mj-lt"/>
+              <a:cs typeface="Times New Roman" pitchFamily="18" charset="0"/>
+            </a:endParaRPr>
           </a:p>
         </p:txBody>
       </p:sp>
@@ -4409,7 +4444,10 @@
           <a:lstStyle/>
           <a:p>
             <a:pPr algn="ctr"/>
-            <a:endParaRPr lang="en-US" dirty="0"/>
+            <a:endParaRPr lang="en-US" dirty="0">
+              <a:latin typeface="+mj-lt"/>
+              <a:cs typeface="Times New Roman" pitchFamily="18" charset="0"/>
+            </a:endParaRPr>
           </a:p>
         </p:txBody>
       </p:sp>
@@ -4455,10 +4493,16 @@
           <a:p>
             <a:pPr algn="ctr"/>
             <a:r>
-              <a:rPr lang="en-US" dirty="0" smtClean="0"/>
+              <a:rPr lang="en-US" dirty="0" smtClean="0">
+                <a:latin typeface="+mj-lt"/>
+                <a:cs typeface="Times New Roman" pitchFamily="18" charset="0"/>
+              </a:rPr>
               <a:t>S</a:t>
             </a:r>
-            <a:endParaRPr lang="en-US" dirty="0"/>
+            <a:endParaRPr lang="en-US" dirty="0">
+              <a:latin typeface="+mj-lt"/>
+              <a:cs typeface="Times New Roman" pitchFamily="18" charset="0"/>
+            </a:endParaRPr>
           </a:p>
         </p:txBody>
       </p:sp>
@@ -4506,6 +4550,8 @@
               <a:solidFill>
                 <a:schemeClr val="tx1"/>
               </a:solidFill>
+              <a:latin typeface="+mj-lt"/>
+              <a:cs typeface="Times New Roman" pitchFamily="18" charset="0"/>
             </a:endParaRPr>
           </a:p>
         </p:txBody>
@@ -4518,8 +4564,8 @@
         </p:nvSpPr>
         <p:spPr>
           <a:xfrm>
-            <a:off x="692723" y="5350369"/>
-            <a:ext cx="12346320" cy="4524315"/>
+            <a:off x="692723" y="5350370"/>
+            <a:ext cx="12346320" cy="4031873"/>
           </a:xfrm>
           <a:prstGeom prst="rect">
             <a:avLst/>
@@ -4527,7 +4573,7 @@
           <a:noFill/>
         </p:spPr>
         <p:txBody>
-          <a:bodyPr wrap="square" rtlCol="0">
+          <a:bodyPr wrap="square" numCol="2" spcCol="914400" rtlCol="0">
             <a:spAutoFit/>
           </a:bodyPr>
           <a:lstStyle/>
@@ -4535,6 +4581,7 @@
             <a:pPr marL="457200" indent="-457200" algn="just"/>
             <a:r>
               <a:rPr lang="en-US" sz="3200" dirty="0" smtClean="0">
+                <a:latin typeface="+mj-lt"/>
                 <a:cs typeface="Times New Roman" pitchFamily="18" charset="0"/>
               </a:rPr>
               <a:t>Small data sets may arise due to: </a:t>
@@ -4547,9 +4594,23 @@
             </a:pPr>
             <a:r>
               <a:rPr lang="en-US" sz="3200" dirty="0" smtClean="0">
+                <a:latin typeface="+mj-lt"/>
                 <a:cs typeface="Times New Roman" pitchFamily="18" charset="0"/>
               </a:rPr>
               <a:t>Limited clinical trials</a:t>
+            </a:r>
+          </a:p>
+          <a:p>
+            <a:pPr marL="457200" indent="-457200">
+              <a:buFont typeface="Arial" pitchFamily="34" charset="0"/>
+              <a:buChar char="•"/>
+            </a:pPr>
+            <a:r>
+              <a:rPr lang="en-US" sz="3200" dirty="0" smtClean="0">
+                <a:latin typeface="+mj-lt"/>
+                <a:cs typeface="Times New Roman" pitchFamily="18" charset="0"/>
+              </a:rPr>
+              <a:t>Costly to collect data</a:t>
             </a:r>
           </a:p>
           <a:p>
@@ -4559,9 +4620,17 @@
             </a:pPr>
             <a:r>
               <a:rPr lang="en-US" sz="3200" dirty="0" smtClean="0">
+                <a:latin typeface="+mj-lt"/>
                 <a:cs typeface="Times New Roman" pitchFamily="18" charset="0"/>
               </a:rPr>
-              <a:t>Costly to collect data</a:t>
+              <a:t>Rare occurrence of events of </a:t>
+            </a:r>
+            <a:r>
+              <a:rPr lang="en-US" sz="3200" dirty="0" smtClean="0">
+                <a:latin typeface="+mj-lt"/>
+                <a:cs typeface="Times New Roman" pitchFamily="18" charset="0"/>
+              </a:rPr>
+              <a:t>interest</a:t>
             </a:r>
           </a:p>
           <a:p>
@@ -4571,10 +4640,15 @@
             </a:pPr>
             <a:r>
               <a:rPr lang="en-US" sz="3200" dirty="0" smtClean="0">
+                <a:latin typeface="+mj-lt"/>
                 <a:cs typeface="Times New Roman" pitchFamily="18" charset="0"/>
               </a:rPr>
-              <a:t>Rare occurrence of events of interest</a:t>
-            </a:r>
+              <a:t>Population diversity too great to capture</a:t>
+            </a:r>
+            <a:endParaRPr lang="en-US" sz="3200" dirty="0" smtClean="0">
+              <a:latin typeface="+mj-lt"/>
+              <a:cs typeface="Times New Roman" pitchFamily="18" charset="0"/>
+            </a:endParaRPr>
           </a:p>
           <a:p>
             <a:pPr marL="457200" indent="-457200" algn="just">
@@ -4582,27 +4656,90 @@
               <a:buChar char="•"/>
             </a:pPr>
             <a:endParaRPr lang="en-US" sz="3200" dirty="0" smtClean="0">
+              <a:latin typeface="+mj-lt"/>
               <a:cs typeface="Times New Roman" pitchFamily="18" charset="0"/>
             </a:endParaRPr>
           </a:p>
           <a:p>
-            <a:pPr marL="457200" indent="-457200" algn="just"/>
             <a:r>
               <a:rPr lang="en-US" sz="3200" dirty="0" smtClean="0">
+                <a:latin typeface="+mj-lt"/>
                 <a:cs typeface="Times New Roman" pitchFamily="18" charset="0"/>
               </a:rPr>
-              <a:t>Small data sets  may result in model over-fitting and the inability to classify new data that was not seen by the training algorithm</a:t>
-            </a:r>
+              <a:t>Small </a:t>
+            </a:r>
+            <a:r>
+              <a:rPr lang="en-US" sz="3200" dirty="0" smtClean="0">
+                <a:latin typeface="+mj-lt"/>
+                <a:cs typeface="Times New Roman" pitchFamily="18" charset="0"/>
+              </a:rPr>
+              <a:t>data sets  may result in model </a:t>
+            </a:r>
+            <a:r>
+              <a:rPr lang="en-US" sz="3200" dirty="0" smtClean="0">
+                <a:latin typeface="+mj-lt"/>
+                <a:cs typeface="Times New Roman" pitchFamily="18" charset="0"/>
+              </a:rPr>
+              <a:t>over-fitting, the </a:t>
+            </a:r>
+            <a:r>
+              <a:rPr lang="en-US" sz="3200" dirty="0" smtClean="0">
+                <a:latin typeface="+mj-lt"/>
+                <a:cs typeface="Times New Roman" pitchFamily="18" charset="0"/>
+              </a:rPr>
+              <a:t>inability </a:t>
+            </a:r>
+            <a:r>
+              <a:rPr lang="en-US" sz="3200" dirty="0" smtClean="0">
+                <a:latin typeface="+mj-lt"/>
+                <a:cs typeface="Times New Roman" pitchFamily="18" charset="0"/>
+              </a:rPr>
+              <a:t>to classify </a:t>
+            </a:r>
+            <a:r>
+              <a:rPr lang="en-US" sz="3200" dirty="0" smtClean="0">
+                <a:latin typeface="+mj-lt"/>
+                <a:cs typeface="Times New Roman" pitchFamily="18" charset="0"/>
+              </a:rPr>
+              <a:t>new data that was not </a:t>
+            </a:r>
+            <a:r>
+              <a:rPr lang="en-US" sz="3200" dirty="0" smtClean="0">
+                <a:latin typeface="+mj-lt"/>
+                <a:cs typeface="Times New Roman" pitchFamily="18" charset="0"/>
+              </a:rPr>
+              <a:t>similar to that seen in </a:t>
+            </a:r>
+            <a:r>
+              <a:rPr lang="en-US" sz="3200" dirty="0" smtClean="0">
+                <a:latin typeface="+mj-lt"/>
+                <a:cs typeface="Times New Roman" pitchFamily="18" charset="0"/>
+              </a:rPr>
+              <a:t>the training </a:t>
+            </a:r>
+            <a:r>
+              <a:rPr lang="en-US" sz="3200" dirty="0" smtClean="0">
+                <a:latin typeface="+mj-lt"/>
+                <a:cs typeface="Times New Roman" pitchFamily="18" charset="0"/>
+              </a:rPr>
+              <a:t>data, and poor reproducibility of results in the field.  </a:t>
+            </a:r>
+            <a:endParaRPr lang="en-US" sz="3200" dirty="0" smtClean="0">
+              <a:latin typeface="+mj-lt"/>
+              <a:cs typeface="Times New Roman" pitchFamily="18" charset="0"/>
+            </a:endParaRPr>
           </a:p>
           <a:p>
             <a:pPr marL="457200" indent="-457200" algn="just"/>
             <a:endParaRPr lang="en-US" sz="3200" dirty="0" smtClean="0">
+              <a:latin typeface="+mj-lt"/>
               <a:cs typeface="Times New Roman" pitchFamily="18" charset="0"/>
             </a:endParaRPr>
           </a:p>
           <a:p>
             <a:pPr marL="457200" indent="-457200" algn="just"/>
             <a:endParaRPr lang="en-US" sz="3200" dirty="0" smtClean="0">
+              <a:latin typeface="+mj-lt"/>
               <a:cs typeface="Times New Roman" pitchFamily="18" charset="0"/>
             </a:endParaRPr>
           </a:p>
@@ -4631,19 +4768,27 @@
           <a:lstStyle/>
           <a:p>
             <a:r>
-              <a:rPr lang="en-US" sz="3200" dirty="0" smtClean="0"/>
+              <a:rPr lang="en-US" sz="3200" dirty="0" smtClean="0">
+                <a:latin typeface="+mj-lt"/>
+                <a:cs typeface="Times New Roman" pitchFamily="18" charset="0"/>
+              </a:rPr>
               <a:t>Determine at what point a data set may be considered small</a:t>
             </a:r>
           </a:p>
           <a:p>
-            <a:endParaRPr lang="en-US" sz="3200" dirty="0" smtClean="0"/>
-          </a:p>
-          <a:p>
-            <a:r>
-              <a:rPr lang="en-US" sz="3200" dirty="0" smtClean="0"/>
+            <a:endParaRPr lang="en-US" sz="3200" dirty="0" smtClean="0">
+              <a:latin typeface="+mj-lt"/>
+              <a:cs typeface="Times New Roman" pitchFamily="18" charset="0"/>
+            </a:endParaRPr>
+          </a:p>
+          <a:p>
+            <a:r>
+              <a:rPr lang="en-US" sz="3200" dirty="0" smtClean="0">
+                <a:latin typeface="+mj-lt"/>
+                <a:cs typeface="Times New Roman" pitchFamily="18" charset="0"/>
+              </a:rPr>
               <a:t>Try different combinations of techniques to reduce over-fitting</a:t>
             </a:r>
-            <a:endParaRPr lang="en-US" sz="3200" dirty="0" smtClean="0"/>
           </a:p>
           <a:p>
             <a:pPr marL="457200" indent="-457200" algn="just">
@@ -4652,13 +4797,11 @@
             </a:pPr>
             <a:r>
               <a:rPr lang="en-US" sz="3200" dirty="0" smtClean="0">
+                <a:latin typeface="+mj-lt"/>
                 <a:cs typeface="Times New Roman" pitchFamily="18" charset="0"/>
               </a:rPr>
               <a:t>Data creation or modification</a:t>
             </a:r>
-            <a:endParaRPr lang="en-US" sz="3200" dirty="0" smtClean="0">
-              <a:cs typeface="Times New Roman" pitchFamily="18" charset="0"/>
-            </a:endParaRPr>
           </a:p>
           <a:p>
             <a:pPr marL="457200" indent="-457200" algn="just">
@@ -4667,6 +4810,7 @@
             </a:pPr>
             <a:r>
               <a:rPr lang="en-US" sz="3200" dirty="0" smtClean="0">
+                <a:latin typeface="+mj-lt"/>
                 <a:cs typeface="Times New Roman" pitchFamily="18" charset="0"/>
               </a:rPr>
               <a:t>Feature dimensionality and reduction</a:t>
@@ -4679,6 +4823,7 @@
             </a:pPr>
             <a:r>
               <a:rPr lang="en-US" sz="3200" dirty="0" smtClean="0">
+                <a:latin typeface="+mj-lt"/>
                 <a:cs typeface="Times New Roman" pitchFamily="18" charset="0"/>
               </a:rPr>
               <a:t>Model simplification</a:t>
@@ -4690,6 +4835,7 @@
               <a:buChar char="•"/>
             </a:pPr>
             <a:endParaRPr lang="en-US" sz="3200" dirty="0" smtClean="0">
+              <a:latin typeface="+mj-lt"/>
               <a:cs typeface="Times New Roman" pitchFamily="18" charset="0"/>
             </a:endParaRPr>
           </a:p>
@@ -4697,11 +4843,11 @@
             <a:pPr marL="457200" indent="-457200" algn="just"/>
             <a:r>
               <a:rPr lang="en-US" sz="3200" dirty="0" smtClean="0">
+                <a:latin typeface="+mj-lt"/>
                 <a:cs typeface="Times New Roman" pitchFamily="18" charset="0"/>
               </a:rPr>
               <a:t>Comment on changes to classification accuracy measures </a:t>
             </a:r>
-            <a:endParaRPr lang="en-US" sz="3200" dirty="0" smtClean="0"/>
           </a:p>
         </p:txBody>
       </p:sp>
@@ -4757,7 +4903,8 @@
                 <a:solidFill>
                   <a:srgbClr val="F8F8F8"/>
                 </a:solidFill>
-                <a:latin typeface="Verdana" pitchFamily="34" charset="0"/>
+                <a:latin typeface="+mj-lt"/>
+                <a:cs typeface="Times New Roman" pitchFamily="18" charset="0"/>
               </a:rPr>
               <a:t>What is Small?</a:t>
             </a:r>
@@ -4765,7 +4912,8 @@
               <a:solidFill>
                 <a:srgbClr val="F8F8F8"/>
               </a:solidFill>
-              <a:latin typeface="Verdana" pitchFamily="34" charset="0"/>
+              <a:latin typeface="+mj-lt"/>
+              <a:cs typeface="Times New Roman" pitchFamily="18" charset="0"/>
             </a:endParaRPr>
           </a:p>
         </p:txBody>
@@ -4812,10 +4960,16 @@
           <a:p>
             <a:pPr algn="ctr"/>
             <a:r>
-              <a:rPr lang="en-US" dirty="0" smtClean="0"/>
+              <a:rPr lang="en-US" dirty="0" smtClean="0">
+                <a:latin typeface="+mj-lt"/>
+                <a:cs typeface="Times New Roman" pitchFamily="18" charset="0"/>
+              </a:rPr>
               <a:t>S</a:t>
             </a:r>
-            <a:endParaRPr lang="en-US" dirty="0"/>
+            <a:endParaRPr lang="en-US" dirty="0">
+              <a:latin typeface="+mj-lt"/>
+              <a:cs typeface="Times New Roman" pitchFamily="18" charset="0"/>
+            </a:endParaRPr>
           </a:p>
         </p:txBody>
       </p:sp>
@@ -4842,41 +4996,137 @@
           <a:lstStyle/>
           <a:p>
             <a:r>
+              <a:rPr lang="en-US" sz="3200" dirty="0" smtClean="0">
+                <a:latin typeface="+mj-lt"/>
+                <a:cs typeface="Times New Roman" pitchFamily="18" charset="0"/>
+              </a:rPr>
+              <a:t>Data set chosen from those available on _______________________</a:t>
+            </a:r>
+          </a:p>
+          <a:p>
+            <a:endParaRPr lang="en-US" sz="3200" dirty="0" smtClean="0">
+              <a:latin typeface="+mj-lt"/>
+              <a:cs typeface="Times New Roman" pitchFamily="18" charset="0"/>
+            </a:endParaRPr>
+          </a:p>
+          <a:p>
+            <a:r>
+              <a:rPr lang="en-US" sz="3200" dirty="0" smtClean="0">
+                <a:latin typeface="+mj-lt"/>
+                <a:cs typeface="Times New Roman" pitchFamily="18" charset="0"/>
+              </a:rPr>
+              <a:t>Characteristics of Data Set: </a:t>
+            </a:r>
+          </a:p>
+          <a:p>
+            <a:endParaRPr lang="en-US" sz="3200" dirty="0" smtClean="0">
+              <a:latin typeface="+mj-lt"/>
+              <a:cs typeface="Times New Roman" pitchFamily="18" charset="0"/>
+            </a:endParaRPr>
+          </a:p>
+          <a:p>
+            <a:endParaRPr lang="en-US" sz="3200" dirty="0" smtClean="0">
+              <a:latin typeface="+mj-lt"/>
+              <a:cs typeface="Times New Roman" pitchFamily="18" charset="0"/>
+            </a:endParaRPr>
+          </a:p>
+          <a:p>
+            <a:endParaRPr lang="en-US" sz="3200" dirty="0" smtClean="0">
+              <a:latin typeface="+mj-lt"/>
+              <a:cs typeface="Times New Roman" pitchFamily="18" charset="0"/>
+            </a:endParaRPr>
+          </a:p>
+          <a:p>
+            <a:endParaRPr lang="en-US" sz="3200" dirty="0" smtClean="0">
+              <a:latin typeface="+mj-lt"/>
+              <a:cs typeface="Times New Roman" pitchFamily="18" charset="0"/>
+            </a:endParaRPr>
+          </a:p>
+          <a:p>
+            <a:endParaRPr lang="en-US" sz="3200" dirty="0" smtClean="0">
+              <a:latin typeface="+mj-lt"/>
+              <a:cs typeface="Times New Roman" pitchFamily="18" charset="0"/>
+            </a:endParaRPr>
+          </a:p>
+          <a:p>
+            <a:endParaRPr lang="en-US" sz="3200" dirty="0" smtClean="0">
+              <a:latin typeface="+mj-lt"/>
+              <a:cs typeface="Times New Roman" pitchFamily="18" charset="0"/>
+            </a:endParaRPr>
+          </a:p>
+          <a:p>
+            <a:r>
+              <a:rPr lang="en-US" sz="3200" dirty="0" smtClean="0">
+                <a:latin typeface="+mj-lt"/>
+                <a:cs typeface="Times New Roman" pitchFamily="18" charset="0"/>
+              </a:rPr>
+              <a:t>From this, we decided to keep a-priori probability at 0.5 for all experiments</a:t>
+            </a:r>
+            <a:endParaRPr lang="en-US" sz="3200" dirty="0">
+              <a:latin typeface="+mj-lt"/>
+              <a:cs typeface="Times New Roman" pitchFamily="18" charset="0"/>
+            </a:endParaRPr>
+          </a:p>
+        </p:txBody>
+      </p:sp>
+      <p:sp>
+        <p:nvSpPr>
+          <p:cNvPr id="24" name="TextBox 23"/>
+          <p:cNvSpPr txBox="1"/>
+          <p:nvPr/>
+        </p:nvSpPr>
+        <p:spPr>
+          <a:xfrm>
+            <a:off x="692723" y="21478000"/>
+            <a:ext cx="12407680" cy="6986528"/>
+          </a:xfrm>
+          <a:prstGeom prst="rect">
+            <a:avLst/>
+          </a:prstGeom>
+          <a:noFill/>
+        </p:spPr>
+        <p:txBody>
+          <a:bodyPr wrap="square" rtlCol="0">
+            <a:spAutoFit/>
+          </a:bodyPr>
+          <a:lstStyle/>
+          <a:p>
+            <a:r>
               <a:rPr lang="en-US" sz="3200" dirty="0" smtClean="0"/>
-              <a:t>Data set chosen from those available on _______________________</a:t>
+              <a:t>Our original data set had 1040 instances. With 340 set aside for testing, we could choose a subset of up to 700 instances to create our “small” dataset. </a:t>
             </a:r>
           </a:p>
           <a:p>
             <a:endParaRPr lang="en-US" sz="3200" dirty="0" smtClean="0"/>
           </a:p>
           <a:p>
+            <a:endParaRPr lang="en-US" sz="3200" dirty="0" smtClean="0"/>
+          </a:p>
+          <a:p>
+            <a:endParaRPr lang="en-US" sz="3200" dirty="0" smtClean="0"/>
+          </a:p>
+          <a:p>
+            <a:endParaRPr lang="en-US" sz="3200" dirty="0" smtClean="0"/>
+          </a:p>
+          <a:p>
+            <a:endParaRPr lang="en-US" sz="3200" dirty="0" smtClean="0"/>
+          </a:p>
+          <a:p>
+            <a:endParaRPr lang="en-US" sz="3200" dirty="0" smtClean="0"/>
+          </a:p>
+          <a:p>
+            <a:endParaRPr lang="en-US" sz="3200" dirty="0" smtClean="0"/>
+          </a:p>
+          <a:p>
+            <a:endParaRPr lang="en-US" sz="3200" dirty="0" smtClean="0"/>
+          </a:p>
+          <a:p>
+            <a:endParaRPr lang="en-US" sz="3200" dirty="0" smtClean="0"/>
+          </a:p>
+          <a:p>
             <a:r>
               <a:rPr lang="en-US" sz="3200" dirty="0" smtClean="0"/>
-              <a:t>Characteristics of Data Set: </a:t>
-            </a:r>
-          </a:p>
-          <a:p>
-            <a:endParaRPr lang="en-US" sz="3200" dirty="0" smtClean="0"/>
-          </a:p>
-          <a:p>
-            <a:endParaRPr lang="en-US" sz="3200" dirty="0" smtClean="0"/>
-          </a:p>
-          <a:p>
-            <a:endParaRPr lang="en-US" sz="3200" dirty="0" smtClean="0"/>
-          </a:p>
-          <a:p>
-            <a:endParaRPr lang="en-US" sz="3200" dirty="0" smtClean="0"/>
-          </a:p>
-          <a:p>
-            <a:endParaRPr lang="en-US" sz="3200" dirty="0" smtClean="0"/>
-          </a:p>
-          <a:p>
-            <a:endParaRPr lang="en-US" sz="3200" dirty="0" smtClean="0"/>
-          </a:p>
-          <a:p>
-            <a:r>
-              <a:rPr lang="en-US" sz="3200" dirty="0" smtClean="0"/>
-              <a:t>From this, we decided to keep a-priori probability at 0.5 for all experiments</a:t>
+              <a:t>RESULTS: From this, we decided to choose datasets of 150 instances for our experimentation of  techniques.  </a:t>
             </a:r>
             <a:endParaRPr lang="en-US" sz="3200" dirty="0"/>
           </a:p>

</xml_diff>

<commit_message>
Poster update- what is small and formatting
Updated what is small section with figures and changed
formatting/coloring of title blocks to make it easier to read.
</commit_message>
<xml_diff>
--- a/POSTER.pptx
+++ b/POSTER.pptx
@@ -125,7 +125,7 @@
   </p:defaultTextStyle>
   <p:extLst>
     <p:ext uri="{EFAFB233-063F-42B5-8137-9DF3F51BA10A}">
-      <p15:sldGuideLst xmlns:p15="http://schemas.microsoft.com/office/powerpoint/2012/main" xmlns="">
+      <p15:sldGuideLst xmlns="" xmlns:p15="http://schemas.microsoft.com/office/powerpoint/2012/main">
         <p15:guide id="1" orient="horz" pos="9216">
           <p15:clr>
             <a:srgbClr val="A4A3A4"/>
@@ -225,7 +225,7 @@
             <a:fld id="{CF0F9DC3-4130-4410-BC95-2E6916856B54}" type="datetimeFigureOut">
               <a:rPr lang="en-US" smtClean="0"/>
               <a:pPr/>
-              <a:t>4/20/2015</a:t>
+              <a:t>4/21/2015</a:t>
             </a:fld>
             <a:endParaRPr lang="en-US"/>
           </a:p>
@@ -394,7 +394,7 @@
     </p:spTree>
     <p:extLst>
       <p:ext uri="{BB962C8B-B14F-4D97-AF65-F5344CB8AC3E}">
-        <p14:creationId xmlns:p14="http://schemas.microsoft.com/office/powerpoint/2010/main" xmlns="" val="2325757360"/>
+        <p14:creationId xmlns="" xmlns:p14="http://schemas.microsoft.com/office/powerpoint/2010/main" val="2325757360"/>
       </p:ext>
     </p:extLst>
   </p:cSld>
@@ -569,7 +569,7 @@
     </p:spTree>
     <p:extLst>
       <p:ext uri="{BB962C8B-B14F-4D97-AF65-F5344CB8AC3E}">
-        <p14:creationId xmlns:p14="http://schemas.microsoft.com/office/powerpoint/2010/main" xmlns="" val="1271015422"/>
+        <p14:creationId xmlns="" xmlns:p14="http://schemas.microsoft.com/office/powerpoint/2010/main" val="1271015422"/>
       </p:ext>
     </p:extLst>
   </p:cSld>
@@ -761,7 +761,7 @@
             <a:fld id="{22106B1F-BB0B-234F-B643-9D3F8052ABA9}" type="datetimeFigureOut">
               <a:rPr lang="en-US" smtClean="0"/>
               <a:pPr/>
-              <a:t>4/20/2015</a:t>
+              <a:t>4/21/2015</a:t>
             </a:fld>
             <a:endParaRPr lang="en-US"/>
           </a:p>
@@ -928,7 +928,7 @@
             <a:fld id="{22106B1F-BB0B-234F-B643-9D3F8052ABA9}" type="datetimeFigureOut">
               <a:rPr lang="en-US" smtClean="0"/>
               <a:pPr/>
-              <a:t>4/20/2015</a:t>
+              <a:t>4/21/2015</a:t>
             </a:fld>
             <a:endParaRPr lang="en-US"/>
           </a:p>
@@ -1105,7 +1105,7 @@
             <a:fld id="{22106B1F-BB0B-234F-B643-9D3F8052ABA9}" type="datetimeFigureOut">
               <a:rPr lang="en-US" smtClean="0"/>
               <a:pPr/>
-              <a:t>4/20/2015</a:t>
+              <a:t>4/21/2015</a:t>
             </a:fld>
             <a:endParaRPr lang="en-US"/>
           </a:p>
@@ -1272,7 +1272,7 @@
             <a:fld id="{22106B1F-BB0B-234F-B643-9D3F8052ABA9}" type="datetimeFigureOut">
               <a:rPr lang="en-US" smtClean="0"/>
               <a:pPr/>
-              <a:t>4/20/2015</a:t>
+              <a:t>4/21/2015</a:t>
             </a:fld>
             <a:endParaRPr lang="en-US"/>
           </a:p>
@@ -1515,7 +1515,7 @@
             <a:fld id="{22106B1F-BB0B-234F-B643-9D3F8052ABA9}" type="datetimeFigureOut">
               <a:rPr lang="en-US" smtClean="0"/>
               <a:pPr/>
-              <a:t>4/20/2015</a:t>
+              <a:t>4/21/2015</a:t>
             </a:fld>
             <a:endParaRPr lang="en-US"/>
           </a:p>
@@ -1800,7 +1800,7 @@
             <a:fld id="{22106B1F-BB0B-234F-B643-9D3F8052ABA9}" type="datetimeFigureOut">
               <a:rPr lang="en-US" smtClean="0"/>
               <a:pPr/>
-              <a:t>4/20/2015</a:t>
+              <a:t>4/21/2015</a:t>
             </a:fld>
             <a:endParaRPr lang="en-US"/>
           </a:p>
@@ -2219,7 +2219,7 @@
             <a:fld id="{22106B1F-BB0B-234F-B643-9D3F8052ABA9}" type="datetimeFigureOut">
               <a:rPr lang="en-US" smtClean="0"/>
               <a:pPr/>
-              <a:t>4/20/2015</a:t>
+              <a:t>4/21/2015</a:t>
             </a:fld>
             <a:endParaRPr lang="en-US"/>
           </a:p>
@@ -2334,7 +2334,7 @@
             <a:fld id="{22106B1F-BB0B-234F-B643-9D3F8052ABA9}" type="datetimeFigureOut">
               <a:rPr lang="en-US" smtClean="0"/>
               <a:pPr/>
-              <a:t>4/20/2015</a:t>
+              <a:t>4/21/2015</a:t>
             </a:fld>
             <a:endParaRPr lang="en-US"/>
           </a:p>
@@ -2426,7 +2426,7 @@
             <a:fld id="{22106B1F-BB0B-234F-B643-9D3F8052ABA9}" type="datetimeFigureOut">
               <a:rPr lang="en-US" smtClean="0"/>
               <a:pPr/>
-              <a:t>4/20/2015</a:t>
+              <a:t>4/21/2015</a:t>
             </a:fld>
             <a:endParaRPr lang="en-US"/>
           </a:p>
@@ -2700,7 +2700,7 @@
             <a:fld id="{22106B1F-BB0B-234F-B643-9D3F8052ABA9}" type="datetimeFigureOut">
               <a:rPr lang="en-US" smtClean="0"/>
               <a:pPr/>
-              <a:t>4/20/2015</a:t>
+              <a:t>4/21/2015</a:t>
             </a:fld>
             <a:endParaRPr lang="en-US"/>
           </a:p>
@@ -2950,7 +2950,7 @@
             <a:fld id="{22106B1F-BB0B-234F-B643-9D3F8052ABA9}" type="datetimeFigureOut">
               <a:rPr lang="en-US" smtClean="0"/>
               <a:pPr/>
-              <a:t>4/20/2015</a:t>
+              <a:t>4/21/2015</a:t>
             </a:fld>
             <a:endParaRPr lang="en-US"/>
           </a:p>
@@ -3160,7 +3160,7 @@
             <a:fld id="{22106B1F-BB0B-234F-B643-9D3F8052ABA9}" type="datetimeFigureOut">
               <a:rPr lang="en-US" smtClean="0"/>
               <a:pPr/>
-              <a:t>4/20/2015</a:t>
+              <a:t>4/21/2015</a:t>
             </a:fld>
             <a:endParaRPr lang="en-US"/>
           </a:p>
@@ -3547,7 +3547,7 @@
         </p:nvSpPr>
         <p:spPr>
           <a:xfrm>
-            <a:off x="611900" y="9903259"/>
+            <a:off x="611900" y="9872779"/>
             <a:ext cx="12477944" cy="4031871"/>
           </a:xfrm>
           <a:prstGeom prst="rect">
@@ -3611,7 +3611,7 @@
             <a:avLst/>
           </a:prstGeom>
           <a:solidFill>
-            <a:srgbClr val="003366"/>
+            <a:srgbClr val="213F93"/>
           </a:solidFill>
           <a:ln w="9525">
             <a:noFill/>
@@ -3626,13 +3626,6 @@
               <a:avLst/>
             </a:prstTxWarp>
             <a:spAutoFit/>
-            <a:scene3d>
-              <a:camera prst="orthographicFront"/>
-              <a:lightRig rig="threePt" dir="t"/>
-            </a:scene3d>
-            <a:sp3d extrusionH="57150">
-              <a:bevelT w="38100" h="38100"/>
-            </a:sp3d>
           </a:bodyPr>
           <a:lstStyle/>
           <a:p>
@@ -3678,7 +3671,7 @@
             <a:avLst/>
           </a:prstGeom>
           <a:solidFill>
-            <a:srgbClr val="003366"/>
+            <a:srgbClr val="213F93"/>
           </a:solidFill>
           <a:ln w="9525">
             <a:noFill/>
@@ -3693,13 +3686,6 @@
               <a:avLst/>
             </a:prstTxWarp>
             <a:spAutoFit/>
-            <a:scene3d>
-              <a:camera prst="orthographicFront"/>
-              <a:lightRig rig="threePt" dir="t"/>
-            </a:scene3d>
-            <a:sp3d extrusionH="57150">
-              <a:bevelT w="38100" h="38100"/>
-            </a:sp3d>
           </a:bodyPr>
           <a:lstStyle/>
           <a:p>
@@ -3737,7 +3723,7 @@
         <p:spPr>
           <a:xfrm>
             <a:off x="13637771" y="12083987"/>
-            <a:ext cx="22168797" cy="13290613"/>
+            <a:ext cx="22168797" cy="10913173"/>
           </a:xfrm>
           <a:prstGeom prst="rect">
             <a:avLst/>
@@ -3785,13 +3771,13 @@
         <p:spPr>
           <a:xfrm>
             <a:off x="0" y="0"/>
-            <a:ext cx="36576000" cy="4241790"/>
+            <a:ext cx="36576000" cy="4170432"/>
           </a:xfrm>
           <a:prstGeom prst="rect">
             <a:avLst/>
           </a:prstGeom>
           <a:solidFill>
-            <a:srgbClr val="003366"/>
+            <a:srgbClr val="213F93"/>
           </a:solidFill>
           <a:effectLst>
             <a:reflection blurRad="6350" stA="50000" endA="300" endPos="55500" dist="50800" dir="5400000" sy="-100000" algn="bl" rotWithShape="0"/>
@@ -4034,54 +4020,6 @@
       </p:sp>
       <p:sp>
         <p:nvSpPr>
-          <p:cNvPr id="12" name="Rectangle 11"/>
-          <p:cNvSpPr/>
-          <p:nvPr/>
-        </p:nvSpPr>
-        <p:spPr>
-          <a:xfrm>
-            <a:off x="0" y="4241790"/>
-            <a:ext cx="36576000" cy="253981"/>
-          </a:xfrm>
-          <a:prstGeom prst="rect">
-            <a:avLst/>
-          </a:prstGeom>
-          <a:scene3d>
-            <a:camera prst="orthographicFront"/>
-            <a:lightRig rig="threePt" dir="t"/>
-          </a:scene3d>
-          <a:sp3d>
-            <a:bevelT/>
-          </a:sp3d>
-        </p:spPr>
-        <p:style>
-          <a:lnRef idx="2">
-            <a:schemeClr val="dk1"/>
-          </a:lnRef>
-          <a:fillRef idx="1">
-            <a:schemeClr val="lt1"/>
-          </a:fillRef>
-          <a:effectRef idx="0">
-            <a:schemeClr val="dk1"/>
-          </a:effectRef>
-          <a:fontRef idx="minor">
-            <a:schemeClr val="dk1"/>
-          </a:fontRef>
-        </p:style>
-        <p:txBody>
-          <a:bodyPr rtlCol="0" anchor="ctr"/>
-          <a:lstStyle/>
-          <a:p>
-            <a:pPr algn="ctr"/>
-            <a:endParaRPr lang="en-US">
-              <a:latin typeface="+mj-lt"/>
-              <a:cs typeface="Times New Roman" pitchFamily="18" charset="0"/>
-            </a:endParaRPr>
-          </a:p>
-        </p:txBody>
-      </p:sp>
-      <p:sp>
-        <p:nvSpPr>
           <p:cNvPr id="13" name="Text Box 7"/>
           <p:cNvSpPr txBox="1">
             <a:spLocks noChangeArrowheads="1"/>
@@ -4097,7 +4035,7 @@
             <a:avLst/>
           </a:prstGeom>
           <a:solidFill>
-            <a:srgbClr val="003366"/>
+            <a:srgbClr val="213F93"/>
           </a:solidFill>
           <a:ln w="9525">
             <a:noFill/>
@@ -4112,13 +4050,6 @@
               <a:avLst/>
             </a:prstTxWarp>
             <a:spAutoFit/>
-            <a:scene3d>
-              <a:camera prst="orthographicFront"/>
-              <a:lightRig rig="threePt" dir="t"/>
-            </a:scene3d>
-            <a:sp3d extrusionH="57150">
-              <a:bevelT w="38100" h="38100"/>
-            </a:sp3d>
           </a:bodyPr>
           <a:lstStyle/>
           <a:p>
@@ -4130,18 +4061,16 @@
             <a:r>
               <a:rPr lang="en-US" sz="3600" b="1" dirty="0" smtClean="0">
                 <a:solidFill>
-                  <a:srgbClr val="F8F8F8"/>
+                  <a:schemeClr val="bg1"/>
                 </a:solidFill>
-                <a:latin typeface="+mj-lt"/>
                 <a:cs typeface="Times New Roman" pitchFamily="18" charset="0"/>
               </a:rPr>
               <a:t>Background</a:t>
             </a:r>
             <a:endParaRPr lang="en-US" sz="3600" b="1" dirty="0">
               <a:solidFill>
-                <a:srgbClr val="F8F8F8"/>
+                <a:schemeClr val="bg1"/>
               </a:solidFill>
-              <a:latin typeface="+mj-lt"/>
               <a:cs typeface="Times New Roman" pitchFamily="18" charset="0"/>
             </a:endParaRPr>
           </a:p>
@@ -4164,7 +4093,7 @@
             <a:avLst/>
           </a:prstGeom>
           <a:solidFill>
-            <a:srgbClr val="003366"/>
+            <a:srgbClr val="213F93"/>
           </a:solidFill>
           <a:ln w="9525">
             <a:noFill/>
@@ -4179,13 +4108,6 @@
               <a:avLst/>
             </a:prstTxWarp>
             <a:spAutoFit/>
-            <a:scene3d>
-              <a:camera prst="orthographicFront"/>
-              <a:lightRig rig="threePt" dir="t"/>
-            </a:scene3d>
-            <a:sp3d extrusionH="57150">
-              <a:bevelT w="38100" h="38100"/>
-            </a:sp3d>
           </a:bodyPr>
           <a:lstStyle/>
           <a:p>
@@ -4231,7 +4153,7 @@
             <a:avLst/>
           </a:prstGeom>
           <a:solidFill>
-            <a:srgbClr val="003366"/>
+            <a:srgbClr val="213F93"/>
           </a:solidFill>
           <a:ln w="9525">
             <a:noFill/>
@@ -4246,13 +4168,6 @@
               <a:avLst/>
             </a:prstTxWarp>
             <a:spAutoFit/>
-            <a:scene3d>
-              <a:camera prst="orthographicFront"/>
-              <a:lightRig rig="threePt" dir="t"/>
-            </a:scene3d>
-            <a:sp3d extrusionH="57150">
-              <a:bevelT w="38100" h="38100"/>
-            </a:sp3d>
           </a:bodyPr>
           <a:lstStyle/>
           <a:p>
@@ -4298,14 +4213,14 @@
         </p:nvSpPr>
         <p:spPr bwMode="auto">
           <a:xfrm>
-            <a:off x="13649045" y="26002372"/>
+            <a:off x="13649045" y="23303069"/>
             <a:ext cx="22212545" cy="694525"/>
           </a:xfrm>
           <a:prstGeom prst="rect">
             <a:avLst/>
           </a:prstGeom>
           <a:solidFill>
-            <a:srgbClr val="003366"/>
+            <a:srgbClr val="213F93"/>
           </a:solidFill>
           <a:ln w="9525">
             <a:noFill/>
@@ -4320,13 +4235,6 @@
               <a:avLst/>
             </a:prstTxWarp>
             <a:spAutoFit/>
-            <a:scene3d>
-              <a:camera prst="orthographicFront"/>
-              <a:lightRig rig="threePt" dir="t"/>
-            </a:scene3d>
-            <a:sp3d extrusionH="57150">
-              <a:bevelT w="38100" h="38100"/>
-            </a:sp3d>
           </a:bodyPr>
           <a:lstStyle/>
           <a:p>
@@ -4411,8 +4319,8 @@
         </p:nvSpPr>
         <p:spPr>
           <a:xfrm>
-            <a:off x="13649045" y="26696897"/>
-            <a:ext cx="22212545" cy="1824591"/>
+            <a:off x="13649045" y="23997594"/>
+            <a:ext cx="22212545" cy="4466934"/>
           </a:xfrm>
           <a:prstGeom prst="rect">
             <a:avLst/>
@@ -4797,7 +4705,7 @@
             <a:avLst/>
           </a:prstGeom>
           <a:solidFill>
-            <a:srgbClr val="003366"/>
+            <a:srgbClr val="213F93"/>
           </a:solidFill>
           <a:ln w="9525">
             <a:noFill/>
@@ -4812,13 +4720,6 @@
               <a:avLst/>
             </a:prstTxWarp>
             <a:spAutoFit/>
-            <a:scene3d>
-              <a:camera prst="orthographicFront"/>
-              <a:lightRig rig="threePt" dir="t"/>
-            </a:scene3d>
-            <a:sp3d extrusionH="57150">
-              <a:bevelT w="38100" h="38100"/>
-            </a:sp3d>
           </a:bodyPr>
           <a:lstStyle/>
           <a:p>
@@ -5022,10 +4923,20 @@
           <a:p>
             <a:r>
               <a:rPr lang="en-US" sz="3200" dirty="0" smtClean="0"/>
-              <a:t>Our original data set had 1040 instances. With 340 set aside for testing, we could choose a subset of up to 700 instances to create our “small” dataset. </a:t>
-            </a:r>
-          </a:p>
-          <a:p>
+              <a:t>Want to choose a subset (&lt;700) as the</a:t>
+            </a:r>
+            <a:r>
+              <a:rPr lang="en-US" sz="3200" dirty="0" smtClean="0"/>
+              <a:t> </a:t>
+            </a:r>
+            <a:r>
+              <a:rPr lang="en-US" sz="3200" dirty="0" smtClean="0"/>
+              <a:t>“small” </a:t>
+            </a:r>
+            <a:r>
+              <a:rPr lang="en-US" sz="3200" dirty="0" smtClean="0"/>
+              <a:t>training dataset </a:t>
+            </a:r>
             <a:endParaRPr lang="en-US" sz="3200" dirty="0" smtClean="0"/>
           </a:p>
           <a:p>
@@ -5053,17 +4964,37 @@
             <a:endParaRPr lang="en-US" sz="3200" dirty="0" smtClean="0"/>
           </a:p>
           <a:p>
+            <a:endParaRPr lang="en-US" sz="3200" dirty="0" smtClean="0"/>
+          </a:p>
+          <a:p>
+            <a:endParaRPr lang="en-US" sz="3200" dirty="0" smtClean="0"/>
+          </a:p>
+          <a:p>
+            <a:endParaRPr lang="en-US" sz="3200" dirty="0" smtClean="0"/>
+          </a:p>
+          <a:p>
+            <a:endParaRPr lang="en-US" sz="3200" dirty="0" smtClean="0"/>
+          </a:p>
+          <a:p>
             <a:r>
               <a:rPr lang="en-US" sz="3200" dirty="0" smtClean="0"/>
-              <a:t>RESULTS: From this, we decided to choose datasets of </a:t>
+              <a:t>Result: </a:t>
             </a:r>
             <a:r>
               <a:rPr lang="en-US" sz="3200" dirty="0" smtClean="0"/>
-              <a:t>100 </a:t>
+              <a:t>choose </a:t>
             </a:r>
             <a:r>
               <a:rPr lang="en-US" sz="3200" dirty="0" smtClean="0"/>
-              <a:t>instances for our experimentation of  techniques.  </a:t>
+              <a:t>datasets of 100 instances for our </a:t>
+            </a:r>
+            <a:r>
+              <a:rPr lang="en-US" sz="3200" dirty="0" smtClean="0"/>
+              <a:t>“small” </a:t>
+            </a:r>
+            <a:r>
+              <a:rPr lang="en-US" sz="3200" dirty="0" smtClean="0"/>
+              <a:t>training dataset. </a:t>
             </a:r>
             <a:endParaRPr lang="en-US" sz="3200" dirty="0"/>
           </a:p>
@@ -5107,9 +5038,6 @@
               </a:rPr>
               <a:t>Picks 100 samples with replacement</a:t>
             </a:r>
-            <a:endParaRPr lang="en-US" sz="3200" dirty="0" smtClean="0">
-              <a:cs typeface="Times New Roman" pitchFamily="18" charset="0"/>
-            </a:endParaRPr>
           </a:p>
           <a:p>
             <a:pPr marL="457200" indent="-457200">
@@ -5152,9 +5080,6 @@
               </a:rPr>
               <a:t>Virtual Data Creation</a:t>
             </a:r>
-            <a:endParaRPr lang="en-US" sz="3200" dirty="0" smtClean="0">
-              <a:cs typeface="Times New Roman" pitchFamily="18" charset="0"/>
-            </a:endParaRPr>
           </a:p>
           <a:p>
             <a:pPr marL="457200" indent="-457200">
@@ -5236,9 +5161,6 @@
               </a:rPr>
               <a:t>Principle Components Analysis</a:t>
             </a:r>
-            <a:endParaRPr lang="en-US" sz="3200" dirty="0" smtClean="0">
-              <a:cs typeface="Times New Roman" pitchFamily="18" charset="0"/>
-            </a:endParaRPr>
           </a:p>
           <a:p>
             <a:pPr marL="457200" indent="-457200">
@@ -5393,6 +5315,110 @@
           </a:p>
         </p:txBody>
       </p:sp>
+      <p:pic>
+        <p:nvPicPr>
+          <p:cNvPr id="1026" name="Picture 2" descr="C:\Users\Stephanie\Documents\GitHub\machinelearningproject\Plots\NaiveBayes by10s non-scaled.png"/>
+          <p:cNvPicPr>
+            <a:picLocks noChangeAspect="1" noChangeArrowheads="1"/>
+          </p:cNvPicPr>
+          <p:nvPr/>
+        </p:nvPicPr>
+        <p:blipFill>
+          <a:blip r:embed="rId3"/>
+          <a:srcRect/>
+          <a:stretch>
+            <a:fillRect/>
+          </a:stretch>
+        </p:blipFill>
+        <p:spPr bwMode="auto">
+          <a:xfrm>
+            <a:off x="1708723" y="21957912"/>
+            <a:ext cx="5098477" cy="2911490"/>
+          </a:xfrm>
+          <a:prstGeom prst="rect">
+            <a:avLst/>
+          </a:prstGeom>
+          <a:noFill/>
+        </p:spPr>
+      </p:pic>
+      <p:pic>
+        <p:nvPicPr>
+          <p:cNvPr id="1027" name="Picture 3" descr="C:\Users\Stephanie\Documents\GitHub\machinelearningproject\Plots\NaiveBayes by10s scaled.png"/>
+          <p:cNvPicPr>
+            <a:picLocks noChangeAspect="1" noChangeArrowheads="1"/>
+          </p:cNvPicPr>
+          <p:nvPr/>
+        </p:nvPicPr>
+        <p:blipFill>
+          <a:blip r:embed="rId4"/>
+          <a:srcRect/>
+          <a:stretch>
+            <a:fillRect/>
+          </a:stretch>
+        </p:blipFill>
+        <p:spPr bwMode="auto">
+          <a:xfrm>
+            <a:off x="7053322" y="21999952"/>
+            <a:ext cx="5059538" cy="2909938"/>
+          </a:xfrm>
+          <a:prstGeom prst="rect">
+            <a:avLst/>
+          </a:prstGeom>
+          <a:noFill/>
+        </p:spPr>
+      </p:pic>
+      <p:pic>
+        <p:nvPicPr>
+          <p:cNvPr id="1028" name="Picture 4" descr="C:\Users\Stephanie\Documents\GitHub\machinelearningproject\Plots\SVM by10s non-scaled.png"/>
+          <p:cNvPicPr>
+            <a:picLocks noChangeAspect="1" noChangeArrowheads="1"/>
+          </p:cNvPicPr>
+          <p:nvPr/>
+        </p:nvPicPr>
+        <p:blipFill>
+          <a:blip r:embed="rId5"/>
+          <a:srcRect/>
+          <a:stretch>
+            <a:fillRect/>
+          </a:stretch>
+        </p:blipFill>
+        <p:spPr bwMode="auto">
+          <a:xfrm>
+            <a:off x="1708723" y="25050252"/>
+            <a:ext cx="5098477" cy="2908173"/>
+          </a:xfrm>
+          <a:prstGeom prst="rect">
+            <a:avLst/>
+          </a:prstGeom>
+          <a:noFill/>
+        </p:spPr>
+      </p:pic>
+      <p:pic>
+        <p:nvPicPr>
+          <p:cNvPr id="1029" name="Picture 5" descr="C:\Users\Stephanie\Documents\GitHub\machinelearningproject\Plots\SVM by10s scaled.png"/>
+          <p:cNvPicPr>
+            <a:picLocks noChangeAspect="1" noChangeArrowheads="1"/>
+          </p:cNvPicPr>
+          <p:nvPr/>
+        </p:nvPicPr>
+        <p:blipFill>
+          <a:blip r:embed="rId6"/>
+          <a:srcRect/>
+          <a:stretch>
+            <a:fillRect/>
+          </a:stretch>
+        </p:blipFill>
+        <p:spPr bwMode="auto">
+          <a:xfrm>
+            <a:off x="7053322" y="25050252"/>
+            <a:ext cx="5059538" cy="2911489"/>
+          </a:xfrm>
+          <a:prstGeom prst="rect">
+            <a:avLst/>
+          </a:prstGeom>
+          <a:noFill/>
+        </p:spPr>
+      </p:pic>
     </p:spTree>
   </p:cSld>
   <p:clrMapOvr>

</xml_diff>

<commit_message>
Changed poster to 3 columns
poster now 3 columns, room for references, more space for methods.
</commit_message>
<xml_diff>
--- a/POSTER.pptx
+++ b/POSTER.pptx
@@ -125,7 +125,7 @@
   </p:defaultTextStyle>
   <p:extLst>
     <p:ext uri="{EFAFB233-063F-42B5-8137-9DF3F51BA10A}">
-      <p15:sldGuideLst xmlns="" xmlns:p15="http://schemas.microsoft.com/office/powerpoint/2012/main">
+      <p15:sldGuideLst xmlns:p15="http://schemas.microsoft.com/office/powerpoint/2012/main" xmlns="">
         <p15:guide id="1" orient="horz" pos="9216">
           <p15:clr>
             <a:srgbClr val="A4A3A4"/>
@@ -394,7 +394,7 @@
     </p:spTree>
     <p:extLst>
       <p:ext uri="{BB962C8B-B14F-4D97-AF65-F5344CB8AC3E}">
-        <p14:creationId xmlns="" xmlns:p14="http://schemas.microsoft.com/office/powerpoint/2010/main" val="2325757360"/>
+        <p14:creationId xmlns:p14="http://schemas.microsoft.com/office/powerpoint/2010/main" xmlns="" val="2325757360"/>
       </p:ext>
     </p:extLst>
   </p:cSld>
@@ -569,7 +569,7 @@
     </p:spTree>
     <p:extLst>
       <p:ext uri="{BB962C8B-B14F-4D97-AF65-F5344CB8AC3E}">
-        <p14:creationId xmlns="" xmlns:p14="http://schemas.microsoft.com/office/powerpoint/2010/main" val="1271015422"/>
+        <p14:creationId xmlns:p14="http://schemas.microsoft.com/office/powerpoint/2010/main" xmlns="" val="1271015422"/>
       </p:ext>
     </p:extLst>
   </p:cSld>
@@ -3656,114 +3656,6 @@
       </p:sp>
       <p:sp>
         <p:nvSpPr>
-          <p:cNvPr id="32" name="Text Box 7"/>
-          <p:cNvSpPr txBox="1">
-            <a:spLocks noChangeArrowheads="1"/>
-          </p:cNvSpPr>
-          <p:nvPr/>
-        </p:nvSpPr>
-        <p:spPr bwMode="auto">
-          <a:xfrm>
-            <a:off x="13623776" y="11466213"/>
-            <a:ext cx="22161262" cy="632970"/>
-          </a:xfrm>
-          <a:prstGeom prst="rect">
-            <a:avLst/>
-          </a:prstGeom>
-          <a:solidFill>
-            <a:srgbClr val="213F93"/>
-          </a:solidFill>
-          <a:ln w="9525">
-            <a:noFill/>
-            <a:miter lim="800000"/>
-            <a:headEnd/>
-            <a:tailEnd/>
-          </a:ln>
-        </p:spPr>
-        <p:txBody>
-          <a:bodyPr wrap="square" lIns="78225" tIns="39104" rIns="78225" bIns="39104">
-            <a:prstTxWarp prst="textNoShape">
-              <a:avLst/>
-            </a:prstTxWarp>
-            <a:spAutoFit/>
-          </a:bodyPr>
-          <a:lstStyle/>
-          <a:p>
-            <a:pPr algn="ctr" eaLnBrk="0" hangingPunct="0">
-              <a:spcBef>
-                <a:spcPct val="50000"/>
-              </a:spcBef>
-            </a:pPr>
-            <a:r>
-              <a:rPr lang="en-US" sz="3600" b="1" dirty="0" smtClean="0">
-                <a:solidFill>
-                  <a:srgbClr val="F8F8F8"/>
-                </a:solidFill>
-                <a:latin typeface="+mj-lt"/>
-                <a:cs typeface="Times New Roman" pitchFamily="18" charset="0"/>
-              </a:rPr>
-              <a:t>Results</a:t>
-            </a:r>
-            <a:endParaRPr lang="en-US" sz="3600" b="1" dirty="0">
-              <a:solidFill>
-                <a:srgbClr val="F8F8F8"/>
-              </a:solidFill>
-              <a:latin typeface="+mj-lt"/>
-              <a:cs typeface="Times New Roman" pitchFamily="18" charset="0"/>
-            </a:endParaRPr>
-          </a:p>
-        </p:txBody>
-      </p:sp>
-      <p:sp>
-        <p:nvSpPr>
-          <p:cNvPr id="33" name="Rectangle 32"/>
-          <p:cNvSpPr/>
-          <p:nvPr/>
-        </p:nvSpPr>
-        <p:spPr>
-          <a:xfrm>
-            <a:off x="13637771" y="12083987"/>
-            <a:ext cx="22168797" cy="10913173"/>
-          </a:xfrm>
-          <a:prstGeom prst="rect">
-            <a:avLst/>
-          </a:prstGeom>
-          <a:solidFill>
-            <a:srgbClr val="FFFFFF"/>
-          </a:solidFill>
-          <a:ln>
-            <a:noFill/>
-          </a:ln>
-          <a:effectLst/>
-        </p:spPr>
-        <p:style>
-          <a:lnRef idx="1">
-            <a:schemeClr val="accent1"/>
-          </a:lnRef>
-          <a:fillRef idx="3">
-            <a:schemeClr val="accent1"/>
-          </a:fillRef>
-          <a:effectRef idx="2">
-            <a:schemeClr val="accent1"/>
-          </a:effectRef>
-          <a:fontRef idx="minor">
-            <a:schemeClr val="lt1"/>
-          </a:fontRef>
-        </p:style>
-        <p:txBody>
-          <a:bodyPr rtlCol="0" anchor="ctr"/>
-          <a:lstStyle/>
-          <a:p>
-            <a:pPr algn="ctr"/>
-            <a:endParaRPr lang="en-US" dirty="0">
-              <a:latin typeface="+mj-lt"/>
-              <a:cs typeface="Times New Roman" pitchFamily="18" charset="0"/>
-            </a:endParaRPr>
-          </a:p>
-        </p:txBody>
-      </p:sp>
-      <p:sp>
-        <p:nvSpPr>
           <p:cNvPr id="4" name="Rectangle 3"/>
           <p:cNvSpPr/>
           <p:nvPr/>
@@ -4086,8 +3978,8 @@
         </p:nvSpPr>
         <p:spPr bwMode="auto">
           <a:xfrm>
-            <a:off x="13623776" y="4742018"/>
-            <a:ext cx="22141741" cy="647932"/>
+            <a:off x="13623777" y="4742018"/>
+            <a:ext cx="10847274" cy="647932"/>
           </a:xfrm>
           <a:prstGeom prst="rect">
             <a:avLst/>
@@ -4124,7 +4016,7 @@
                 <a:latin typeface="+mj-lt"/>
                 <a:cs typeface="Times New Roman" pitchFamily="18" charset="0"/>
               </a:rPr>
-              <a:t>Methods Explored</a:t>
+              <a:t>Methods</a:t>
             </a:r>
             <a:endParaRPr lang="en-US" sz="3600" b="1" dirty="0">
               <a:solidFill>
@@ -4205,74 +4097,14 @@
       </p:sp>
       <p:sp>
         <p:nvSpPr>
-          <p:cNvPr id="18" name="Text Box 7"/>
-          <p:cNvSpPr txBox="1">
-            <a:spLocks noChangeArrowheads="1"/>
-          </p:cNvSpPr>
-          <p:nvPr/>
-        </p:nvSpPr>
-        <p:spPr bwMode="auto">
-          <a:xfrm>
-            <a:off x="13649045" y="23303069"/>
-            <a:ext cx="22212545" cy="694525"/>
-          </a:xfrm>
-          <a:prstGeom prst="rect">
-            <a:avLst/>
-          </a:prstGeom>
-          <a:solidFill>
-            <a:srgbClr val="213F93"/>
-          </a:solidFill>
-          <a:ln w="9525">
-            <a:noFill/>
-            <a:miter lim="800000"/>
-            <a:headEnd/>
-            <a:tailEnd/>
-          </a:ln>
-        </p:spPr>
-        <p:txBody>
-          <a:bodyPr wrap="square" lIns="78225" tIns="39104" rIns="78225" bIns="39104">
-            <a:prstTxWarp prst="textNoShape">
-              <a:avLst/>
-            </a:prstTxWarp>
-            <a:spAutoFit/>
-          </a:bodyPr>
-          <a:lstStyle/>
-          <a:p>
-            <a:pPr algn="ctr" eaLnBrk="0" hangingPunct="0">
-              <a:spcBef>
-                <a:spcPct val="50000"/>
-              </a:spcBef>
-            </a:pPr>
-            <a:r>
-              <a:rPr lang="en-US" sz="4000" b="1" dirty="0" smtClean="0">
-                <a:solidFill>
-                  <a:srgbClr val="F8F8F8"/>
-                </a:solidFill>
-                <a:latin typeface="+mj-lt"/>
-                <a:cs typeface="Times New Roman" pitchFamily="18" charset="0"/>
-              </a:rPr>
-              <a:t>Conclusions and Remaining Work</a:t>
-            </a:r>
-            <a:endParaRPr lang="en-US" sz="4000" b="1" dirty="0">
-              <a:solidFill>
-                <a:srgbClr val="F8F8F8"/>
-              </a:solidFill>
-              <a:latin typeface="+mj-lt"/>
-              <a:cs typeface="Times New Roman" pitchFamily="18" charset="0"/>
-            </a:endParaRPr>
-          </a:p>
-        </p:txBody>
-      </p:sp>
-      <p:sp>
-        <p:nvSpPr>
           <p:cNvPr id="19" name="Rectangle 18"/>
           <p:cNvSpPr/>
           <p:nvPr/>
         </p:nvSpPr>
         <p:spPr>
           <a:xfrm>
-            <a:off x="13623776" y="5375958"/>
-            <a:ext cx="22141741" cy="5596841"/>
+            <a:off x="13614212" y="5389951"/>
+            <a:ext cx="10856838" cy="23145530"/>
           </a:xfrm>
           <a:prstGeom prst="rect">
             <a:avLst/>
@@ -4313,54 +4145,6 @@
       </p:sp>
       <p:sp>
         <p:nvSpPr>
-          <p:cNvPr id="20" name="Rectangle 19"/>
-          <p:cNvSpPr/>
-          <p:nvPr/>
-        </p:nvSpPr>
-        <p:spPr>
-          <a:xfrm>
-            <a:off x="13649045" y="23997594"/>
-            <a:ext cx="22212545" cy="4466934"/>
-          </a:xfrm>
-          <a:prstGeom prst="rect">
-            <a:avLst/>
-          </a:prstGeom>
-          <a:solidFill>
-            <a:srgbClr val="FFFFFF"/>
-          </a:solidFill>
-          <a:ln>
-            <a:noFill/>
-          </a:ln>
-          <a:effectLst/>
-        </p:spPr>
-        <p:style>
-          <a:lnRef idx="1">
-            <a:schemeClr val="accent1"/>
-          </a:lnRef>
-          <a:fillRef idx="3">
-            <a:schemeClr val="accent1"/>
-          </a:fillRef>
-          <a:effectRef idx="2">
-            <a:schemeClr val="accent1"/>
-          </a:effectRef>
-          <a:fontRef idx="minor">
-            <a:schemeClr val="lt1"/>
-          </a:fontRef>
-        </p:style>
-        <p:txBody>
-          <a:bodyPr rtlCol="0" anchor="ctr"/>
-          <a:lstStyle/>
-          <a:p>
-            <a:pPr algn="ctr"/>
-            <a:endParaRPr lang="en-US" dirty="0">
-              <a:latin typeface="+mj-lt"/>
-              <a:cs typeface="Times New Roman" pitchFamily="18" charset="0"/>
-            </a:endParaRPr>
-          </a:p>
-        </p:txBody>
-      </p:sp>
-      <p:sp>
-        <p:nvSpPr>
           <p:cNvPr id="21" name="Rectangle 20"/>
           <p:cNvSpPr/>
           <p:nvPr/>
@@ -4368,7 +4152,7 @@
         <p:spPr>
           <a:xfrm>
             <a:off x="622458" y="14950201"/>
-            <a:ext cx="12477945" cy="5471399"/>
+            <a:ext cx="12477945" cy="4633199"/>
           </a:xfrm>
           <a:prstGeom prst="rect">
             <a:avLst/>
@@ -4698,7 +4482,7 @@
         </p:nvSpPr>
         <p:spPr bwMode="auto">
           <a:xfrm>
-            <a:off x="647859" y="20833368"/>
+            <a:off x="647861" y="20033268"/>
             <a:ext cx="12477942" cy="632970"/>
           </a:xfrm>
           <a:prstGeom prst="rect">
@@ -4756,8 +4540,8 @@
         </p:nvSpPr>
         <p:spPr>
           <a:xfrm>
-            <a:off x="647858" y="21478001"/>
-            <a:ext cx="12477945" cy="7043487"/>
+            <a:off x="647858" y="20677901"/>
+            <a:ext cx="12477945" cy="7786627"/>
           </a:xfrm>
           <a:prstGeom prst="rect">
             <a:avLst/>
@@ -4812,7 +4596,7 @@
         <p:spPr>
           <a:xfrm>
             <a:off x="637299" y="14924801"/>
-            <a:ext cx="12422691" cy="5509200"/>
+            <a:ext cx="12422691" cy="4031873"/>
           </a:xfrm>
           <a:prstGeom prst="rect">
             <a:avLst/>
@@ -4830,7 +4614,35 @@
                 <a:latin typeface="+mj-lt"/>
                 <a:cs typeface="Times New Roman" pitchFamily="18" charset="0"/>
               </a:rPr>
-              <a:t>Data set chosen from those available on _______________________</a:t>
+              <a:t>Parkinson Speech Dataset</a:t>
+            </a:r>
+            <a:r>
+              <a:rPr lang="en-US" sz="3200" baseline="30000" dirty="0" smtClean="0">
+                <a:latin typeface="+mj-lt"/>
+                <a:cs typeface="Times New Roman" pitchFamily="18" charset="0"/>
+              </a:rPr>
+              <a:t>1</a:t>
+            </a:r>
+            <a:r>
+              <a:rPr lang="en-US" sz="3200" dirty="0" smtClean="0">
+                <a:latin typeface="+mj-lt"/>
+                <a:cs typeface="Times New Roman" pitchFamily="18" charset="0"/>
+              </a:rPr>
+              <a:t> </a:t>
+            </a:r>
+            <a:r>
+              <a:rPr lang="en-US" sz="3200" dirty="0" smtClean="0">
+                <a:latin typeface="+mj-lt"/>
+                <a:cs typeface="Times New Roman" pitchFamily="18" charset="0"/>
+              </a:rPr>
+              <a:t>available on </a:t>
+            </a:r>
+            <a:r>
+              <a:rPr lang="en-US" sz="3200" dirty="0" smtClean="0">
+                <a:latin typeface="+mj-lt"/>
+                <a:cs typeface="Times New Roman" pitchFamily="18" charset="0"/>
+              </a:rPr>
+              <a:t>UCI Machine Learning Repository</a:t>
             </a:r>
           </a:p>
           <a:p>
@@ -4849,54 +4661,63 @@
             </a:r>
           </a:p>
           <a:p>
+            <a:pPr marL="457200" indent="-457200" algn="just">
+              <a:buFont typeface="Arial" pitchFamily="34" charset="0"/>
+              <a:buChar char="•"/>
+            </a:pPr>
+            <a:r>
+              <a:rPr lang="en-US" sz="3200" dirty="0" smtClean="0">
+                <a:cs typeface="Times New Roman" pitchFamily="18" charset="0"/>
+              </a:rPr>
+              <a:t>Bimodal</a:t>
+            </a:r>
+          </a:p>
+          <a:p>
+            <a:pPr marL="457200" indent="-457200" algn="just">
+              <a:buFont typeface="Arial" pitchFamily="34" charset="0"/>
+              <a:buChar char="•"/>
+            </a:pPr>
+            <a:r>
+              <a:rPr lang="en-US" sz="3200" dirty="0" smtClean="0">
+                <a:cs typeface="Times New Roman" pitchFamily="18" charset="0"/>
+              </a:rPr>
+              <a:t>1040 instances (26 voice recordings from 40 participants)</a:t>
+            </a:r>
+          </a:p>
+          <a:p>
+            <a:pPr marL="457200" indent="-457200" algn="just">
+              <a:buFont typeface="Arial" pitchFamily="34" charset="0"/>
+              <a:buChar char="•"/>
+            </a:pPr>
+            <a:r>
+              <a:rPr lang="en-US" sz="3200" dirty="0" smtClean="0">
+                <a:cs typeface="Times New Roman" pitchFamily="18" charset="0"/>
+              </a:rPr>
+              <a:t>Class a priori probability 50%</a:t>
+            </a:r>
+          </a:p>
+          <a:p>
+            <a:pPr marL="457200" indent="-457200" algn="just">
+              <a:buFont typeface="Arial" pitchFamily="34" charset="0"/>
+              <a:buChar char="•"/>
+            </a:pPr>
+            <a:r>
+              <a:rPr lang="en-US" sz="3200" dirty="0" smtClean="0">
+                <a:cs typeface="Times New Roman" pitchFamily="18" charset="0"/>
+              </a:rPr>
+              <a:t>Labels: Presence of Parkinson’s Disease (1) or normal (0) </a:t>
+            </a:r>
+          </a:p>
+          <a:p>
+            <a:pPr marL="457200" indent="-457200" algn="just">
+              <a:buFont typeface="Arial" pitchFamily="34" charset="0"/>
+              <a:buChar char="•"/>
+            </a:pPr>
             <a:endParaRPr lang="en-US" sz="3200" dirty="0" smtClean="0">
               <a:latin typeface="+mj-lt"/>
               <a:cs typeface="Times New Roman" pitchFamily="18" charset="0"/>
             </a:endParaRPr>
           </a:p>
-          <a:p>
-            <a:endParaRPr lang="en-US" sz="3200" dirty="0" smtClean="0">
-              <a:latin typeface="+mj-lt"/>
-              <a:cs typeface="Times New Roman" pitchFamily="18" charset="0"/>
-            </a:endParaRPr>
-          </a:p>
-          <a:p>
-            <a:endParaRPr lang="en-US" sz="3200" dirty="0" smtClean="0">
-              <a:latin typeface="+mj-lt"/>
-              <a:cs typeface="Times New Roman" pitchFamily="18" charset="0"/>
-            </a:endParaRPr>
-          </a:p>
-          <a:p>
-            <a:endParaRPr lang="en-US" sz="3200" dirty="0" smtClean="0">
-              <a:latin typeface="+mj-lt"/>
-              <a:cs typeface="Times New Roman" pitchFamily="18" charset="0"/>
-            </a:endParaRPr>
-          </a:p>
-          <a:p>
-            <a:endParaRPr lang="en-US" sz="3200" dirty="0" smtClean="0">
-              <a:latin typeface="+mj-lt"/>
-              <a:cs typeface="Times New Roman" pitchFamily="18" charset="0"/>
-            </a:endParaRPr>
-          </a:p>
-          <a:p>
-            <a:endParaRPr lang="en-US" sz="3200" dirty="0" smtClean="0">
-              <a:latin typeface="+mj-lt"/>
-              <a:cs typeface="Times New Roman" pitchFamily="18" charset="0"/>
-            </a:endParaRPr>
-          </a:p>
-          <a:p>
-            <a:r>
-              <a:rPr lang="en-US" sz="3200" dirty="0" smtClean="0">
-                <a:latin typeface="+mj-lt"/>
-                <a:cs typeface="Times New Roman" pitchFamily="18" charset="0"/>
-              </a:rPr>
-              <a:t>From this, we decided to keep a-priori probability at 0.5 for all experiments</a:t>
-            </a:r>
-            <a:endParaRPr lang="en-US" sz="3200" dirty="0">
-              <a:latin typeface="+mj-lt"/>
-              <a:cs typeface="Times New Roman" pitchFamily="18" charset="0"/>
-            </a:endParaRPr>
-          </a:p>
         </p:txBody>
       </p:sp>
       <p:sp>
@@ -4907,8 +4728,8 @@
         </p:nvSpPr>
         <p:spPr>
           <a:xfrm>
-            <a:off x="692723" y="21478000"/>
-            <a:ext cx="12407680" cy="6986528"/>
+            <a:off x="682163" y="20675780"/>
+            <a:ext cx="12407680" cy="7632859"/>
           </a:xfrm>
           <a:prstGeom prst="rect">
             <a:avLst/>
@@ -4923,78 +4744,56 @@
           <a:p>
             <a:r>
               <a:rPr lang="en-US" sz="3200" dirty="0" smtClean="0"/>
-              <a:t>Want to choose a subset (&lt;700) as the</a:t>
-            </a:r>
+              <a:t>Want to choose a subset (&lt;700) as the “small” training dataset </a:t>
+            </a:r>
+          </a:p>
+          <a:p>
+            <a:endParaRPr lang="en-US" sz="3200" dirty="0" smtClean="0"/>
+          </a:p>
+          <a:p>
+            <a:endParaRPr lang="en-US" sz="3200" dirty="0" smtClean="0"/>
+          </a:p>
+          <a:p>
+            <a:endParaRPr lang="en-US" sz="3200" dirty="0" smtClean="0"/>
+          </a:p>
+          <a:p>
+            <a:endParaRPr lang="en-US" sz="3200" dirty="0" smtClean="0"/>
+          </a:p>
+          <a:p>
+            <a:endParaRPr lang="en-US" sz="3200" dirty="0" smtClean="0"/>
+          </a:p>
+          <a:p>
+            <a:endParaRPr lang="en-US" sz="3200" dirty="0" smtClean="0"/>
+          </a:p>
+          <a:p>
+            <a:endParaRPr lang="en-US" sz="3200" dirty="0" smtClean="0"/>
+          </a:p>
+          <a:p>
+            <a:endParaRPr lang="en-US" sz="3200" dirty="0" smtClean="0"/>
+          </a:p>
+          <a:p>
+            <a:endParaRPr lang="en-US" sz="3200" dirty="0" smtClean="0"/>
+          </a:p>
+          <a:p>
+            <a:endParaRPr lang="en-US" sz="3200" dirty="0" smtClean="0"/>
+          </a:p>
+          <a:p>
+            <a:endParaRPr lang="en-US" sz="1000" dirty="0" smtClean="0"/>
+          </a:p>
+          <a:p>
+            <a:endParaRPr lang="en-US" sz="3200" dirty="0" smtClean="0"/>
+          </a:p>
+          <a:p>
+            <a:endParaRPr lang="en-US" sz="3200" dirty="0" smtClean="0"/>
+          </a:p>
+          <a:p>
             <a:r>
               <a:rPr lang="en-US" sz="3200" dirty="0" smtClean="0"/>
-              <a:t> </a:t>
+              <a:t>Result: choose datasets of 100 instances for our “small” training </a:t>
             </a:r>
             <a:r>
               <a:rPr lang="en-US" sz="3200" dirty="0" smtClean="0"/>
-              <a:t>“small” </a:t>
-            </a:r>
-            <a:r>
-              <a:rPr lang="en-US" sz="3200" dirty="0" smtClean="0"/>
-              <a:t>training dataset </a:t>
-            </a:r>
-            <a:endParaRPr lang="en-US" sz="3200" dirty="0" smtClean="0"/>
-          </a:p>
-          <a:p>
-            <a:endParaRPr lang="en-US" sz="3200" dirty="0" smtClean="0"/>
-          </a:p>
-          <a:p>
-            <a:endParaRPr lang="en-US" sz="3200" dirty="0" smtClean="0"/>
-          </a:p>
-          <a:p>
-            <a:endParaRPr lang="en-US" sz="3200" dirty="0" smtClean="0"/>
-          </a:p>
-          <a:p>
-            <a:endParaRPr lang="en-US" sz="3200" dirty="0" smtClean="0"/>
-          </a:p>
-          <a:p>
-            <a:endParaRPr lang="en-US" sz="3200" dirty="0" smtClean="0"/>
-          </a:p>
-          <a:p>
-            <a:endParaRPr lang="en-US" sz="3200" dirty="0" smtClean="0"/>
-          </a:p>
-          <a:p>
-            <a:endParaRPr lang="en-US" sz="3200" dirty="0" smtClean="0"/>
-          </a:p>
-          <a:p>
-            <a:endParaRPr lang="en-US" sz="3200" dirty="0" smtClean="0"/>
-          </a:p>
-          <a:p>
-            <a:endParaRPr lang="en-US" sz="3200" dirty="0" smtClean="0"/>
-          </a:p>
-          <a:p>
-            <a:endParaRPr lang="en-US" sz="3200" dirty="0" smtClean="0"/>
-          </a:p>
-          <a:p>
-            <a:endParaRPr lang="en-US" sz="3200" dirty="0" smtClean="0"/>
-          </a:p>
-          <a:p>
-            <a:endParaRPr lang="en-US" sz="3200" dirty="0" smtClean="0"/>
-          </a:p>
-          <a:p>
-            <a:r>
-              <a:rPr lang="en-US" sz="3200" dirty="0" smtClean="0"/>
-              <a:t>Result: </a:t>
-            </a:r>
-            <a:r>
-              <a:rPr lang="en-US" sz="3200" dirty="0" smtClean="0"/>
-              <a:t>choose </a:t>
-            </a:r>
-            <a:r>
-              <a:rPr lang="en-US" sz="3200" dirty="0" smtClean="0"/>
-              <a:t>datasets of 100 instances for our </a:t>
-            </a:r>
-            <a:r>
-              <a:rPr lang="en-US" sz="3200" dirty="0" smtClean="0"/>
-              <a:t>“small” </a:t>
-            </a:r>
-            <a:r>
-              <a:rPr lang="en-US" sz="3200" dirty="0" smtClean="0"/>
-              <a:t>training dataset. </a:t>
+              <a:t>dataset. Note that this is approximately 4 time larger than number of instances. </a:t>
             </a:r>
             <a:endParaRPr lang="en-US" sz="3200" dirty="0"/>
           </a:p>
@@ -5009,7 +4808,7 @@
         <p:spPr>
           <a:xfrm>
             <a:off x="13649045" y="5389951"/>
-            <a:ext cx="22135993" cy="5582848"/>
+            <a:ext cx="10822005" cy="12403395"/>
           </a:xfrm>
           <a:prstGeom prst="rect">
             <a:avLst/>
@@ -5017,13 +4816,13 @@
           <a:noFill/>
         </p:spPr>
         <p:txBody>
-          <a:bodyPr wrap="square" numCol="4" spcCol="274320" rtlCol="0">
+          <a:bodyPr wrap="square" numCol="1" spcCol="274320" rtlCol="0">
             <a:spAutoFit/>
           </a:bodyPr>
           <a:lstStyle/>
           <a:p>
             <a:r>
-              <a:rPr lang="en-US" sz="3200" dirty="0" smtClean="0"/>
+              <a:rPr lang="en-US" sz="3200" u="sng" dirty="0" smtClean="0"/>
               <a:t>Bootstrapping</a:t>
             </a:r>
           </a:p>
@@ -5075,7 +4874,7 @@
           <a:p>
             <a:pPr marL="457200" indent="-457200"/>
             <a:r>
-              <a:rPr lang="en-US" sz="3200" dirty="0" smtClean="0">
+              <a:rPr lang="en-US" sz="3200" u="sng" dirty="0" smtClean="0">
                 <a:cs typeface="Times New Roman" pitchFamily="18" charset="0"/>
               </a:rPr>
               <a:t>Virtual Data Creation</a:t>
@@ -5127,6 +4926,66 @@
             </a:endParaRPr>
           </a:p>
           <a:p>
+            <a:pPr marL="457200" indent="-457200"/>
+            <a:r>
+              <a:rPr lang="en-US" sz="3200" u="sng" dirty="0" smtClean="0">
+                <a:cs typeface="Times New Roman" pitchFamily="18" charset="0"/>
+              </a:rPr>
+              <a:t>Principle </a:t>
+            </a:r>
+            <a:r>
+              <a:rPr lang="en-US" sz="3200" u="sng" dirty="0" smtClean="0">
+                <a:cs typeface="Times New Roman" pitchFamily="18" charset="0"/>
+              </a:rPr>
+              <a:t>Components Analysis</a:t>
+            </a:r>
+          </a:p>
+          <a:p>
+            <a:pPr marL="457200" indent="-457200">
+              <a:buFont typeface="Arial" pitchFamily="34" charset="0"/>
+              <a:buChar char="•"/>
+            </a:pPr>
+            <a:r>
+              <a:rPr lang="en-US" sz="3200" dirty="0" err="1" smtClean="0">
+                <a:cs typeface="Times New Roman" pitchFamily="18" charset="0"/>
+              </a:rPr>
+              <a:t>Lkjlkj</a:t>
+            </a:r>
+            <a:endParaRPr lang="en-US" sz="3200" dirty="0" smtClean="0">
+              <a:cs typeface="Times New Roman" pitchFamily="18" charset="0"/>
+            </a:endParaRPr>
+          </a:p>
+          <a:p>
+            <a:pPr marL="457200" indent="-457200">
+              <a:buFont typeface="Arial" pitchFamily="34" charset="0"/>
+              <a:buChar char="•"/>
+            </a:pPr>
+            <a:r>
+              <a:rPr lang="en-US" sz="3200" dirty="0" err="1" smtClean="0">
+                <a:cs typeface="Times New Roman" pitchFamily="18" charset="0"/>
+              </a:rPr>
+              <a:t>Lkjlkj</a:t>
+            </a:r>
+            <a:endParaRPr lang="en-US" sz="3200" dirty="0" smtClean="0">
+              <a:cs typeface="Times New Roman" pitchFamily="18" charset="0"/>
+            </a:endParaRPr>
+          </a:p>
+          <a:p>
+            <a:pPr marL="457200" indent="-457200">
+              <a:buFont typeface="Arial" pitchFamily="34" charset="0"/>
+              <a:buChar char="•"/>
+            </a:pPr>
+            <a:r>
+              <a:rPr lang="en-US" sz="3200" dirty="0" err="1" smtClean="0">
+                <a:cs typeface="Times New Roman" pitchFamily="18" charset="0"/>
+              </a:rPr>
+              <a:t>Lklklkj</a:t>
+            </a:r>
+            <a:endParaRPr lang="en-US" sz="3200" dirty="0" smtClean="0">
+              <a:cs typeface="Times New Roman" pitchFamily="18" charset="0"/>
+            </a:endParaRPr>
+          </a:p>
+          <a:p>
             <a:pPr marL="457200" indent="-457200">
               <a:buFont typeface="Arial" pitchFamily="34" charset="0"/>
               <a:buChar char="•"/>
@@ -5136,6 +4995,66 @@
             </a:endParaRPr>
           </a:p>
           <a:p>
+            <a:pPr marL="457200" indent="-457200"/>
+            <a:r>
+              <a:rPr lang="en-US" sz="3200" u="sng" dirty="0" err="1" smtClean="0">
+                <a:cs typeface="Times New Roman" pitchFamily="18" charset="0"/>
+              </a:rPr>
+              <a:t>GoDec</a:t>
+            </a:r>
+            <a:r>
+              <a:rPr lang="en-US" sz="3200" u="sng" dirty="0" smtClean="0">
+                <a:cs typeface="Times New Roman" pitchFamily="18" charset="0"/>
+              </a:rPr>
+              <a:t> (Robust PCA)</a:t>
+            </a:r>
+          </a:p>
+          <a:p>
+            <a:pPr marL="457200" indent="-457200">
+              <a:buFont typeface="Arial" pitchFamily="34" charset="0"/>
+              <a:buChar char="•"/>
+            </a:pPr>
+            <a:r>
+              <a:rPr lang="en-US" sz="3200" dirty="0" err="1" smtClean="0">
+                <a:cs typeface="Times New Roman" pitchFamily="18" charset="0"/>
+              </a:rPr>
+              <a:t>Ljlk</a:t>
+            </a:r>
+            <a:endParaRPr lang="en-US" sz="3200" dirty="0" smtClean="0">
+              <a:cs typeface="Times New Roman" pitchFamily="18" charset="0"/>
+            </a:endParaRPr>
+          </a:p>
+          <a:p>
+            <a:pPr marL="457200" indent="-457200">
+              <a:buFont typeface="Arial" pitchFamily="34" charset="0"/>
+              <a:buChar char="•"/>
+            </a:pPr>
+            <a:r>
+              <a:rPr lang="en-US" sz="3200" dirty="0" err="1" smtClean="0">
+                <a:cs typeface="Times New Roman" pitchFamily="18" charset="0"/>
+              </a:rPr>
+              <a:t>Ljlkj</a:t>
+            </a:r>
+            <a:endParaRPr lang="en-US" sz="3200" dirty="0" smtClean="0">
+              <a:cs typeface="Times New Roman" pitchFamily="18" charset="0"/>
+            </a:endParaRPr>
+          </a:p>
+          <a:p>
+            <a:pPr marL="457200" indent="-457200">
+              <a:buFont typeface="Arial" pitchFamily="34" charset="0"/>
+              <a:buChar char="•"/>
+            </a:pPr>
+            <a:r>
+              <a:rPr lang="en-US" sz="3200" dirty="0" err="1" smtClean="0">
+                <a:cs typeface="Times New Roman" pitchFamily="18" charset="0"/>
+              </a:rPr>
+              <a:t>Lkjlkj</a:t>
+            </a:r>
+            <a:endParaRPr lang="en-US" sz="3200" dirty="0" smtClean="0">
+              <a:cs typeface="Times New Roman" pitchFamily="18" charset="0"/>
+            </a:endParaRPr>
+          </a:p>
+          <a:p>
             <a:pPr marL="457200" indent="-457200">
               <a:buFont typeface="Arial" pitchFamily="34" charset="0"/>
               <a:buChar char="•"/>
@@ -5155,161 +5074,23 @@
           </a:p>
           <a:p>
             <a:pPr marL="457200" indent="-457200"/>
-            <a:r>
-              <a:rPr lang="en-US" sz="3200" dirty="0" smtClean="0">
-                <a:cs typeface="Times New Roman" pitchFamily="18" charset="0"/>
-              </a:rPr>
-              <a:t>Principle Components Analysis</a:t>
-            </a:r>
-          </a:p>
-          <a:p>
-            <a:pPr marL="457200" indent="-457200">
-              <a:buFont typeface="Arial" pitchFamily="34" charset="0"/>
-              <a:buChar char="•"/>
-            </a:pPr>
-            <a:r>
-              <a:rPr lang="en-US" sz="3200" dirty="0" err="1" smtClean="0">
-                <a:cs typeface="Times New Roman" pitchFamily="18" charset="0"/>
-              </a:rPr>
-              <a:t>Lkjlkj</a:t>
-            </a:r>
             <a:endParaRPr lang="en-US" sz="3200" dirty="0" smtClean="0">
               <a:cs typeface="Times New Roman" pitchFamily="18" charset="0"/>
             </a:endParaRPr>
           </a:p>
           <a:p>
-            <a:pPr marL="457200" indent="-457200">
-              <a:buFont typeface="Arial" pitchFamily="34" charset="0"/>
-              <a:buChar char="•"/>
-            </a:pPr>
-            <a:r>
-              <a:rPr lang="en-US" sz="3200" dirty="0" err="1" smtClean="0">
-                <a:cs typeface="Times New Roman" pitchFamily="18" charset="0"/>
-              </a:rPr>
-              <a:t>Lkjlkj</a:t>
-            </a:r>
+            <a:pPr marL="457200" indent="-457200"/>
             <a:endParaRPr lang="en-US" sz="3200" dirty="0" smtClean="0">
               <a:cs typeface="Times New Roman" pitchFamily="18" charset="0"/>
             </a:endParaRPr>
           </a:p>
           <a:p>
-            <a:pPr marL="457200" indent="-457200">
-              <a:buFont typeface="Arial" pitchFamily="34" charset="0"/>
-              <a:buChar char="•"/>
-            </a:pPr>
-            <a:r>
-              <a:rPr lang="en-US" sz="3200" dirty="0" err="1" smtClean="0">
-                <a:cs typeface="Times New Roman" pitchFamily="18" charset="0"/>
-              </a:rPr>
-              <a:t>Lklklkj</a:t>
-            </a:r>
-            <a:endParaRPr lang="en-US" sz="3200" dirty="0" smtClean="0">
-              <a:cs typeface="Times New Roman" pitchFamily="18" charset="0"/>
-            </a:endParaRPr>
-          </a:p>
-          <a:p>
-            <a:pPr marL="457200" indent="-457200">
-              <a:buFont typeface="Arial" pitchFamily="34" charset="0"/>
-              <a:buChar char="•"/>
-            </a:pPr>
-            <a:endParaRPr lang="en-US" sz="3200" dirty="0" smtClean="0">
-              <a:cs typeface="Times New Roman" pitchFamily="18" charset="0"/>
-            </a:endParaRPr>
-          </a:p>
-          <a:p>
-            <a:pPr marL="457200" indent="-457200">
-              <a:buFont typeface="Arial" pitchFamily="34" charset="0"/>
-              <a:buChar char="•"/>
-            </a:pPr>
-            <a:endParaRPr lang="en-US" sz="3200" dirty="0" smtClean="0">
-              <a:cs typeface="Times New Roman" pitchFamily="18" charset="0"/>
-            </a:endParaRPr>
-          </a:p>
-          <a:p>
-            <a:pPr marL="457200" indent="-457200">
-              <a:buFont typeface="Arial" pitchFamily="34" charset="0"/>
-              <a:buChar char="•"/>
-            </a:pPr>
-            <a:endParaRPr lang="en-US" sz="3200" dirty="0" smtClean="0">
-              <a:cs typeface="Times New Roman" pitchFamily="18" charset="0"/>
-            </a:endParaRPr>
-          </a:p>
-          <a:p>
-            <a:pPr marL="457200" indent="-457200">
-              <a:buFont typeface="Arial" pitchFamily="34" charset="0"/>
-              <a:buChar char="•"/>
-            </a:pPr>
-            <a:endParaRPr lang="en-US" sz="3200" dirty="0" smtClean="0">
-              <a:cs typeface="Times New Roman" pitchFamily="18" charset="0"/>
-            </a:endParaRPr>
-          </a:p>
-          <a:p>
-            <a:pPr marL="457200" indent="-457200">
-              <a:buFont typeface="Arial" pitchFamily="34" charset="0"/>
-              <a:buChar char="•"/>
-            </a:pPr>
-            <a:endParaRPr lang="en-US" sz="3200" dirty="0" smtClean="0">
-              <a:cs typeface="Times New Roman" pitchFamily="18" charset="0"/>
-            </a:endParaRPr>
-          </a:p>
-          <a:p>
-            <a:pPr marL="457200" indent="-457200">
-              <a:buFont typeface="Arial" pitchFamily="34" charset="0"/>
-              <a:buChar char="•"/>
-            </a:pPr>
-            <a:endParaRPr lang="en-US" sz="3200" dirty="0" smtClean="0">
-              <a:cs typeface="Times New Roman" pitchFamily="18" charset="0"/>
-            </a:endParaRPr>
-          </a:p>
-          <a:p>
-            <a:pPr marL="457200" indent="-457200">
-              <a:buFont typeface="Arial" pitchFamily="34" charset="0"/>
-              <a:buChar char="•"/>
-            </a:pPr>
-            <a:endParaRPr lang="en-US" sz="3200" dirty="0" smtClean="0">
-              <a:cs typeface="Times New Roman" pitchFamily="18" charset="0"/>
-            </a:endParaRPr>
-          </a:p>
-          <a:p>
             <a:pPr marL="457200" indent="-457200"/>
             <a:r>
-              <a:rPr lang="en-US" sz="3200" dirty="0" err="1" smtClean="0">
-                <a:cs typeface="Times New Roman" pitchFamily="18" charset="0"/>
-              </a:rPr>
-              <a:t>GoDec</a:t>
-            </a:r>
-            <a:r>
               <a:rPr lang="en-US" sz="3200" dirty="0" smtClean="0">
                 <a:cs typeface="Times New Roman" pitchFamily="18" charset="0"/>
               </a:rPr>
-              <a:t> (Robust PCA)</a:t>
-            </a:r>
-          </a:p>
-          <a:p>
-            <a:pPr marL="457200" indent="-457200">
-              <a:buFont typeface="Arial" pitchFamily="34" charset="0"/>
-              <a:buChar char="•"/>
-            </a:pPr>
-            <a:r>
-              <a:rPr lang="en-US" sz="3200" dirty="0" err="1" smtClean="0">
-                <a:cs typeface="Times New Roman" pitchFamily="18" charset="0"/>
-              </a:rPr>
-              <a:t>Ljlk</a:t>
-            </a:r>
-            <a:endParaRPr lang="en-US" sz="3200" dirty="0" smtClean="0">
-              <a:cs typeface="Times New Roman" pitchFamily="18" charset="0"/>
-            </a:endParaRPr>
-          </a:p>
-          <a:p>
-            <a:pPr marL="457200" indent="-457200">
-              <a:buFont typeface="Arial" pitchFamily="34" charset="0"/>
-              <a:buChar char="•"/>
-            </a:pPr>
-            <a:r>
-              <a:rPr lang="en-US" sz="3200" dirty="0" err="1" smtClean="0">
-                <a:cs typeface="Times New Roman" pitchFamily="18" charset="0"/>
-              </a:rPr>
-              <a:t>ljlkj</a:t>
+              <a:t>Experimentation Procedures: insert graphic here??</a:t>
             </a:r>
             <a:endParaRPr lang="en-US" sz="3200" dirty="0" smtClean="0"/>
           </a:p>
@@ -5332,7 +5113,7 @@
         </p:blipFill>
         <p:spPr bwMode="auto">
           <a:xfrm>
-            <a:off x="1708723" y="21957912"/>
+            <a:off x="1708723" y="21253062"/>
             <a:ext cx="5098477" cy="2911490"/>
           </a:xfrm>
           <a:prstGeom prst="rect">
@@ -5358,7 +5139,7 @@
         </p:blipFill>
         <p:spPr bwMode="auto">
           <a:xfrm>
-            <a:off x="7053322" y="21999952"/>
+            <a:off x="7053322" y="21295102"/>
             <a:ext cx="5059538" cy="2909938"/>
           </a:xfrm>
           <a:prstGeom prst="rect">
@@ -5384,7 +5165,7 @@
         </p:blipFill>
         <p:spPr bwMode="auto">
           <a:xfrm>
-            <a:off x="1708723" y="25050252"/>
+            <a:off x="1708723" y="24345402"/>
             <a:ext cx="5098477" cy="2908173"/>
           </a:xfrm>
           <a:prstGeom prst="rect">
@@ -5410,7 +5191,7 @@
         </p:blipFill>
         <p:spPr bwMode="auto">
           <a:xfrm>
-            <a:off x="7053322" y="25050252"/>
+            <a:off x="7053322" y="24345402"/>
             <a:ext cx="5059538" cy="2911489"/>
           </a:xfrm>
           <a:prstGeom prst="rect">
@@ -5419,6 +5200,378 @@
           <a:noFill/>
         </p:spPr>
       </p:pic>
+      <p:sp>
+        <p:nvSpPr>
+          <p:cNvPr id="38" name="Text Box 7"/>
+          <p:cNvSpPr txBox="1">
+            <a:spLocks noChangeArrowheads="1"/>
+          </p:cNvSpPr>
+          <p:nvPr/>
+        </p:nvSpPr>
+        <p:spPr bwMode="auto">
+          <a:xfrm>
+            <a:off x="24882326" y="16590663"/>
+            <a:ext cx="10856838" cy="632970"/>
+          </a:xfrm>
+          <a:prstGeom prst="rect">
+            <a:avLst/>
+          </a:prstGeom>
+          <a:solidFill>
+            <a:srgbClr val="213F93"/>
+          </a:solidFill>
+          <a:ln w="9525">
+            <a:noFill/>
+            <a:miter lim="800000"/>
+            <a:headEnd/>
+            <a:tailEnd/>
+          </a:ln>
+        </p:spPr>
+        <p:txBody>
+          <a:bodyPr wrap="square" lIns="78225" tIns="39104" rIns="78225" bIns="39104">
+            <a:prstTxWarp prst="textNoShape">
+              <a:avLst/>
+            </a:prstTxWarp>
+            <a:spAutoFit/>
+          </a:bodyPr>
+          <a:lstStyle/>
+          <a:p>
+            <a:pPr algn="ctr" eaLnBrk="0" hangingPunct="0">
+              <a:spcBef>
+                <a:spcPct val="50000"/>
+              </a:spcBef>
+            </a:pPr>
+            <a:r>
+              <a:rPr lang="en-US" sz="3600" b="1" dirty="0" smtClean="0">
+                <a:solidFill>
+                  <a:srgbClr val="F8F8F8"/>
+                </a:solidFill>
+                <a:latin typeface="+mj-lt"/>
+                <a:cs typeface="Times New Roman" pitchFamily="18" charset="0"/>
+              </a:rPr>
+              <a:t>Remaining Work</a:t>
+            </a:r>
+            <a:endParaRPr lang="en-US" sz="3600" b="1" dirty="0">
+              <a:solidFill>
+                <a:srgbClr val="F8F8F8"/>
+              </a:solidFill>
+              <a:latin typeface="+mj-lt"/>
+              <a:cs typeface="Times New Roman" pitchFamily="18" charset="0"/>
+            </a:endParaRPr>
+          </a:p>
+        </p:txBody>
+      </p:sp>
+      <p:sp>
+        <p:nvSpPr>
+          <p:cNvPr id="39" name="Rectangle 38"/>
+          <p:cNvSpPr/>
+          <p:nvPr/>
+        </p:nvSpPr>
+        <p:spPr>
+          <a:xfrm>
+            <a:off x="24896321" y="17208437"/>
+            <a:ext cx="10860529" cy="5613463"/>
+          </a:xfrm>
+          <a:prstGeom prst="rect">
+            <a:avLst/>
+          </a:prstGeom>
+          <a:solidFill>
+            <a:srgbClr val="FFFFFF"/>
+          </a:solidFill>
+          <a:ln>
+            <a:noFill/>
+          </a:ln>
+          <a:effectLst/>
+        </p:spPr>
+        <p:style>
+          <a:lnRef idx="1">
+            <a:schemeClr val="accent1"/>
+          </a:lnRef>
+          <a:fillRef idx="3">
+            <a:schemeClr val="accent1"/>
+          </a:fillRef>
+          <a:effectRef idx="2">
+            <a:schemeClr val="accent1"/>
+          </a:effectRef>
+          <a:fontRef idx="minor">
+            <a:schemeClr val="lt1"/>
+          </a:fontRef>
+        </p:style>
+        <p:txBody>
+          <a:bodyPr rtlCol="0" anchor="ctr"/>
+          <a:lstStyle/>
+          <a:p>
+            <a:pPr algn="ctr"/>
+            <a:endParaRPr lang="en-US" dirty="0">
+              <a:latin typeface="+mj-lt"/>
+              <a:cs typeface="Times New Roman" pitchFamily="18" charset="0"/>
+            </a:endParaRPr>
+          </a:p>
+        </p:txBody>
+      </p:sp>
+      <p:sp>
+        <p:nvSpPr>
+          <p:cNvPr id="40" name="Text Box 7"/>
+          <p:cNvSpPr txBox="1">
+            <a:spLocks noChangeArrowheads="1"/>
+          </p:cNvSpPr>
+          <p:nvPr/>
+        </p:nvSpPr>
+        <p:spPr bwMode="auto">
+          <a:xfrm>
+            <a:off x="24882327" y="4742018"/>
+            <a:ext cx="10847274" cy="647932"/>
+          </a:xfrm>
+          <a:prstGeom prst="rect">
+            <a:avLst/>
+          </a:prstGeom>
+          <a:solidFill>
+            <a:srgbClr val="213F93"/>
+          </a:solidFill>
+          <a:ln w="9525">
+            <a:noFill/>
+            <a:miter lim="800000"/>
+            <a:headEnd/>
+            <a:tailEnd/>
+          </a:ln>
+        </p:spPr>
+        <p:txBody>
+          <a:bodyPr wrap="square" lIns="78225" tIns="39104" rIns="78225" bIns="39104">
+            <a:prstTxWarp prst="textNoShape">
+              <a:avLst/>
+            </a:prstTxWarp>
+            <a:spAutoFit/>
+          </a:bodyPr>
+          <a:lstStyle/>
+          <a:p>
+            <a:pPr algn="ctr" eaLnBrk="0" hangingPunct="0">
+              <a:spcBef>
+                <a:spcPct val="50000"/>
+              </a:spcBef>
+            </a:pPr>
+            <a:r>
+              <a:rPr lang="en-US" sz="3600" b="1" dirty="0" smtClean="0">
+                <a:solidFill>
+                  <a:srgbClr val="F8F8F8"/>
+                </a:solidFill>
+                <a:latin typeface="+mj-lt"/>
+                <a:cs typeface="Times New Roman" pitchFamily="18" charset="0"/>
+              </a:rPr>
+              <a:t>Results</a:t>
+            </a:r>
+            <a:endParaRPr lang="en-US" sz="3600" b="1" dirty="0">
+              <a:solidFill>
+                <a:srgbClr val="F8F8F8"/>
+              </a:solidFill>
+              <a:latin typeface="+mj-lt"/>
+              <a:cs typeface="Times New Roman" pitchFamily="18" charset="0"/>
+            </a:endParaRPr>
+          </a:p>
+        </p:txBody>
+      </p:sp>
+      <p:sp>
+        <p:nvSpPr>
+          <p:cNvPr id="41" name="Text Box 7"/>
+          <p:cNvSpPr txBox="1">
+            <a:spLocks noChangeArrowheads="1"/>
+          </p:cNvSpPr>
+          <p:nvPr/>
+        </p:nvSpPr>
+        <p:spPr bwMode="auto">
+          <a:xfrm>
+            <a:off x="24907595" y="23303069"/>
+            <a:ext cx="10881961" cy="694525"/>
+          </a:xfrm>
+          <a:prstGeom prst="rect">
+            <a:avLst/>
+          </a:prstGeom>
+          <a:solidFill>
+            <a:srgbClr val="213F93"/>
+          </a:solidFill>
+          <a:ln w="9525">
+            <a:noFill/>
+            <a:miter lim="800000"/>
+            <a:headEnd/>
+            <a:tailEnd/>
+          </a:ln>
+        </p:spPr>
+        <p:txBody>
+          <a:bodyPr wrap="square" lIns="78225" tIns="39104" rIns="78225" bIns="39104">
+            <a:prstTxWarp prst="textNoShape">
+              <a:avLst/>
+            </a:prstTxWarp>
+            <a:spAutoFit/>
+          </a:bodyPr>
+          <a:lstStyle/>
+          <a:p>
+            <a:pPr algn="ctr" eaLnBrk="0" hangingPunct="0">
+              <a:spcBef>
+                <a:spcPct val="50000"/>
+              </a:spcBef>
+            </a:pPr>
+            <a:r>
+              <a:rPr lang="en-US" sz="4000" b="1" dirty="0" smtClean="0">
+                <a:solidFill>
+                  <a:srgbClr val="F8F8F8"/>
+                </a:solidFill>
+                <a:latin typeface="+mj-lt"/>
+                <a:cs typeface="Times New Roman" pitchFamily="18" charset="0"/>
+              </a:rPr>
+              <a:t>References</a:t>
+            </a:r>
+            <a:endParaRPr lang="en-US" sz="4000" b="1" dirty="0">
+              <a:solidFill>
+                <a:srgbClr val="F8F8F8"/>
+              </a:solidFill>
+              <a:latin typeface="+mj-lt"/>
+              <a:cs typeface="Times New Roman" pitchFamily="18" charset="0"/>
+            </a:endParaRPr>
+          </a:p>
+        </p:txBody>
+      </p:sp>
+      <p:sp>
+        <p:nvSpPr>
+          <p:cNvPr id="42" name="Rectangle 41"/>
+          <p:cNvSpPr/>
+          <p:nvPr/>
+        </p:nvSpPr>
+        <p:spPr>
+          <a:xfrm>
+            <a:off x="24907595" y="23997594"/>
+            <a:ext cx="10881961" cy="4466934"/>
+          </a:xfrm>
+          <a:prstGeom prst="rect">
+            <a:avLst/>
+          </a:prstGeom>
+          <a:solidFill>
+            <a:srgbClr val="FFFFFF"/>
+          </a:solidFill>
+          <a:ln>
+            <a:noFill/>
+          </a:ln>
+          <a:effectLst/>
+        </p:spPr>
+        <p:style>
+          <a:lnRef idx="1">
+            <a:schemeClr val="accent1"/>
+          </a:lnRef>
+          <a:fillRef idx="3">
+            <a:schemeClr val="accent1"/>
+          </a:fillRef>
+          <a:effectRef idx="2">
+            <a:schemeClr val="accent1"/>
+          </a:effectRef>
+          <a:fontRef idx="minor">
+            <a:schemeClr val="lt1"/>
+          </a:fontRef>
+        </p:style>
+        <p:txBody>
+          <a:bodyPr rtlCol="0" anchor="ctr"/>
+          <a:lstStyle/>
+          <a:p>
+            <a:pPr algn="ctr"/>
+            <a:endParaRPr lang="en-US" dirty="0">
+              <a:latin typeface="+mj-lt"/>
+              <a:cs typeface="Times New Roman" pitchFamily="18" charset="0"/>
+            </a:endParaRPr>
+          </a:p>
+        </p:txBody>
+      </p:sp>
+      <p:sp>
+        <p:nvSpPr>
+          <p:cNvPr id="44" name="Rectangle 43"/>
+          <p:cNvSpPr/>
+          <p:nvPr/>
+        </p:nvSpPr>
+        <p:spPr>
+          <a:xfrm>
+            <a:off x="24844227" y="5375958"/>
+            <a:ext cx="10856838" cy="10778442"/>
+          </a:xfrm>
+          <a:prstGeom prst="rect">
+            <a:avLst/>
+          </a:prstGeom>
+          <a:solidFill>
+            <a:srgbClr val="FFFFFF"/>
+          </a:solidFill>
+          <a:ln>
+            <a:noFill/>
+          </a:ln>
+          <a:effectLst/>
+        </p:spPr>
+        <p:style>
+          <a:lnRef idx="1">
+            <a:schemeClr val="accent1"/>
+          </a:lnRef>
+          <a:fillRef idx="3">
+            <a:schemeClr val="accent1"/>
+          </a:fillRef>
+          <a:effectRef idx="2">
+            <a:schemeClr val="accent1"/>
+          </a:effectRef>
+          <a:fontRef idx="minor">
+            <a:schemeClr val="lt1"/>
+          </a:fontRef>
+        </p:style>
+        <p:txBody>
+          <a:bodyPr rtlCol="0" anchor="ctr"/>
+          <a:lstStyle/>
+          <a:p>
+            <a:pPr algn="ctr"/>
+            <a:endParaRPr lang="en-US">
+              <a:latin typeface="+mj-lt"/>
+              <a:cs typeface="Times New Roman" pitchFamily="18" charset="0"/>
+            </a:endParaRPr>
+          </a:p>
+        </p:txBody>
+      </p:sp>
+      <p:sp>
+        <p:nvSpPr>
+          <p:cNvPr id="47" name="TextBox 46"/>
+          <p:cNvSpPr txBox="1"/>
+          <p:nvPr/>
+        </p:nvSpPr>
+        <p:spPr>
+          <a:xfrm>
+            <a:off x="24907596" y="23997594"/>
+            <a:ext cx="10881960" cy="1015663"/>
+          </a:xfrm>
+          <a:prstGeom prst="rect">
+            <a:avLst/>
+          </a:prstGeom>
+          <a:noFill/>
+        </p:spPr>
+        <p:txBody>
+          <a:bodyPr wrap="square" rtlCol="0">
+            <a:spAutoFit/>
+          </a:bodyPr>
+          <a:lstStyle/>
+          <a:p>
+            <a:r>
+              <a:rPr lang="en-US" sz="2000" dirty="0" smtClean="0"/>
+              <a:t>[1] B. E. </a:t>
+            </a:r>
+            <a:r>
+              <a:rPr lang="en-US" sz="2000" dirty="0" err="1" smtClean="0"/>
+              <a:t>Sakar</a:t>
+            </a:r>
+            <a:r>
+              <a:rPr lang="en-US" sz="2000" dirty="0" smtClean="0"/>
+              <a:t> </a:t>
+            </a:r>
+            <a:r>
+              <a:rPr lang="en-US" sz="2000" i="1" dirty="0" smtClean="0"/>
+              <a:t>et al</a:t>
+            </a:r>
+            <a:r>
+              <a:rPr lang="en-US" sz="2000" dirty="0" smtClean="0"/>
+              <a:t>. “Collection and analysis of a Parkinson speech dataset with multiple types of sound recordings,” IEEE Journal of Biomedical and Health Informatics, vol. 17, no. 4, pp. 828-834, 2013.  </a:t>
+            </a:r>
+          </a:p>
+          <a:p>
+            <a:endParaRPr lang="en-US" sz="2000" dirty="0"/>
+          </a:p>
+        </p:txBody>
+      </p:sp>
     </p:spTree>
   </p:cSld>
   <p:clrMapOvr>

</xml_diff>

<commit_message>
Added entries to PCA and GoDec sections
</commit_message>
<xml_diff>
--- a/POSTER.pptx
+++ b/POSTER.pptx
@@ -12,22 +12,6 @@
   </p:sldIdLst>
   <p:sldSz cx="36576000" cy="29260800"/>
   <p:notesSz cx="6858000" cy="9144000"/>
-  <p:embeddedFontLst>
-    <p:embeddedFont>
-      <p:font typeface="Calibri" pitchFamily="34" charset="0"/>
-      <p:regular r:id="rId4"/>
-      <p:bold r:id="rId5"/>
-      <p:italic r:id="rId6"/>
-      <p:boldItalic r:id="rId7"/>
-    </p:embeddedFont>
-    <p:embeddedFont>
-      <p:font typeface="Verdana" pitchFamily="34" charset="0"/>
-      <p:regular r:id="rId8"/>
-      <p:bold r:id="rId9"/>
-      <p:italic r:id="rId10"/>
-      <p:boldItalic r:id="rId11"/>
-    </p:embeddedFont>
-  </p:embeddedFontLst>
   <p:defaultTextStyle>
     <a:defPPr>
       <a:defRPr lang="en-US"/>
@@ -125,7 +109,7 @@
   </p:defaultTextStyle>
   <p:extLst>
     <p:ext uri="{EFAFB233-063F-42B5-8137-9DF3F51BA10A}">
-      <p15:sldGuideLst xmlns:p15="http://schemas.microsoft.com/office/powerpoint/2012/main" xmlns="">
+      <p15:sldGuideLst xmlns="" xmlns:p15="http://schemas.microsoft.com/office/powerpoint/2012/main">
         <p15:guide id="1" orient="horz" pos="9216">
           <p15:clr>
             <a:srgbClr val="A4A3A4"/>
@@ -225,7 +209,7 @@
             <a:fld id="{CF0F9DC3-4130-4410-BC95-2E6916856B54}" type="datetimeFigureOut">
               <a:rPr lang="en-US" smtClean="0"/>
               <a:pPr/>
-              <a:t>4/21/2015</a:t>
+              <a:t>4/21/15</a:t>
             </a:fld>
             <a:endParaRPr lang="en-US"/>
           </a:p>
@@ -394,7 +378,7 @@
     </p:spTree>
     <p:extLst>
       <p:ext uri="{BB962C8B-B14F-4D97-AF65-F5344CB8AC3E}">
-        <p14:creationId xmlns:p14="http://schemas.microsoft.com/office/powerpoint/2010/main" xmlns="" val="2325757360"/>
+        <p14:creationId xmlns:p14="http://schemas.microsoft.com/office/powerpoint/2010/main" val="2325757360"/>
       </p:ext>
     </p:extLst>
   </p:cSld>
@@ -569,7 +553,7 @@
     </p:spTree>
     <p:extLst>
       <p:ext uri="{BB962C8B-B14F-4D97-AF65-F5344CB8AC3E}">
-        <p14:creationId xmlns:p14="http://schemas.microsoft.com/office/powerpoint/2010/main" xmlns="" val="1271015422"/>
+        <p14:creationId xmlns:p14="http://schemas.microsoft.com/office/powerpoint/2010/main" val="1271015422"/>
       </p:ext>
     </p:extLst>
   </p:cSld>
@@ -761,7 +745,7 @@
             <a:fld id="{22106B1F-BB0B-234F-B643-9D3F8052ABA9}" type="datetimeFigureOut">
               <a:rPr lang="en-US" smtClean="0"/>
               <a:pPr/>
-              <a:t>4/21/2015</a:t>
+              <a:t>4/21/15</a:t>
             </a:fld>
             <a:endParaRPr lang="en-US"/>
           </a:p>
@@ -928,7 +912,7 @@
             <a:fld id="{22106B1F-BB0B-234F-B643-9D3F8052ABA9}" type="datetimeFigureOut">
               <a:rPr lang="en-US" smtClean="0"/>
               <a:pPr/>
-              <a:t>4/21/2015</a:t>
+              <a:t>4/21/15</a:t>
             </a:fld>
             <a:endParaRPr lang="en-US"/>
           </a:p>
@@ -1105,7 +1089,7 @@
             <a:fld id="{22106B1F-BB0B-234F-B643-9D3F8052ABA9}" type="datetimeFigureOut">
               <a:rPr lang="en-US" smtClean="0"/>
               <a:pPr/>
-              <a:t>4/21/2015</a:t>
+              <a:t>4/21/15</a:t>
             </a:fld>
             <a:endParaRPr lang="en-US"/>
           </a:p>
@@ -1272,7 +1256,7 @@
             <a:fld id="{22106B1F-BB0B-234F-B643-9D3F8052ABA9}" type="datetimeFigureOut">
               <a:rPr lang="en-US" smtClean="0"/>
               <a:pPr/>
-              <a:t>4/21/2015</a:t>
+              <a:t>4/21/15</a:t>
             </a:fld>
             <a:endParaRPr lang="en-US"/>
           </a:p>
@@ -1515,7 +1499,7 @@
             <a:fld id="{22106B1F-BB0B-234F-B643-9D3F8052ABA9}" type="datetimeFigureOut">
               <a:rPr lang="en-US" smtClean="0"/>
               <a:pPr/>
-              <a:t>4/21/2015</a:t>
+              <a:t>4/21/15</a:t>
             </a:fld>
             <a:endParaRPr lang="en-US"/>
           </a:p>
@@ -1800,7 +1784,7 @@
             <a:fld id="{22106B1F-BB0B-234F-B643-9D3F8052ABA9}" type="datetimeFigureOut">
               <a:rPr lang="en-US" smtClean="0"/>
               <a:pPr/>
-              <a:t>4/21/2015</a:t>
+              <a:t>4/21/15</a:t>
             </a:fld>
             <a:endParaRPr lang="en-US"/>
           </a:p>
@@ -2219,7 +2203,7 @@
             <a:fld id="{22106B1F-BB0B-234F-B643-9D3F8052ABA9}" type="datetimeFigureOut">
               <a:rPr lang="en-US" smtClean="0"/>
               <a:pPr/>
-              <a:t>4/21/2015</a:t>
+              <a:t>4/21/15</a:t>
             </a:fld>
             <a:endParaRPr lang="en-US"/>
           </a:p>
@@ -2334,7 +2318,7 @@
             <a:fld id="{22106B1F-BB0B-234F-B643-9D3F8052ABA9}" type="datetimeFigureOut">
               <a:rPr lang="en-US" smtClean="0"/>
               <a:pPr/>
-              <a:t>4/21/2015</a:t>
+              <a:t>4/21/15</a:t>
             </a:fld>
             <a:endParaRPr lang="en-US"/>
           </a:p>
@@ -2426,7 +2410,7 @@
             <a:fld id="{22106B1F-BB0B-234F-B643-9D3F8052ABA9}" type="datetimeFigureOut">
               <a:rPr lang="en-US" smtClean="0"/>
               <a:pPr/>
-              <a:t>4/21/2015</a:t>
+              <a:t>4/21/15</a:t>
             </a:fld>
             <a:endParaRPr lang="en-US"/>
           </a:p>
@@ -2700,7 +2684,7 @@
             <a:fld id="{22106B1F-BB0B-234F-B643-9D3F8052ABA9}" type="datetimeFigureOut">
               <a:rPr lang="en-US" smtClean="0"/>
               <a:pPr/>
-              <a:t>4/21/2015</a:t>
+              <a:t>4/21/15</a:t>
             </a:fld>
             <a:endParaRPr lang="en-US"/>
           </a:p>
@@ -2950,7 +2934,7 @@
             <a:fld id="{22106B1F-BB0B-234F-B643-9D3F8052ABA9}" type="datetimeFigureOut">
               <a:rPr lang="en-US" smtClean="0"/>
               <a:pPr/>
-              <a:t>4/21/2015</a:t>
+              <a:t>4/21/15</a:t>
             </a:fld>
             <a:endParaRPr lang="en-US"/>
           </a:p>
@@ -3160,7 +3144,7 @@
             <a:fld id="{22106B1F-BB0B-234F-B643-9D3F8052ABA9}" type="datetimeFigureOut">
               <a:rPr lang="en-US" smtClean="0"/>
               <a:pPr/>
-              <a:t>4/21/2015</a:t>
+              <a:t>4/21/15</a:t>
             </a:fld>
             <a:endParaRPr lang="en-US"/>
           </a:p>
@@ -4628,21 +4612,7 @@
                 <a:latin typeface="+mj-lt"/>
                 <a:cs typeface="Times New Roman" pitchFamily="18" charset="0"/>
               </a:rPr>
-              <a:t> </a:t>
-            </a:r>
-            <a:r>
-              <a:rPr lang="en-US" sz="3200" dirty="0" smtClean="0">
-                <a:latin typeface="+mj-lt"/>
-                <a:cs typeface="Times New Roman" pitchFamily="18" charset="0"/>
-              </a:rPr>
-              <a:t>available on </a:t>
-            </a:r>
-            <a:r>
-              <a:rPr lang="en-US" sz="3200" dirty="0" smtClean="0">
-                <a:latin typeface="+mj-lt"/>
-                <a:cs typeface="Times New Roman" pitchFamily="18" charset="0"/>
-              </a:rPr>
-              <a:t>UCI Machine Learning Repository</a:t>
+              <a:t> available on UCI Machine Learning Repository</a:t>
             </a:r>
           </a:p>
           <a:p>
@@ -4789,11 +4759,7 @@
           <a:p>
             <a:r>
               <a:rPr lang="en-US" sz="3200" dirty="0" smtClean="0"/>
-              <a:t>Result: choose datasets of 100 instances for our “small” training </a:t>
-            </a:r>
-            <a:r>
-              <a:rPr lang="en-US" sz="3200" dirty="0" smtClean="0"/>
-              <a:t>dataset. Note that this is approximately 4 time larger than number of instances. </a:t>
+              <a:t>Result: choose datasets of 100 instances for our “small” training dataset. Note that this is approximately 4 time larger than number of instances. </a:t>
             </a:r>
             <a:endParaRPr lang="en-US" sz="3200" dirty="0"/>
           </a:p>
@@ -4808,7 +4774,7 @@
         <p:spPr>
           <a:xfrm>
             <a:off x="13649045" y="5389951"/>
-            <a:ext cx="10822005" cy="12403395"/>
+            <a:ext cx="10822005" cy="13388285"/>
           </a:xfrm>
           <a:prstGeom prst="rect">
             <a:avLst/>
@@ -4931,13 +4897,7 @@
               <a:rPr lang="en-US" sz="3200" u="sng" dirty="0" smtClean="0">
                 <a:cs typeface="Times New Roman" pitchFamily="18" charset="0"/>
               </a:rPr>
-              <a:t>Principle </a:t>
-            </a:r>
-            <a:r>
-              <a:rPr lang="en-US" sz="3200" u="sng" dirty="0" smtClean="0">
-                <a:cs typeface="Times New Roman" pitchFamily="18" charset="0"/>
-              </a:rPr>
-              <a:t>Components Analysis</a:t>
+              <a:t>Principle Components Analysis</a:t>
             </a:r>
           </a:p>
           <a:p>
@@ -4946,10 +4906,10 @@
               <a:buChar char="•"/>
             </a:pPr>
             <a:r>
-              <a:rPr lang="en-US" sz="3200" dirty="0" err="1" smtClean="0">
-                <a:cs typeface="Times New Roman" pitchFamily="18" charset="0"/>
-              </a:rPr>
-              <a:t>Lkjlkj</a:t>
+              <a:rPr lang="en-US" sz="3200" dirty="0" smtClean="0">
+                <a:cs typeface="Times New Roman" pitchFamily="18" charset="0"/>
+              </a:rPr>
+              <a:t>A linear  dimensionality reduction method. </a:t>
             </a:r>
             <a:endParaRPr lang="en-US" sz="3200" dirty="0" smtClean="0">
               <a:cs typeface="Times New Roman" pitchFamily="18" charset="0"/>
@@ -4961,14 +4921,23 @@
               <a:buChar char="•"/>
             </a:pPr>
             <a:r>
+              <a:rPr lang="en-US" sz="3200" dirty="0" smtClean="0">
+                <a:cs typeface="Times New Roman" pitchFamily="18" charset="0"/>
+              </a:rPr>
+              <a:t>Helps prevent </a:t>
+            </a:r>
+            <a:r>
               <a:rPr lang="en-US" sz="3200" dirty="0" err="1" smtClean="0">
                 <a:cs typeface="Times New Roman" pitchFamily="18" charset="0"/>
               </a:rPr>
-              <a:t>Lkjlkj</a:t>
-            </a:r>
-            <a:endParaRPr lang="en-US" sz="3200" dirty="0" smtClean="0">
-              <a:cs typeface="Times New Roman" pitchFamily="18" charset="0"/>
-            </a:endParaRPr>
+              <a:t>overfitting</a:t>
+            </a:r>
+            <a:r>
+              <a:rPr lang="en-US" sz="3200" dirty="0" smtClean="0">
+                <a:cs typeface="Times New Roman" pitchFamily="18" charset="0"/>
+              </a:rPr>
+              <a:t> especially when the number of observations is smaller than number of features</a:t>
+            </a:r>
           </a:p>
           <a:p>
             <a:pPr marL="457200" indent="-457200">
@@ -4976,10 +4945,10 @@
               <a:buChar char="•"/>
             </a:pPr>
             <a:r>
-              <a:rPr lang="en-US" sz="3200" dirty="0" err="1" smtClean="0">
-                <a:cs typeface="Times New Roman" pitchFamily="18" charset="0"/>
-              </a:rPr>
-              <a:t>Lklklkj</a:t>
+              <a:rPr lang="en-US" sz="3200" dirty="0" smtClean="0">
+                <a:cs typeface="Times New Roman" pitchFamily="18" charset="0"/>
+              </a:rPr>
+              <a:t>Used when data low-rank subspaces can explain data</a:t>
             </a:r>
             <a:endParaRPr lang="en-US" sz="3200" dirty="0" smtClean="0">
               <a:cs typeface="Times New Roman" pitchFamily="18" charset="0"/>
@@ -4995,66 +4964,6 @@
             </a:endParaRPr>
           </a:p>
           <a:p>
-            <a:pPr marL="457200" indent="-457200"/>
-            <a:r>
-              <a:rPr lang="en-US" sz="3200" u="sng" dirty="0" err="1" smtClean="0">
-                <a:cs typeface="Times New Roman" pitchFamily="18" charset="0"/>
-              </a:rPr>
-              <a:t>GoDec</a:t>
-            </a:r>
-            <a:r>
-              <a:rPr lang="en-US" sz="3200" u="sng" dirty="0" smtClean="0">
-                <a:cs typeface="Times New Roman" pitchFamily="18" charset="0"/>
-              </a:rPr>
-              <a:t> (Robust PCA)</a:t>
-            </a:r>
-          </a:p>
-          <a:p>
-            <a:pPr marL="457200" indent="-457200">
-              <a:buFont typeface="Arial" pitchFamily="34" charset="0"/>
-              <a:buChar char="•"/>
-            </a:pPr>
-            <a:r>
-              <a:rPr lang="en-US" sz="3200" dirty="0" err="1" smtClean="0">
-                <a:cs typeface="Times New Roman" pitchFamily="18" charset="0"/>
-              </a:rPr>
-              <a:t>Ljlk</a:t>
-            </a:r>
-            <a:endParaRPr lang="en-US" sz="3200" dirty="0" smtClean="0">
-              <a:cs typeface="Times New Roman" pitchFamily="18" charset="0"/>
-            </a:endParaRPr>
-          </a:p>
-          <a:p>
-            <a:pPr marL="457200" indent="-457200">
-              <a:buFont typeface="Arial" pitchFamily="34" charset="0"/>
-              <a:buChar char="•"/>
-            </a:pPr>
-            <a:r>
-              <a:rPr lang="en-US" sz="3200" dirty="0" err="1" smtClean="0">
-                <a:cs typeface="Times New Roman" pitchFamily="18" charset="0"/>
-              </a:rPr>
-              <a:t>Ljlkj</a:t>
-            </a:r>
-            <a:endParaRPr lang="en-US" sz="3200" dirty="0" smtClean="0">
-              <a:cs typeface="Times New Roman" pitchFamily="18" charset="0"/>
-            </a:endParaRPr>
-          </a:p>
-          <a:p>
-            <a:pPr marL="457200" indent="-457200">
-              <a:buFont typeface="Arial" pitchFamily="34" charset="0"/>
-              <a:buChar char="•"/>
-            </a:pPr>
-            <a:r>
-              <a:rPr lang="en-US" sz="3200" dirty="0" err="1" smtClean="0">
-                <a:cs typeface="Times New Roman" pitchFamily="18" charset="0"/>
-              </a:rPr>
-              <a:t>Lkjlkj</a:t>
-            </a:r>
-            <a:endParaRPr lang="en-US" sz="3200" dirty="0" smtClean="0">
-              <a:cs typeface="Times New Roman" pitchFamily="18" charset="0"/>
-            </a:endParaRPr>
-          </a:p>
-          <a:p>
             <a:pPr marL="457200" indent="-457200">
               <a:buFont typeface="Arial" pitchFamily="34" charset="0"/>
               <a:buChar char="•"/>
@@ -5064,16 +4973,70 @@
             </a:endParaRPr>
           </a:p>
           <a:p>
+            <a:pPr marL="457200" indent="-457200"/>
+            <a:r>
+              <a:rPr lang="en-US" sz="3200" u="sng" dirty="0" err="1" smtClean="0">
+                <a:cs typeface="Times New Roman" pitchFamily="18" charset="0"/>
+              </a:rPr>
+              <a:t>GoDec</a:t>
+            </a:r>
+            <a:r>
+              <a:rPr lang="en-US" sz="3200" u="sng" dirty="0" smtClean="0">
+                <a:cs typeface="Times New Roman" pitchFamily="18" charset="0"/>
+              </a:rPr>
+              <a:t> </a:t>
+            </a:r>
+            <a:r>
+              <a:rPr lang="en-US" sz="3200" u="sng" dirty="0" smtClean="0">
+                <a:cs typeface="Times New Roman" pitchFamily="18" charset="0"/>
+              </a:rPr>
+              <a:t>(Low-rank Matrix Approximation)</a:t>
+            </a:r>
+            <a:endParaRPr lang="en-US" sz="3200" u="sng" dirty="0" smtClean="0">
+              <a:cs typeface="Times New Roman" pitchFamily="18" charset="0"/>
+            </a:endParaRPr>
+          </a:p>
+          <a:p>
             <a:pPr marL="457200" indent="-457200">
               <a:buFont typeface="Arial" pitchFamily="34" charset="0"/>
               <a:buChar char="•"/>
             </a:pPr>
+            <a:r>
+              <a:rPr lang="en-US" sz="3200" dirty="0" smtClean="0">
+                <a:cs typeface="Times New Roman" pitchFamily="18" charset="0"/>
+              </a:rPr>
+              <a:t>Decomposes the data into low-rank, sparse, and noise components</a:t>
+            </a:r>
             <a:endParaRPr lang="en-US" sz="3200" dirty="0" smtClean="0">
               <a:cs typeface="Times New Roman" pitchFamily="18" charset="0"/>
             </a:endParaRPr>
           </a:p>
           <a:p>
-            <a:pPr marL="457200" indent="-457200"/>
+            <a:pPr marL="457200" indent="-457200">
+              <a:buFont typeface="Arial" pitchFamily="34" charset="0"/>
+              <a:buChar char="•"/>
+            </a:pPr>
+            <a:r>
+              <a:rPr lang="en-US" sz="3200" dirty="0" smtClean="0">
+                <a:cs typeface="Times New Roman" pitchFamily="18" charset="0"/>
+              </a:rPr>
+              <a:t>Can also be used for matrix completion when the data matrix contains missing entry</a:t>
+            </a:r>
+            <a:endParaRPr lang="en-US" sz="3200" dirty="0">
+              <a:cs typeface="Times New Roman" pitchFamily="18" charset="0"/>
+            </a:endParaRPr>
+          </a:p>
+          <a:p>
+            <a:pPr marL="457200" indent="-457200">
+              <a:buFont typeface="Arial" pitchFamily="34" charset="0"/>
+              <a:buChar char="•"/>
+            </a:pPr>
+            <a:r>
+              <a:rPr lang="en-US" sz="3200" dirty="0" smtClean="0">
+                <a:cs typeface="Times New Roman" pitchFamily="18" charset="0"/>
+              </a:rPr>
+              <a:t>Empirical studies suggest increased efficiency and robustness in comparison to Robust PCA</a:t>
+            </a:r>
             <a:endParaRPr lang="en-US" sz="3200" dirty="0" smtClean="0">
               <a:cs typeface="Times New Roman" pitchFamily="18" charset="0"/>
             </a:endParaRPr>
@@ -5580,7 +5543,7 @@
   <p:timing>
     <p:tnLst>
       <p:par>
-        <p:cTn id="1" dur="indefinite" restart="never" nodeType="tmRoot"/>
+        <p:cTn xmlns:p14="http://schemas.microsoft.com/office/powerpoint/2010/main" id="1" dur="indefinite" restart="never" nodeType="tmRoot"/>
       </p:par>
     </p:tnLst>
   </p:timing>

</xml_diff>

<commit_message>
Stephanie's poster commit.  Also, numStraps is probably in the poster.  Like everywhere.
</commit_message>
<xml_diff>
--- a/POSTER.pptx
+++ b/POSTER.pptx
@@ -12,6 +12,22 @@
   </p:sldIdLst>
   <p:sldSz cx="36576000" cy="29260800"/>
   <p:notesSz cx="6858000" cy="9144000"/>
+  <p:embeddedFontLst>
+    <p:embeddedFont>
+      <p:font typeface="Calibri" pitchFamily="34" charset="0"/>
+      <p:regular r:id="rId4"/>
+      <p:bold r:id="rId5"/>
+      <p:italic r:id="rId6"/>
+      <p:boldItalic r:id="rId7"/>
+    </p:embeddedFont>
+    <p:embeddedFont>
+      <p:font typeface="Verdana" pitchFamily="34" charset="0"/>
+      <p:regular r:id="rId8"/>
+      <p:bold r:id="rId9"/>
+      <p:italic r:id="rId10"/>
+      <p:boldItalic r:id="rId11"/>
+    </p:embeddedFont>
+  </p:embeddedFontLst>
   <p:defaultTextStyle>
     <a:defPPr>
       <a:defRPr lang="en-US"/>
@@ -109,7 +125,7 @@
   </p:defaultTextStyle>
   <p:extLst>
     <p:ext uri="{EFAFB233-063F-42B5-8137-9DF3F51BA10A}">
-      <p15:sldGuideLst xmlns="" xmlns:p15="http://schemas.microsoft.com/office/powerpoint/2012/main">
+      <p15:sldGuideLst xmlns:p15="http://schemas.microsoft.com/office/powerpoint/2012/main" xmlns="">
         <p15:guide id="1" orient="horz" pos="9216">
           <p15:clr>
             <a:srgbClr val="A4A3A4"/>
@@ -209,7 +225,7 @@
             <a:fld id="{CF0F9DC3-4130-4410-BC95-2E6916856B54}" type="datetimeFigureOut">
               <a:rPr lang="en-US" smtClean="0"/>
               <a:pPr/>
-              <a:t>4/21/15</a:t>
+              <a:t>4/21/2015</a:t>
             </a:fld>
             <a:endParaRPr lang="en-US"/>
           </a:p>
@@ -378,7 +394,7 @@
     </p:spTree>
     <p:extLst>
       <p:ext uri="{BB962C8B-B14F-4D97-AF65-F5344CB8AC3E}">
-        <p14:creationId xmlns:p14="http://schemas.microsoft.com/office/powerpoint/2010/main" val="2325757360"/>
+        <p14:creationId xmlns:p14="http://schemas.microsoft.com/office/powerpoint/2010/main" xmlns="" val="2325757360"/>
       </p:ext>
     </p:extLst>
   </p:cSld>
@@ -553,7 +569,7 @@
     </p:spTree>
     <p:extLst>
       <p:ext uri="{BB962C8B-B14F-4D97-AF65-F5344CB8AC3E}">
-        <p14:creationId xmlns:p14="http://schemas.microsoft.com/office/powerpoint/2010/main" val="1271015422"/>
+        <p14:creationId xmlns:p14="http://schemas.microsoft.com/office/powerpoint/2010/main" xmlns="" val="1271015422"/>
       </p:ext>
     </p:extLst>
   </p:cSld>
@@ -745,7 +761,7 @@
             <a:fld id="{22106B1F-BB0B-234F-B643-9D3F8052ABA9}" type="datetimeFigureOut">
               <a:rPr lang="en-US" smtClean="0"/>
               <a:pPr/>
-              <a:t>4/21/15</a:t>
+              <a:t>4/21/2015</a:t>
             </a:fld>
             <a:endParaRPr lang="en-US"/>
           </a:p>
@@ -912,7 +928,7 @@
             <a:fld id="{22106B1F-BB0B-234F-B643-9D3F8052ABA9}" type="datetimeFigureOut">
               <a:rPr lang="en-US" smtClean="0"/>
               <a:pPr/>
-              <a:t>4/21/15</a:t>
+              <a:t>4/21/2015</a:t>
             </a:fld>
             <a:endParaRPr lang="en-US"/>
           </a:p>
@@ -1089,7 +1105,7 @@
             <a:fld id="{22106B1F-BB0B-234F-B643-9D3F8052ABA9}" type="datetimeFigureOut">
               <a:rPr lang="en-US" smtClean="0"/>
               <a:pPr/>
-              <a:t>4/21/15</a:t>
+              <a:t>4/21/2015</a:t>
             </a:fld>
             <a:endParaRPr lang="en-US"/>
           </a:p>
@@ -1256,7 +1272,7 @@
             <a:fld id="{22106B1F-BB0B-234F-B643-9D3F8052ABA9}" type="datetimeFigureOut">
               <a:rPr lang="en-US" smtClean="0"/>
               <a:pPr/>
-              <a:t>4/21/15</a:t>
+              <a:t>4/21/2015</a:t>
             </a:fld>
             <a:endParaRPr lang="en-US"/>
           </a:p>
@@ -1499,7 +1515,7 @@
             <a:fld id="{22106B1F-BB0B-234F-B643-9D3F8052ABA9}" type="datetimeFigureOut">
               <a:rPr lang="en-US" smtClean="0"/>
               <a:pPr/>
-              <a:t>4/21/15</a:t>
+              <a:t>4/21/2015</a:t>
             </a:fld>
             <a:endParaRPr lang="en-US"/>
           </a:p>
@@ -1784,7 +1800,7 @@
             <a:fld id="{22106B1F-BB0B-234F-B643-9D3F8052ABA9}" type="datetimeFigureOut">
               <a:rPr lang="en-US" smtClean="0"/>
               <a:pPr/>
-              <a:t>4/21/15</a:t>
+              <a:t>4/21/2015</a:t>
             </a:fld>
             <a:endParaRPr lang="en-US"/>
           </a:p>
@@ -2203,7 +2219,7 @@
             <a:fld id="{22106B1F-BB0B-234F-B643-9D3F8052ABA9}" type="datetimeFigureOut">
               <a:rPr lang="en-US" smtClean="0"/>
               <a:pPr/>
-              <a:t>4/21/15</a:t>
+              <a:t>4/21/2015</a:t>
             </a:fld>
             <a:endParaRPr lang="en-US"/>
           </a:p>
@@ -2318,7 +2334,7 @@
             <a:fld id="{22106B1F-BB0B-234F-B643-9D3F8052ABA9}" type="datetimeFigureOut">
               <a:rPr lang="en-US" smtClean="0"/>
               <a:pPr/>
-              <a:t>4/21/15</a:t>
+              <a:t>4/21/2015</a:t>
             </a:fld>
             <a:endParaRPr lang="en-US"/>
           </a:p>
@@ -2410,7 +2426,7 @@
             <a:fld id="{22106B1F-BB0B-234F-B643-9D3F8052ABA9}" type="datetimeFigureOut">
               <a:rPr lang="en-US" smtClean="0"/>
               <a:pPr/>
-              <a:t>4/21/15</a:t>
+              <a:t>4/21/2015</a:t>
             </a:fld>
             <a:endParaRPr lang="en-US"/>
           </a:p>
@@ -2684,7 +2700,7 @@
             <a:fld id="{22106B1F-BB0B-234F-B643-9D3F8052ABA9}" type="datetimeFigureOut">
               <a:rPr lang="en-US" smtClean="0"/>
               <a:pPr/>
-              <a:t>4/21/15</a:t>
+              <a:t>4/21/2015</a:t>
             </a:fld>
             <a:endParaRPr lang="en-US"/>
           </a:p>
@@ -2934,7 +2950,7 @@
             <a:fld id="{22106B1F-BB0B-234F-B643-9D3F8052ABA9}" type="datetimeFigureOut">
               <a:rPr lang="en-US" smtClean="0"/>
               <a:pPr/>
-              <a:t>4/21/15</a:t>
+              <a:t>4/21/2015</a:t>
             </a:fld>
             <a:endParaRPr lang="en-US"/>
           </a:p>
@@ -3144,7 +3160,7 @@
             <a:fld id="{22106B1F-BB0B-234F-B643-9D3F8052ABA9}" type="datetimeFigureOut">
               <a:rPr lang="en-US" smtClean="0"/>
               <a:pPr/>
-              <a:t>4/21/15</a:t>
+              <a:t>4/21/2015</a:t>
             </a:fld>
             <a:endParaRPr lang="en-US"/>
           </a:p>
@@ -3646,7 +3662,7 @@
         </p:nvSpPr>
         <p:spPr>
           <a:xfrm>
-            <a:off x="0" y="0"/>
+            <a:off x="0" y="-16934"/>
             <a:ext cx="36576000" cy="4170432"/>
           </a:xfrm>
           <a:prstGeom prst="rect">
@@ -3703,7 +3719,7 @@
         <p:spPr bwMode="auto">
           <a:xfrm>
             <a:off x="3680882" y="582824"/>
-            <a:ext cx="28975050" cy="3587608"/>
+            <a:ext cx="28975050" cy="3710719"/>
           </a:xfrm>
           <a:prstGeom prst="rect">
             <a:avLst/>
@@ -3767,7 +3783,7 @@
           <a:p>
             <a:pPr algn="ctr" eaLnBrk="0" hangingPunct="0"/>
             <a:r>
-              <a:rPr lang="en-US" sz="4000" dirty="0" smtClean="0">
+              <a:rPr lang="en-US" sz="4800" dirty="0" smtClean="0">
                 <a:solidFill>
                   <a:schemeClr val="bg1"/>
                 </a:solidFill>
@@ -3777,7 +3793,7 @@
               <a:t>Sergio García-Vergara</a:t>
             </a:r>
             <a:r>
-              <a:rPr lang="en-US" sz="4000" dirty="0" smtClean="0">
+              <a:rPr lang="en-US" sz="4800" dirty="0" smtClean="0">
                 <a:solidFill>
                   <a:schemeClr val="bg1"/>
                 </a:solidFill>
@@ -3788,7 +3804,7 @@
               <a:t>¹, Stephanie Gillespie</a:t>
             </a:r>
             <a:r>
-              <a:rPr lang="en-US" sz="4000" dirty="0">
+              <a:rPr lang="en-US" sz="4800" dirty="0">
                 <a:solidFill>
                   <a:schemeClr val="bg1"/>
                 </a:solidFill>
@@ -3799,7 +3815,7 @@
               <a:t>¹</a:t>
             </a:r>
             <a:r>
-              <a:rPr lang="en-US" sz="4000" dirty="0" smtClean="0">
+              <a:rPr lang="en-US" sz="4800" dirty="0" smtClean="0">
                 <a:solidFill>
                   <a:schemeClr val="bg1"/>
                 </a:solidFill>
@@ -3810,7 +3826,7 @@
               <a:t>, </a:t>
             </a:r>
             <a:r>
-              <a:rPr lang="en-US" sz="4000" dirty="0" err="1" smtClean="0">
+              <a:rPr lang="en-US" sz="4800" dirty="0" err="1" smtClean="0">
                 <a:solidFill>
                   <a:schemeClr val="bg1"/>
                 </a:solidFill>
@@ -3821,7 +3837,7 @@
               <a:t>Oludotun</a:t>
             </a:r>
             <a:r>
-              <a:rPr lang="en-US" sz="4000" dirty="0" smtClean="0">
+              <a:rPr lang="en-US" sz="4800" dirty="0" smtClean="0">
                 <a:solidFill>
                   <a:schemeClr val="bg1"/>
                 </a:solidFill>
@@ -3832,7 +3848,7 @@
               <a:t> Ode¹, and Matthew Rice</a:t>
             </a:r>
             <a:r>
-              <a:rPr lang="en-US" sz="4000" dirty="0">
+              <a:rPr lang="en-US" sz="4800" dirty="0">
                 <a:solidFill>
                   <a:schemeClr val="bg1"/>
                 </a:solidFill>
@@ -3842,7 +3858,7 @@
               </a:rPr>
               <a:t>¹</a:t>
             </a:r>
-            <a:endParaRPr lang="en-US" sz="4000" dirty="0" smtClean="0">
+            <a:endParaRPr lang="en-US" sz="4800" dirty="0" smtClean="0">
               <a:solidFill>
                 <a:schemeClr val="bg1"/>
               </a:solidFill>
@@ -4129,6 +4145,55 @@
       </p:sp>
       <p:sp>
         <p:nvSpPr>
+          <p:cNvPr id="107" name="Rectangle 106"/>
+          <p:cNvSpPr/>
+          <p:nvPr/>
+        </p:nvSpPr>
+        <p:spPr>
+          <a:xfrm>
+            <a:off x="13925550" y="15938212"/>
+            <a:ext cx="10267950" cy="12507266"/>
+          </a:xfrm>
+          <a:prstGeom prst="rect">
+            <a:avLst/>
+          </a:prstGeom>
+          <a:solidFill>
+            <a:schemeClr val="accent1">
+              <a:lumMod val="20000"/>
+              <a:lumOff val="80000"/>
+            </a:schemeClr>
+          </a:solidFill>
+          <a:ln>
+            <a:noFill/>
+          </a:ln>
+        </p:spPr>
+        <p:style>
+          <a:lnRef idx="2">
+            <a:schemeClr val="accent1">
+              <a:shade val="50000"/>
+            </a:schemeClr>
+          </a:lnRef>
+          <a:fillRef idx="1">
+            <a:schemeClr val="accent1"/>
+          </a:fillRef>
+          <a:effectRef idx="0">
+            <a:schemeClr val="accent1"/>
+          </a:effectRef>
+          <a:fontRef idx="minor">
+            <a:schemeClr val="lt1"/>
+          </a:fontRef>
+        </p:style>
+        <p:txBody>
+          <a:bodyPr rtlCol="0" anchor="ctr"/>
+          <a:lstStyle/>
+          <a:p>
+            <a:pPr algn="ctr"/>
+            <a:endParaRPr lang="en-US"/>
+          </a:p>
+        </p:txBody>
+      </p:sp>
+      <p:sp>
+        <p:nvSpPr>
           <p:cNvPr id="21" name="Rectangle 20"/>
           <p:cNvSpPr/>
           <p:nvPr/>
@@ -4525,7 +4590,7 @@
         <p:spPr>
           <a:xfrm>
             <a:off x="647858" y="20677901"/>
-            <a:ext cx="12477945" cy="7786627"/>
+            <a:ext cx="12477945" cy="7857580"/>
           </a:xfrm>
           <a:prstGeom prst="rect">
             <a:avLst/>
@@ -4580,7 +4645,7 @@
         <p:spPr>
           <a:xfrm>
             <a:off x="637299" y="14924801"/>
-            <a:ext cx="12422691" cy="4031873"/>
+            <a:ext cx="12422691" cy="5016758"/>
           </a:xfrm>
           <a:prstGeom prst="rect">
             <a:avLst/>
@@ -4663,7 +4728,19 @@
               <a:rPr lang="en-US" sz="3200" dirty="0" smtClean="0">
                 <a:cs typeface="Times New Roman" pitchFamily="18" charset="0"/>
               </a:rPr>
-              <a:t>Class a priori probability 50%</a:t>
+              <a:t>Class </a:t>
+            </a:r>
+            <a:r>
+              <a:rPr lang="en-US" sz="3200" i="1" dirty="0" smtClean="0">
+                <a:cs typeface="Times New Roman" pitchFamily="18" charset="0"/>
+              </a:rPr>
+              <a:t>a priori </a:t>
+            </a:r>
+            <a:r>
+              <a:rPr lang="en-US" sz="3200" dirty="0" smtClean="0">
+                <a:cs typeface="Times New Roman" pitchFamily="18" charset="0"/>
+              </a:rPr>
+              <a:t>probability 50%</a:t>
             </a:r>
           </a:p>
           <a:p>
@@ -4677,6 +4754,30 @@
               </a:rPr>
               <a:t>Labels: Presence of Parkinson’s Disease (1) or normal (0) </a:t>
             </a:r>
+            <a:endParaRPr lang="en-US" sz="3200" dirty="0" smtClean="0">
+              <a:cs typeface="Times New Roman" pitchFamily="18" charset="0"/>
+            </a:endParaRPr>
+          </a:p>
+          <a:p>
+            <a:pPr marL="457200" indent="-457200" algn="just">
+              <a:buFont typeface="Arial" pitchFamily="34" charset="0"/>
+              <a:buChar char="•"/>
+            </a:pPr>
+            <a:endParaRPr lang="en-US" sz="3200" dirty="0" smtClean="0">
+              <a:cs typeface="Times New Roman" pitchFamily="18" charset="0"/>
+            </a:endParaRPr>
+          </a:p>
+          <a:p>
+            <a:pPr marL="457200" indent="-457200" algn="just"/>
+            <a:r>
+              <a:rPr lang="en-US" sz="3200" dirty="0" smtClean="0">
+                <a:cs typeface="Times New Roman" pitchFamily="18" charset="0"/>
+              </a:rPr>
+              <a:t>Set aside 7 participants of each class for testing (364 instances)</a:t>
+            </a:r>
+            <a:endParaRPr lang="en-US" sz="3200" dirty="0" smtClean="0">
+              <a:cs typeface="Times New Roman" pitchFamily="18" charset="0"/>
+            </a:endParaRPr>
           </a:p>
           <a:p>
             <a:pPr marL="457200" indent="-457200" algn="just">
@@ -4714,7 +4815,23 @@
           <a:p>
             <a:r>
               <a:rPr lang="en-US" sz="3200" dirty="0" smtClean="0"/>
-              <a:t>Want to choose a subset (&lt;700) as the “small” training dataset </a:t>
+              <a:t>Want </a:t>
+            </a:r>
+            <a:r>
+              <a:rPr lang="en-US" sz="3200" dirty="0" smtClean="0"/>
+              <a:t>a subset of the remaining instances </a:t>
+            </a:r>
+            <a:r>
+              <a:rPr lang="en-US" sz="3200" dirty="0" smtClean="0"/>
+              <a:t>as </a:t>
+            </a:r>
+            <a:r>
+              <a:rPr lang="en-US" sz="3200" dirty="0" smtClean="0"/>
+              <a:t>“</a:t>
+            </a:r>
+            <a:r>
+              <a:rPr lang="en-US" sz="3200" dirty="0" smtClean="0"/>
+              <a:t>small” training dataset </a:t>
             </a:r>
           </a:p>
           <a:p>
@@ -4759,7 +4876,15 @@
           <a:p>
             <a:r>
               <a:rPr lang="en-US" sz="3200" dirty="0" smtClean="0"/>
-              <a:t>Result: choose datasets of 100 instances for our “small” training dataset. Note that this is approximately 4 time larger than number of instances. </a:t>
+              <a:t>Result: choose datasets of 100 instances for our “small” training dataset. Note that this is approximately 4 </a:t>
+            </a:r>
+            <a:r>
+              <a:rPr lang="en-US" sz="3200" dirty="0" smtClean="0"/>
+              <a:t>times </a:t>
+            </a:r>
+            <a:r>
+              <a:rPr lang="en-US" sz="3200" dirty="0" smtClean="0"/>
+              <a:t>larger than number of instances. </a:t>
             </a:r>
             <a:endParaRPr lang="en-US" sz="3200" dirty="0"/>
           </a:p>
@@ -4774,7 +4899,7 @@
         <p:spPr>
           <a:xfrm>
             <a:off x="13649045" y="5389951"/>
-            <a:ext cx="10822005" cy="13388285"/>
+            <a:ext cx="10822005" cy="10926068"/>
           </a:xfrm>
           <a:prstGeom prst="rect">
             <a:avLst/>
@@ -4801,7 +4926,13 @@
               <a:rPr lang="en-US" sz="3200" dirty="0" smtClean="0">
                 <a:cs typeface="Times New Roman" pitchFamily="18" charset="0"/>
               </a:rPr>
-              <a:t>Picks 100 samples with replacement</a:t>
+              <a:t>Picks multiple sets of 100 </a:t>
+            </a:r>
+            <a:r>
+              <a:rPr lang="en-US" sz="3200" dirty="0" smtClean="0">
+                <a:cs typeface="Times New Roman" pitchFamily="18" charset="0"/>
+              </a:rPr>
+              <a:t>samples with replacement</a:t>
             </a:r>
           </a:p>
           <a:p>
@@ -4813,7 +4944,13 @@
               <a:rPr lang="en-US" sz="3200" dirty="0" smtClean="0">
                 <a:cs typeface="Times New Roman" pitchFamily="18" charset="0"/>
               </a:rPr>
-              <a:t>Estimate model parameters using validation techniques</a:t>
+              <a:t>Can estimate </a:t>
+            </a:r>
+            <a:r>
+              <a:rPr lang="en-US" sz="3200" dirty="0" smtClean="0">
+                <a:cs typeface="Times New Roman" pitchFamily="18" charset="0"/>
+              </a:rPr>
+              <a:t>model parameters using validation techniques</a:t>
             </a:r>
           </a:p>
           <a:p>
@@ -4825,8 +4962,11 @@
               <a:rPr lang="en-US" sz="3200" dirty="0" smtClean="0">
                 <a:cs typeface="Times New Roman" pitchFamily="18" charset="0"/>
               </a:rPr>
-              <a:t>Due to already-small data sets, this technique only made our model parameters less-applicable to the full testing dataset.</a:t>
-            </a:r>
+              <a:t>Early results showed poor performance, possibly due to training set being too different from test set</a:t>
+            </a:r>
+            <a:endParaRPr lang="en-US" sz="3200" dirty="0" smtClean="0">
+              <a:cs typeface="Times New Roman" pitchFamily="18" charset="0"/>
+            </a:endParaRPr>
           </a:p>
           <a:p>
             <a:pPr marL="457200" indent="-457200"/>
@@ -4843,8 +4983,23 @@
               <a:rPr lang="en-US" sz="3200" u="sng" dirty="0" smtClean="0">
                 <a:cs typeface="Times New Roman" pitchFamily="18" charset="0"/>
               </a:rPr>
-              <a:t>Virtual Data Creation</a:t>
-            </a:r>
+              <a:t>Virtual Data </a:t>
+            </a:r>
+            <a:r>
+              <a:rPr lang="en-US" sz="3200" u="sng" dirty="0" smtClean="0">
+                <a:cs typeface="Times New Roman" pitchFamily="18" charset="0"/>
+              </a:rPr>
+              <a:t>Creation</a:t>
+            </a:r>
+            <a:r>
+              <a:rPr lang="en-US" sz="3200" u="sng" baseline="30000" dirty="0" smtClean="0">
+                <a:cs typeface="Times New Roman" pitchFamily="18" charset="0"/>
+              </a:rPr>
+              <a:t>2</a:t>
+            </a:r>
+            <a:endParaRPr lang="en-US" sz="3200" u="sng" dirty="0" smtClean="0">
+              <a:cs typeface="Times New Roman" pitchFamily="18" charset="0"/>
+            </a:endParaRPr>
           </a:p>
           <a:p>
             <a:pPr marL="457200" indent="-457200">
@@ -4879,8 +5034,23 @@
               <a:rPr lang="en-US" sz="3200" dirty="0" smtClean="0">
                 <a:cs typeface="Times New Roman" pitchFamily="18" charset="0"/>
               </a:rPr>
-              <a:t>Should result in more generalized data</a:t>
-            </a:r>
+              <a:t>Should result in more </a:t>
+            </a:r>
+            <a:r>
+              <a:rPr lang="en-US" sz="3200" dirty="0" smtClean="0">
+                <a:cs typeface="Times New Roman" pitchFamily="18" charset="0"/>
+              </a:rPr>
+              <a:t>“generalized” data, reduce </a:t>
+            </a:r>
+            <a:r>
+              <a:rPr lang="en-US" sz="3200" dirty="0" err="1" smtClean="0">
+                <a:cs typeface="Times New Roman" pitchFamily="18" charset="0"/>
+              </a:rPr>
+              <a:t>overfitting</a:t>
+            </a:r>
+            <a:endParaRPr lang="en-US" sz="3200" dirty="0" smtClean="0">
+              <a:cs typeface="Times New Roman" pitchFamily="18" charset="0"/>
+            </a:endParaRPr>
           </a:p>
           <a:p>
             <a:pPr marL="457200" indent="-457200">
@@ -4897,8 +5067,23 @@
               <a:rPr lang="en-US" sz="3200" u="sng" dirty="0" smtClean="0">
                 <a:cs typeface="Times New Roman" pitchFamily="18" charset="0"/>
               </a:rPr>
-              <a:t>Principle Components Analysis</a:t>
-            </a:r>
+              <a:t>Principle Components </a:t>
+            </a:r>
+            <a:r>
+              <a:rPr lang="en-US" sz="3200" u="sng" dirty="0" smtClean="0">
+                <a:cs typeface="Times New Roman" pitchFamily="18" charset="0"/>
+              </a:rPr>
+              <a:t>Analysis</a:t>
+            </a:r>
+            <a:r>
+              <a:rPr lang="en-US" sz="3200" u="sng" baseline="30000" dirty="0" smtClean="0">
+                <a:cs typeface="Times New Roman" pitchFamily="18" charset="0"/>
+              </a:rPr>
+              <a:t>3</a:t>
+            </a:r>
+            <a:endParaRPr lang="en-US" sz="3200" u="sng" dirty="0" smtClean="0">
+              <a:cs typeface="Times New Roman" pitchFamily="18" charset="0"/>
+            </a:endParaRPr>
           </a:p>
           <a:p>
             <a:pPr marL="457200" indent="-457200">
@@ -4909,11 +5094,14 @@
               <a:rPr lang="en-US" sz="3200" dirty="0" smtClean="0">
                 <a:cs typeface="Times New Roman" pitchFamily="18" charset="0"/>
               </a:rPr>
-              <a:t>A linear  dimensionality reduction method. </a:t>
-            </a:r>
-            <a:endParaRPr lang="en-US" sz="3200" dirty="0" smtClean="0">
-              <a:cs typeface="Times New Roman" pitchFamily="18" charset="0"/>
-            </a:endParaRPr>
+              <a:t>A </a:t>
+            </a:r>
+            <a:r>
+              <a:rPr lang="en-US" sz="3200" dirty="0" smtClean="0">
+                <a:cs typeface="Times New Roman" pitchFamily="18" charset="0"/>
+              </a:rPr>
+              <a:t>linear dimensionality-reduction method</a:t>
+            </a:r>
           </a:p>
           <a:p>
             <a:pPr marL="457200" indent="-457200">
@@ -4924,7 +5112,13 @@
               <a:rPr lang="en-US" sz="3200" dirty="0" smtClean="0">
                 <a:cs typeface="Times New Roman" pitchFamily="18" charset="0"/>
               </a:rPr>
-              <a:t>Helps prevent </a:t>
+              <a:t>Helps </a:t>
+            </a:r>
+            <a:r>
+              <a:rPr lang="en-US" sz="3200" dirty="0" smtClean="0">
+                <a:cs typeface="Times New Roman" pitchFamily="18" charset="0"/>
+              </a:rPr>
+              <a:t>prevent </a:t>
             </a:r>
             <a:r>
               <a:rPr lang="en-US" sz="3200" dirty="0" err="1" smtClean="0">
@@ -4936,7 +5130,13 @@
               <a:rPr lang="en-US" sz="3200" dirty="0" smtClean="0">
                 <a:cs typeface="Times New Roman" pitchFamily="18" charset="0"/>
               </a:rPr>
-              <a:t> especially when the number of observations is smaller than number of features</a:t>
+              <a:t>, </a:t>
+            </a:r>
+            <a:r>
+              <a:rPr lang="en-US" sz="3200" dirty="0" smtClean="0">
+                <a:cs typeface="Times New Roman" pitchFamily="18" charset="0"/>
+              </a:rPr>
+              <a:t>especially when the number of observations is smaller than number of features</a:t>
             </a:r>
           </a:p>
           <a:p>
@@ -4950,7 +5150,40 @@
               </a:rPr>
               <a:t>Used when data low-rank subspaces can explain data</a:t>
             </a:r>
+          </a:p>
+          <a:p>
+            <a:pPr marL="457200" indent="-457200"/>
             <a:endParaRPr lang="en-US" sz="3200" dirty="0" smtClean="0">
+              <a:cs typeface="Times New Roman" pitchFamily="18" charset="0"/>
+            </a:endParaRPr>
+          </a:p>
+          <a:p>
+            <a:pPr marL="457200" indent="-457200"/>
+            <a:r>
+              <a:rPr lang="en-US" sz="3200" u="sng" dirty="0" err="1" smtClean="0">
+                <a:cs typeface="Times New Roman" pitchFamily="18" charset="0"/>
+              </a:rPr>
+              <a:t>GoDec</a:t>
+            </a:r>
+            <a:r>
+              <a:rPr lang="en-US" sz="3200" u="sng" dirty="0" smtClean="0">
+                <a:cs typeface="Times New Roman" pitchFamily="18" charset="0"/>
+              </a:rPr>
+              <a:t> (Low-rank Matrix </a:t>
+            </a:r>
+            <a:r>
+              <a:rPr lang="en-US" sz="3200" u="sng" dirty="0" smtClean="0">
+                <a:cs typeface="Times New Roman" pitchFamily="18" charset="0"/>
+              </a:rPr>
+              <a:t>Approximation)</a:t>
+            </a:r>
+            <a:r>
+              <a:rPr lang="en-US" sz="3200" u="sng" baseline="30000" dirty="0" smtClean="0">
+                <a:cs typeface="Times New Roman" pitchFamily="18" charset="0"/>
+              </a:rPr>
+              <a:t>4</a:t>
+            </a:r>
+            <a:endParaRPr lang="en-US" sz="3200" u="sng" dirty="0" smtClean="0">
               <a:cs typeface="Times New Roman" pitchFamily="18" charset="0"/>
             </a:endParaRPr>
           </a:p>
@@ -4959,6 +5192,18 @@
               <a:buFont typeface="Arial" pitchFamily="34" charset="0"/>
               <a:buChar char="•"/>
             </a:pPr>
+            <a:r>
+              <a:rPr lang="en-US" sz="3200" dirty="0" smtClean="0">
+                <a:cs typeface="Times New Roman" pitchFamily="18" charset="0"/>
+              </a:rPr>
+              <a:t>Decomposes the data into low-rank, sparse, and </a:t>
+            </a:r>
+            <a:r>
+              <a:rPr lang="en-US" sz="3200" dirty="0" smtClean="0">
+                <a:cs typeface="Times New Roman" pitchFamily="18" charset="0"/>
+              </a:rPr>
+              <a:t>noise</a:t>
+            </a:r>
             <a:endParaRPr lang="en-US" sz="3200" dirty="0" smtClean="0">
               <a:cs typeface="Times New Roman" pitchFamily="18" charset="0"/>
             </a:endParaRPr>
@@ -4968,94 +5213,24 @@
               <a:buFont typeface="Arial" pitchFamily="34" charset="0"/>
               <a:buChar char="•"/>
             </a:pPr>
-            <a:endParaRPr lang="en-US" sz="3200" dirty="0" smtClean="0">
-              <a:cs typeface="Times New Roman" pitchFamily="18" charset="0"/>
-            </a:endParaRPr>
-          </a:p>
-          <a:p>
-            <a:pPr marL="457200" indent="-457200"/>
-            <a:r>
-              <a:rPr lang="en-US" sz="3200" u="sng" dirty="0" err="1" smtClean="0">
-                <a:cs typeface="Times New Roman" pitchFamily="18" charset="0"/>
-              </a:rPr>
-              <a:t>GoDec</a:t>
-            </a:r>
-            <a:r>
-              <a:rPr lang="en-US" sz="3200" u="sng" dirty="0" smtClean="0">
-                <a:cs typeface="Times New Roman" pitchFamily="18" charset="0"/>
-              </a:rPr>
-              <a:t> </a:t>
-            </a:r>
-            <a:r>
-              <a:rPr lang="en-US" sz="3200" u="sng" dirty="0" smtClean="0">
-                <a:cs typeface="Times New Roman" pitchFamily="18" charset="0"/>
-              </a:rPr>
-              <a:t>(Low-rank Matrix Approximation)</a:t>
-            </a:r>
-            <a:endParaRPr lang="en-US" sz="3200" u="sng" dirty="0" smtClean="0">
-              <a:cs typeface="Times New Roman" pitchFamily="18" charset="0"/>
-            </a:endParaRPr>
-          </a:p>
-          <a:p>
-            <a:pPr marL="457200" indent="-457200">
-              <a:buFont typeface="Arial" pitchFamily="34" charset="0"/>
-              <a:buChar char="•"/>
-            </a:pPr>
             <a:r>
               <a:rPr lang="en-US" sz="3200" dirty="0" smtClean="0">
                 <a:cs typeface="Times New Roman" pitchFamily="18" charset="0"/>
               </a:rPr>
-              <a:t>Decomposes the data into low-rank, sparse, and noise components</a:t>
-            </a:r>
-            <a:endParaRPr lang="en-US" sz="3200" dirty="0" smtClean="0">
-              <a:cs typeface="Times New Roman" pitchFamily="18" charset="0"/>
-            </a:endParaRPr>
-          </a:p>
-          <a:p>
-            <a:pPr marL="457200" indent="-457200">
-              <a:buFont typeface="Arial" pitchFamily="34" charset="0"/>
-              <a:buChar char="•"/>
-            </a:pPr>
+              <a:t>Empirical </a:t>
+            </a:r>
             <a:r>
               <a:rPr lang="en-US" sz="3200" dirty="0" smtClean="0">
                 <a:cs typeface="Times New Roman" pitchFamily="18" charset="0"/>
               </a:rPr>
-              <a:t>Can also be used for matrix completion when the data matrix contains missing entry</a:t>
-            </a:r>
-            <a:endParaRPr lang="en-US" sz="3200" dirty="0">
-              <a:cs typeface="Times New Roman" pitchFamily="18" charset="0"/>
-            </a:endParaRPr>
-          </a:p>
-          <a:p>
-            <a:pPr marL="457200" indent="-457200">
-              <a:buFont typeface="Arial" pitchFamily="34" charset="0"/>
-              <a:buChar char="•"/>
-            </a:pPr>
-            <a:r>
-              <a:rPr lang="en-US" sz="3200" dirty="0" smtClean="0">
-                <a:cs typeface="Times New Roman" pitchFamily="18" charset="0"/>
-              </a:rPr>
-              <a:t>Empirical studies suggest increased efficiency and robustness in comparison to Robust PCA</a:t>
-            </a:r>
-            <a:endParaRPr lang="en-US" sz="3200" dirty="0" smtClean="0">
-              <a:cs typeface="Times New Roman" pitchFamily="18" charset="0"/>
-            </a:endParaRPr>
+              <a:t>studies suggest increased efficiency and robustness in comparison to Robust PCA</a:t>
+            </a:r>
           </a:p>
           <a:p>
             <a:pPr marL="457200" indent="-457200"/>
             <a:endParaRPr lang="en-US" sz="3200" dirty="0" smtClean="0">
               <a:cs typeface="Times New Roman" pitchFamily="18" charset="0"/>
             </a:endParaRPr>
-          </a:p>
-          <a:p>
-            <a:pPr marL="457200" indent="-457200"/>
-            <a:r>
-              <a:rPr lang="en-US" sz="3200" dirty="0" smtClean="0">
-                <a:cs typeface="Times New Roman" pitchFamily="18" charset="0"/>
-              </a:rPr>
-              <a:t>Experimentation Procedures: insert graphic here??</a:t>
-            </a:r>
-            <a:endParaRPr lang="en-US" sz="3200" dirty="0" smtClean="0"/>
           </a:p>
         </p:txBody>
       </p:sp>
@@ -5173,7 +5348,7 @@
         </p:nvSpPr>
         <p:spPr bwMode="auto">
           <a:xfrm>
-            <a:off x="24882326" y="16590663"/>
+            <a:off x="24882326" y="18775063"/>
             <a:ext cx="10856838" cy="632970"/>
           </a:xfrm>
           <a:prstGeom prst="rect">
@@ -5231,8 +5406,8 @@
         </p:nvSpPr>
         <p:spPr>
           <a:xfrm>
-            <a:off x="24896321" y="17208437"/>
-            <a:ext cx="10860529" cy="5613463"/>
+            <a:off x="24896321" y="19392838"/>
+            <a:ext cx="10860529" cy="3469464"/>
           </a:xfrm>
           <a:prstGeom prst="rect">
             <a:avLst/>
@@ -5379,6 +5554,16 @@
                 <a:latin typeface="+mj-lt"/>
                 <a:cs typeface="Times New Roman" pitchFamily="18" charset="0"/>
               </a:rPr>
+              <a:t>Member Workload and </a:t>
+            </a:r>
+            <a:r>
+              <a:rPr lang="en-US" sz="4000" b="1" dirty="0" smtClean="0">
+                <a:solidFill>
+                  <a:srgbClr val="F8F8F8"/>
+                </a:solidFill>
+                <a:latin typeface="+mj-lt"/>
+                <a:cs typeface="Times New Roman" pitchFamily="18" charset="0"/>
+              </a:rPr>
               <a:t>References</a:t>
             </a:r>
             <a:endParaRPr lang="en-US" sz="4000" b="1" dirty="0">
@@ -5399,8 +5584,8 @@
         </p:nvSpPr>
         <p:spPr>
           <a:xfrm>
-            <a:off x="24907595" y="23997594"/>
-            <a:ext cx="10881961" cy="4466934"/>
+            <a:off x="24924529" y="23997593"/>
+            <a:ext cx="10881961" cy="4537887"/>
           </a:xfrm>
           <a:prstGeom prst="rect">
             <a:avLst/>
@@ -5448,7 +5633,7 @@
         <p:spPr>
           <a:xfrm>
             <a:off x="24844227" y="5375958"/>
-            <a:ext cx="10856838" cy="10778442"/>
+            <a:ext cx="10856838" cy="12969192"/>
           </a:xfrm>
           <a:prstGeom prst="rect">
             <a:avLst/>
@@ -5496,7 +5681,7 @@
         <p:spPr>
           <a:xfrm>
             <a:off x="24907596" y="23997594"/>
-            <a:ext cx="10881960" cy="1015663"/>
+            <a:ext cx="10881960" cy="4708981"/>
           </a:xfrm>
           <a:prstGeom prst="rect">
             <a:avLst/>
@@ -5511,7 +5696,51 @@
           <a:p>
             <a:r>
               <a:rPr lang="en-US" sz="2000" dirty="0" smtClean="0"/>
-              <a:t>[1] B. E. </a:t>
+              <a:t>Sergio Garcia handled the “What is Small” component and debugging of merged code. </a:t>
+            </a:r>
+          </a:p>
+          <a:p>
+            <a:r>
+              <a:rPr lang="en-US" sz="2000" dirty="0" smtClean="0"/>
+              <a:t>Stephanie Gillespie led the literature review, document creation, and coded bootstrap and virtual data.</a:t>
+            </a:r>
+          </a:p>
+          <a:p>
+            <a:r>
+              <a:rPr lang="en-US" sz="2000" dirty="0" err="1" smtClean="0"/>
+              <a:t>Oludotun</a:t>
+            </a:r>
+            <a:r>
+              <a:rPr lang="en-US" sz="2000" dirty="0" smtClean="0"/>
+              <a:t> Ode focused on PCA and </a:t>
+            </a:r>
+            <a:r>
+              <a:rPr lang="en-US" sz="2000" dirty="0" err="1" smtClean="0"/>
+              <a:t>goDEC</a:t>
+            </a:r>
+            <a:r>
+              <a:rPr lang="en-US" sz="2000" dirty="0" smtClean="0"/>
+              <a:t>  methods. </a:t>
+            </a:r>
+            <a:endParaRPr lang="en-US" sz="2000" dirty="0" smtClean="0"/>
+          </a:p>
+          <a:p>
+            <a:r>
+              <a:rPr lang="en-US" sz="2000" dirty="0" smtClean="0"/>
+              <a:t>Matthew Rice focused on the overall experiment code and data structures. </a:t>
+            </a:r>
+          </a:p>
+          <a:p>
+            <a:endParaRPr lang="en-US" sz="2000" dirty="0" smtClean="0"/>
+          </a:p>
+          <a:p>
+            <a:r>
+              <a:rPr lang="en-US" sz="2000" dirty="0" smtClean="0"/>
+              <a:t>[</a:t>
+            </a:r>
+            <a:r>
+              <a:rPr lang="en-US" sz="2000" dirty="0" smtClean="0"/>
+              <a:t>1] B. E. </a:t>
             </a:r>
             <a:r>
               <a:rPr lang="en-US" sz="2000" dirty="0" err="1" smtClean="0"/>
@@ -5529,9 +5758,3015 @@
               <a:rPr lang="en-US" sz="2000" dirty="0" smtClean="0"/>
               <a:t>. “Collection and analysis of a Parkinson speech dataset with multiple types of sound recordings,” IEEE Journal of Biomedical and Health Informatics, vol. 17, no. 4, pp. 828-834, 2013.  </a:t>
             </a:r>
+            <a:endParaRPr lang="en-US" sz="2000" dirty="0" smtClean="0"/>
+          </a:p>
+          <a:p>
+            <a:r>
+              <a:rPr lang="en-US" sz="2000" dirty="0" smtClean="0"/>
+              <a:t>[2] </a:t>
+            </a:r>
+            <a:r>
+              <a:rPr lang="en-US" sz="2000" dirty="0" smtClean="0"/>
+              <a:t>S.S. </a:t>
+            </a:r>
+            <a:r>
+              <a:rPr lang="en-US" sz="2000" dirty="0" smtClean="0"/>
+              <a:t>Lee. “Noisy </a:t>
+            </a:r>
+            <a:r>
+              <a:rPr lang="en-US" sz="2000" dirty="0" smtClean="0"/>
+              <a:t>replication in skewed binary classification</a:t>
+            </a:r>
+            <a:r>
+              <a:rPr lang="en-US" sz="2000" dirty="0" smtClean="0"/>
+              <a:t>,” </a:t>
+            </a:r>
+            <a:r>
+              <a:rPr lang="en-US" sz="2000" dirty="0" smtClean="0"/>
+              <a:t>Computational Statistics &amp; Data </a:t>
+            </a:r>
+            <a:r>
+              <a:rPr lang="en-US" sz="2000" dirty="0" smtClean="0"/>
+              <a:t>Analysis, vol. 34, no. 2 pp. 165–191, 2000.</a:t>
+            </a:r>
+          </a:p>
+          <a:p>
+            <a:r>
+              <a:rPr lang="en-US" sz="2000" dirty="0" smtClean="0"/>
+              <a:t>[3] </a:t>
+            </a:r>
+            <a:r>
+              <a:rPr lang="en-US" sz="2000" i="1" dirty="0" smtClean="0"/>
+              <a:t>Low-Rank Matrix Recovery and Completion via Convex Optimization</a:t>
+            </a:r>
+            <a:r>
+              <a:rPr lang="en-US" sz="2000" dirty="0" smtClean="0"/>
+              <a:t>. University of Illinois Perception and Decision Lab, 1 Jan. 2015. Web. 21 Apr. 2015. &lt;http://perception.csl.illinois.edu/matrix-rank/introduction.html#RPCA&gt;.</a:t>
+            </a:r>
+            <a:endParaRPr lang="en-US" sz="2000" dirty="0" smtClean="0"/>
+          </a:p>
+          <a:p>
+            <a:r>
+              <a:rPr lang="en-US" sz="2000" dirty="0" smtClean="0"/>
+              <a:t>[4] T. Zhou and T. </a:t>
+            </a:r>
+            <a:r>
+              <a:rPr lang="en-US" sz="2000" dirty="0" err="1" smtClean="0"/>
+              <a:t>Dacheng</a:t>
+            </a:r>
+            <a:r>
+              <a:rPr lang="en-US" sz="2000" dirty="0" smtClean="0"/>
+              <a:t>. </a:t>
+            </a:r>
+            <a:r>
+              <a:rPr lang="en-US" sz="2000" dirty="0" smtClean="0"/>
+              <a:t>"</a:t>
+            </a:r>
+            <a:r>
+              <a:rPr lang="en-US" sz="2000" dirty="0" err="1" smtClean="0"/>
+              <a:t>Godec</a:t>
+            </a:r>
+            <a:r>
+              <a:rPr lang="en-US" sz="2000" dirty="0" smtClean="0"/>
+              <a:t>: Randomized low-rank &amp; sparse matrix decomposition in noisy case." </a:t>
+            </a:r>
+            <a:r>
+              <a:rPr lang="en-US" sz="2000" i="1" dirty="0" smtClean="0"/>
+              <a:t>International Conference on Machine Learning</a:t>
+            </a:r>
+            <a:r>
+              <a:rPr lang="en-US" sz="2000" dirty="0" smtClean="0"/>
+              <a:t> 2011.</a:t>
+            </a:r>
+            <a:endParaRPr lang="en-US" sz="2000" dirty="0" smtClean="0"/>
           </a:p>
           <a:p>
             <a:endParaRPr lang="en-US" sz="2000" dirty="0"/>
+          </a:p>
+        </p:txBody>
+      </p:sp>
+      <p:sp>
+        <p:nvSpPr>
+          <p:cNvPr id="30" name="Rounded Rectangle 29"/>
+          <p:cNvSpPr/>
+          <p:nvPr/>
+        </p:nvSpPr>
+        <p:spPr>
+          <a:xfrm>
+            <a:off x="17786350" y="17212310"/>
+            <a:ext cx="2921000" cy="447040"/>
+          </a:xfrm>
+          <a:prstGeom prst="roundRect">
+            <a:avLst/>
+          </a:prstGeom>
+          <a:solidFill>
+            <a:schemeClr val="bg1"/>
+          </a:solidFill>
+          <a:ln w="38100"/>
+        </p:spPr>
+        <p:style>
+          <a:lnRef idx="2">
+            <a:schemeClr val="accent1">
+              <a:shade val="50000"/>
+            </a:schemeClr>
+          </a:lnRef>
+          <a:fillRef idx="1">
+            <a:schemeClr val="accent1"/>
+          </a:fillRef>
+          <a:effectRef idx="0">
+            <a:schemeClr val="accent1"/>
+          </a:effectRef>
+          <a:fontRef idx="minor">
+            <a:schemeClr val="lt1"/>
+          </a:fontRef>
+        </p:style>
+        <p:txBody>
+          <a:bodyPr lIns="125401" tIns="62700" rIns="125401" bIns="62700" rtlCol="0" anchor="ctr"/>
+          <a:lstStyle/>
+          <a:p>
+            <a:pPr algn="ctr"/>
+            <a:r>
+              <a:rPr lang="en-US" sz="1800" dirty="0" smtClean="0">
+                <a:solidFill>
+                  <a:schemeClr val="tx1"/>
+                </a:solidFill>
+              </a:rPr>
+              <a:t>Full Data Set</a:t>
+            </a:r>
+          </a:p>
+        </p:txBody>
+      </p:sp>
+      <p:sp>
+        <p:nvSpPr>
+          <p:cNvPr id="31" name="Rounded Rectangle 30"/>
+          <p:cNvSpPr/>
+          <p:nvPr/>
+        </p:nvSpPr>
+        <p:spPr>
+          <a:xfrm>
+            <a:off x="14916150" y="16668750"/>
+            <a:ext cx="1587500" cy="754380"/>
+          </a:xfrm>
+          <a:prstGeom prst="roundRect">
+            <a:avLst/>
+          </a:prstGeom>
+          <a:solidFill>
+            <a:schemeClr val="bg1"/>
+          </a:solidFill>
+          <a:ln w="38100"/>
+        </p:spPr>
+        <p:style>
+          <a:lnRef idx="2">
+            <a:schemeClr val="accent1">
+              <a:shade val="50000"/>
+            </a:schemeClr>
+          </a:lnRef>
+          <a:fillRef idx="1">
+            <a:schemeClr val="accent1"/>
+          </a:fillRef>
+          <a:effectRef idx="0">
+            <a:schemeClr val="accent1"/>
+          </a:effectRef>
+          <a:fontRef idx="minor">
+            <a:schemeClr val="lt1"/>
+          </a:fontRef>
+        </p:style>
+        <p:txBody>
+          <a:bodyPr lIns="125401" tIns="62700" rIns="125401" bIns="62700" rtlCol="0" anchor="ctr"/>
+          <a:lstStyle/>
+          <a:p>
+            <a:pPr algn="ctr"/>
+            <a:r>
+              <a:rPr lang="en-US" sz="1800" dirty="0" smtClean="0">
+                <a:solidFill>
+                  <a:schemeClr val="tx1"/>
+                </a:solidFill>
+              </a:rPr>
+              <a:t>Train Data Set </a:t>
+            </a:r>
+            <a:r>
+              <a:rPr lang="en-US" sz="1800" dirty="0" smtClean="0">
+                <a:solidFill>
+                  <a:schemeClr val="tx1"/>
+                </a:solidFill>
+              </a:rPr>
+              <a:t>100</a:t>
+            </a:r>
+            <a:endParaRPr lang="en-US" sz="1800" dirty="0" smtClean="0">
+              <a:solidFill>
+                <a:schemeClr val="tx1"/>
+              </a:solidFill>
+            </a:endParaRPr>
+          </a:p>
+        </p:txBody>
+      </p:sp>
+      <p:sp>
+        <p:nvSpPr>
+          <p:cNvPr id="32" name="Rounded Rectangle 31"/>
+          <p:cNvSpPr/>
+          <p:nvPr/>
+        </p:nvSpPr>
+        <p:spPr>
+          <a:xfrm>
+            <a:off x="15500350" y="17301210"/>
+            <a:ext cx="1587500" cy="754380"/>
+          </a:xfrm>
+          <a:prstGeom prst="roundRect">
+            <a:avLst/>
+          </a:prstGeom>
+          <a:solidFill>
+            <a:schemeClr val="bg1"/>
+          </a:solidFill>
+          <a:ln w="38100"/>
+        </p:spPr>
+        <p:style>
+          <a:lnRef idx="2">
+            <a:schemeClr val="accent1">
+              <a:shade val="50000"/>
+            </a:schemeClr>
+          </a:lnRef>
+          <a:fillRef idx="1">
+            <a:schemeClr val="accent1"/>
+          </a:fillRef>
+          <a:effectRef idx="0">
+            <a:schemeClr val="accent1"/>
+          </a:effectRef>
+          <a:fontRef idx="minor">
+            <a:schemeClr val="lt1"/>
+          </a:fontRef>
+        </p:style>
+        <p:txBody>
+          <a:bodyPr lIns="125401" tIns="62700" rIns="125401" bIns="62700" rtlCol="0" anchor="ctr"/>
+          <a:lstStyle/>
+          <a:p>
+            <a:pPr algn="ctr"/>
+            <a:r>
+              <a:rPr lang="en-US" sz="1800" dirty="0" smtClean="0">
+                <a:solidFill>
+                  <a:schemeClr val="tx1"/>
+                </a:solidFill>
+              </a:rPr>
+              <a:t>Train Data Set 1</a:t>
+            </a:r>
+          </a:p>
+        </p:txBody>
+      </p:sp>
+      <p:sp>
+        <p:nvSpPr>
+          <p:cNvPr id="33" name="Rounded Rectangle 32"/>
+          <p:cNvSpPr/>
+          <p:nvPr/>
+        </p:nvSpPr>
+        <p:spPr>
+          <a:xfrm>
+            <a:off x="15703550" y="17514570"/>
+            <a:ext cx="1587500" cy="754380"/>
+          </a:xfrm>
+          <a:prstGeom prst="roundRect">
+            <a:avLst/>
+          </a:prstGeom>
+          <a:solidFill>
+            <a:schemeClr val="bg1"/>
+          </a:solidFill>
+          <a:ln w="38100"/>
+        </p:spPr>
+        <p:style>
+          <a:lnRef idx="2">
+            <a:schemeClr val="accent1">
+              <a:shade val="50000"/>
+            </a:schemeClr>
+          </a:lnRef>
+          <a:fillRef idx="1">
+            <a:schemeClr val="accent1"/>
+          </a:fillRef>
+          <a:effectRef idx="0">
+            <a:schemeClr val="accent1"/>
+          </a:effectRef>
+          <a:fontRef idx="minor">
+            <a:schemeClr val="lt1"/>
+          </a:fontRef>
+        </p:style>
+        <p:txBody>
+          <a:bodyPr lIns="125401" tIns="62700" rIns="125401" bIns="62700" rtlCol="0" anchor="ctr"/>
+          <a:lstStyle/>
+          <a:p>
+            <a:pPr algn="ctr"/>
+            <a:r>
+              <a:rPr lang="en-US" sz="1800" dirty="0" smtClean="0">
+                <a:solidFill>
+                  <a:schemeClr val="tx1"/>
+                </a:solidFill>
+              </a:rPr>
+              <a:t>Train Data Set 1</a:t>
+            </a:r>
+          </a:p>
+        </p:txBody>
+      </p:sp>
+      <p:sp>
+        <p:nvSpPr>
+          <p:cNvPr id="34" name="Rounded Rectangle 33"/>
+          <p:cNvSpPr/>
+          <p:nvPr/>
+        </p:nvSpPr>
+        <p:spPr>
+          <a:xfrm>
+            <a:off x="21494750" y="17057370"/>
+            <a:ext cx="1587500" cy="754380"/>
+          </a:xfrm>
+          <a:prstGeom prst="roundRect">
+            <a:avLst/>
+          </a:prstGeom>
+          <a:solidFill>
+            <a:schemeClr val="bg1"/>
+          </a:solidFill>
+          <a:ln w="38100"/>
+        </p:spPr>
+        <p:style>
+          <a:lnRef idx="2">
+            <a:schemeClr val="accent1">
+              <a:shade val="50000"/>
+            </a:schemeClr>
+          </a:lnRef>
+          <a:fillRef idx="1">
+            <a:schemeClr val="accent1"/>
+          </a:fillRef>
+          <a:effectRef idx="0">
+            <a:schemeClr val="accent1"/>
+          </a:effectRef>
+          <a:fontRef idx="minor">
+            <a:schemeClr val="lt1"/>
+          </a:fontRef>
+        </p:style>
+        <p:txBody>
+          <a:bodyPr lIns="125401" tIns="62700" rIns="125401" bIns="62700" rtlCol="0" anchor="ctr"/>
+          <a:lstStyle/>
+          <a:p>
+            <a:pPr algn="ctr"/>
+            <a:r>
+              <a:rPr lang="en-US" sz="1800" dirty="0" smtClean="0">
+                <a:solidFill>
+                  <a:schemeClr val="tx1"/>
+                </a:solidFill>
+              </a:rPr>
+              <a:t>Test </a:t>
+            </a:r>
+            <a:r>
+              <a:rPr lang="en-US" sz="1800" dirty="0" smtClean="0">
+                <a:solidFill>
+                  <a:schemeClr val="tx1"/>
+                </a:solidFill>
+              </a:rPr>
+              <a:t>Data Set </a:t>
+            </a:r>
+          </a:p>
+        </p:txBody>
+      </p:sp>
+      <p:sp>
+        <p:nvSpPr>
+          <p:cNvPr id="35" name="Rectangle 34"/>
+          <p:cNvSpPr/>
+          <p:nvPr/>
+        </p:nvSpPr>
+        <p:spPr>
+          <a:xfrm>
+            <a:off x="14992350" y="18573750"/>
+            <a:ext cx="8153400" cy="7848600"/>
+          </a:xfrm>
+          <a:prstGeom prst="rect">
+            <a:avLst/>
+          </a:prstGeom>
+          <a:noFill/>
+          <a:ln w="38100">
+            <a:prstDash val="sysDash"/>
+          </a:ln>
+        </p:spPr>
+        <p:style>
+          <a:lnRef idx="2">
+            <a:schemeClr val="accent1">
+              <a:shade val="50000"/>
+            </a:schemeClr>
+          </a:lnRef>
+          <a:fillRef idx="1">
+            <a:schemeClr val="accent1"/>
+          </a:fillRef>
+          <a:effectRef idx="0">
+            <a:schemeClr val="accent1"/>
+          </a:effectRef>
+          <a:fontRef idx="minor">
+            <a:schemeClr val="lt1"/>
+          </a:fontRef>
+        </p:style>
+        <p:txBody>
+          <a:bodyPr lIns="125401" tIns="62700" rIns="125401" bIns="62700" rtlCol="0" anchor="ctr"/>
+          <a:lstStyle/>
+          <a:p>
+            <a:pPr algn="ctr"/>
+            <a:endParaRPr lang="en-US" sz="1800" dirty="0"/>
+          </a:p>
+        </p:txBody>
+      </p:sp>
+      <p:sp>
+        <p:nvSpPr>
+          <p:cNvPr id="36" name="Rectangle 35"/>
+          <p:cNvSpPr/>
+          <p:nvPr/>
+        </p:nvSpPr>
+        <p:spPr>
+          <a:xfrm>
+            <a:off x="16118417" y="18726150"/>
+            <a:ext cx="1693333" cy="670560"/>
+          </a:xfrm>
+          <a:prstGeom prst="rect">
+            <a:avLst/>
+          </a:prstGeom>
+          <a:solidFill>
+            <a:schemeClr val="bg1"/>
+          </a:solidFill>
+          <a:ln w="38100"/>
+        </p:spPr>
+        <p:style>
+          <a:lnRef idx="2">
+            <a:schemeClr val="accent1">
+              <a:shade val="50000"/>
+            </a:schemeClr>
+          </a:lnRef>
+          <a:fillRef idx="1">
+            <a:schemeClr val="accent1"/>
+          </a:fillRef>
+          <a:effectRef idx="0">
+            <a:schemeClr val="accent1"/>
+          </a:effectRef>
+          <a:fontRef idx="minor">
+            <a:schemeClr val="lt1"/>
+          </a:fontRef>
+        </p:style>
+        <p:txBody>
+          <a:bodyPr lIns="125401" tIns="62700" rIns="125401" bIns="62700" rtlCol="0" anchor="ctr"/>
+          <a:lstStyle/>
+          <a:p>
+            <a:pPr algn="ctr"/>
+            <a:r>
+              <a:rPr lang="en-US" sz="1800" dirty="0" smtClean="0">
+                <a:solidFill>
+                  <a:schemeClr val="tx1"/>
+                </a:solidFill>
+              </a:rPr>
+              <a:t>Get Train Data</a:t>
+            </a:r>
+            <a:endParaRPr lang="en-US" sz="1800" dirty="0">
+              <a:solidFill>
+                <a:schemeClr val="tx1"/>
+              </a:solidFill>
+            </a:endParaRPr>
+          </a:p>
+        </p:txBody>
+      </p:sp>
+      <p:sp>
+        <p:nvSpPr>
+          <p:cNvPr id="37" name="Flowchart: Decision 36"/>
+          <p:cNvSpPr/>
+          <p:nvPr/>
+        </p:nvSpPr>
+        <p:spPr>
+          <a:xfrm>
+            <a:off x="18192750" y="19640550"/>
+            <a:ext cx="2717800" cy="914400"/>
+          </a:xfrm>
+          <a:prstGeom prst="flowChartDecision">
+            <a:avLst/>
+          </a:prstGeom>
+          <a:solidFill>
+            <a:schemeClr val="bg1"/>
+          </a:solidFill>
+          <a:ln w="38100"/>
+        </p:spPr>
+        <p:style>
+          <a:lnRef idx="2">
+            <a:schemeClr val="accent1">
+              <a:shade val="50000"/>
+            </a:schemeClr>
+          </a:lnRef>
+          <a:fillRef idx="1">
+            <a:schemeClr val="accent1"/>
+          </a:fillRef>
+          <a:effectRef idx="0">
+            <a:schemeClr val="accent1"/>
+          </a:effectRef>
+          <a:fontRef idx="minor">
+            <a:schemeClr val="lt1"/>
+          </a:fontRef>
+        </p:style>
+        <p:txBody>
+          <a:bodyPr lIns="125401" tIns="62700" rIns="125401" bIns="62700" rtlCol="0" anchor="ctr"/>
+          <a:lstStyle/>
+          <a:p>
+            <a:pPr algn="ctr"/>
+            <a:r>
+              <a:rPr lang="en-US" sz="1800" dirty="0" smtClean="0">
+                <a:solidFill>
+                  <a:schemeClr val="tx1"/>
+                </a:solidFill>
+              </a:rPr>
+              <a:t>Dimension Reduction?</a:t>
+            </a:r>
+            <a:endParaRPr lang="en-US" sz="1800" dirty="0">
+              <a:solidFill>
+                <a:schemeClr val="tx1"/>
+              </a:solidFill>
+            </a:endParaRPr>
+          </a:p>
+        </p:txBody>
+      </p:sp>
+      <p:sp>
+        <p:nvSpPr>
+          <p:cNvPr id="43" name="Oval 42"/>
+          <p:cNvSpPr/>
+          <p:nvPr/>
+        </p:nvSpPr>
+        <p:spPr>
+          <a:xfrm>
+            <a:off x="18573750" y="17994630"/>
+            <a:ext cx="1778000" cy="922020"/>
+          </a:xfrm>
+          <a:prstGeom prst="ellipse">
+            <a:avLst/>
+          </a:prstGeom>
+          <a:solidFill>
+            <a:schemeClr val="bg1"/>
+          </a:solidFill>
+          <a:ln w="38100"/>
+        </p:spPr>
+        <p:style>
+          <a:lnRef idx="2">
+            <a:schemeClr val="accent1">
+              <a:shade val="50000"/>
+            </a:schemeClr>
+          </a:lnRef>
+          <a:fillRef idx="1">
+            <a:schemeClr val="accent1"/>
+          </a:fillRef>
+          <a:effectRef idx="0">
+            <a:schemeClr val="accent1"/>
+          </a:effectRef>
+          <a:fontRef idx="minor">
+            <a:schemeClr val="lt1"/>
+          </a:fontRef>
+        </p:style>
+        <p:txBody>
+          <a:bodyPr lIns="125401" tIns="62700" rIns="125401" bIns="62700" rtlCol="0" anchor="ctr"/>
+          <a:lstStyle/>
+          <a:p>
+            <a:pPr algn="ctr"/>
+            <a:r>
+              <a:rPr lang="en-US" sz="1800" dirty="0" smtClean="0">
+                <a:solidFill>
+                  <a:schemeClr val="tx1"/>
+                </a:solidFill>
+              </a:rPr>
+              <a:t>For </a:t>
+            </a:r>
+            <a:r>
+              <a:rPr lang="en-US" sz="1800" dirty="0" err="1" smtClean="0">
+                <a:solidFill>
+                  <a:schemeClr val="tx1"/>
+                </a:solidFill>
+              </a:rPr>
+              <a:t>i</a:t>
+            </a:r>
+            <a:r>
+              <a:rPr lang="en-US" sz="1800" dirty="0" smtClean="0">
+                <a:solidFill>
+                  <a:schemeClr val="tx1"/>
+                </a:solidFill>
+              </a:rPr>
+              <a:t>=1:100</a:t>
+            </a:r>
+            <a:endParaRPr lang="en-US" sz="1800" dirty="0">
+              <a:solidFill>
+                <a:schemeClr val="tx1"/>
+              </a:solidFill>
+            </a:endParaRPr>
+          </a:p>
+        </p:txBody>
+      </p:sp>
+      <p:cxnSp>
+        <p:nvCxnSpPr>
+          <p:cNvPr id="48" name="Shape 47"/>
+          <p:cNvCxnSpPr>
+            <a:stCxn id="43" idx="4"/>
+            <a:endCxn id="36" idx="3"/>
+          </p:cNvCxnSpPr>
+          <p:nvPr/>
+        </p:nvCxnSpPr>
+        <p:spPr>
+          <a:xfrm rot="5400000">
+            <a:off x="18564860" y="18163540"/>
+            <a:ext cx="144780" cy="1651000"/>
+          </a:xfrm>
+          <a:prstGeom prst="bentConnector2">
+            <a:avLst/>
+          </a:prstGeom>
+          <a:ln w="38100">
+            <a:tailEnd type="arrow"/>
+          </a:ln>
+        </p:spPr>
+        <p:style>
+          <a:lnRef idx="1">
+            <a:schemeClr val="accent1"/>
+          </a:lnRef>
+          <a:fillRef idx="0">
+            <a:schemeClr val="accent1"/>
+          </a:fillRef>
+          <a:effectRef idx="0">
+            <a:schemeClr val="accent1"/>
+          </a:effectRef>
+          <a:fontRef idx="minor">
+            <a:schemeClr val="tx1"/>
+          </a:fontRef>
+        </p:style>
+      </p:cxnSp>
+      <p:cxnSp>
+        <p:nvCxnSpPr>
+          <p:cNvPr id="49" name="Shape 48"/>
+          <p:cNvCxnSpPr>
+            <a:endCxn id="36" idx="0"/>
+          </p:cNvCxnSpPr>
+          <p:nvPr/>
+        </p:nvCxnSpPr>
+        <p:spPr>
+          <a:xfrm>
+            <a:off x="15678150" y="18345150"/>
+            <a:ext cx="1286934" cy="381000"/>
+          </a:xfrm>
+          <a:prstGeom prst="bentConnector2">
+            <a:avLst/>
+          </a:prstGeom>
+          <a:ln w="38100">
+            <a:tailEnd type="arrow"/>
+          </a:ln>
+        </p:spPr>
+        <p:style>
+          <a:lnRef idx="1">
+            <a:schemeClr val="accent1"/>
+          </a:lnRef>
+          <a:fillRef idx="0">
+            <a:schemeClr val="accent1"/>
+          </a:fillRef>
+          <a:effectRef idx="0">
+            <a:schemeClr val="accent1"/>
+          </a:effectRef>
+          <a:fontRef idx="minor">
+            <a:schemeClr val="tx1"/>
+          </a:fontRef>
+        </p:style>
+      </p:cxnSp>
+      <p:sp>
+        <p:nvSpPr>
+          <p:cNvPr id="50" name="TextBox 49"/>
+          <p:cNvSpPr txBox="1"/>
+          <p:nvPr/>
+        </p:nvSpPr>
+        <p:spPr>
+          <a:xfrm>
+            <a:off x="17964150" y="18707040"/>
+            <a:ext cx="243978" cy="400110"/>
+          </a:xfrm>
+          <a:prstGeom prst="rect">
+            <a:avLst/>
+          </a:prstGeom>
+          <a:noFill/>
+          <a:ln w="38100">
+            <a:noFill/>
+          </a:ln>
+        </p:spPr>
+        <p:txBody>
+          <a:bodyPr wrap="none" rtlCol="0">
+            <a:spAutoFit/>
+          </a:bodyPr>
+          <a:lstStyle/>
+          <a:p>
+            <a:r>
+              <a:rPr lang="en-US" sz="2000" dirty="0" err="1" smtClean="0"/>
+              <a:t>i</a:t>
+            </a:r>
+            <a:endParaRPr lang="en-US" sz="2000" dirty="0"/>
+          </a:p>
+        </p:txBody>
+      </p:sp>
+      <p:cxnSp>
+        <p:nvCxnSpPr>
+          <p:cNvPr id="51" name="Straight Arrow Connector 50"/>
+          <p:cNvCxnSpPr>
+            <a:stCxn id="30" idx="1"/>
+          </p:cNvCxnSpPr>
+          <p:nvPr/>
+        </p:nvCxnSpPr>
+        <p:spPr>
+          <a:xfrm flipH="1" flipV="1">
+            <a:off x="17202150" y="17430750"/>
+            <a:ext cx="584200" cy="5080"/>
+          </a:xfrm>
+          <a:prstGeom prst="straightConnector1">
+            <a:avLst/>
+          </a:prstGeom>
+          <a:ln w="38100">
+            <a:tailEnd type="arrow"/>
+          </a:ln>
+        </p:spPr>
+        <p:style>
+          <a:lnRef idx="1">
+            <a:schemeClr val="accent1"/>
+          </a:lnRef>
+          <a:fillRef idx="0">
+            <a:schemeClr val="accent1"/>
+          </a:fillRef>
+          <a:effectRef idx="0">
+            <a:schemeClr val="accent1"/>
+          </a:effectRef>
+          <a:fontRef idx="minor">
+            <a:schemeClr val="tx1"/>
+          </a:fontRef>
+        </p:style>
+      </p:cxnSp>
+      <p:cxnSp>
+        <p:nvCxnSpPr>
+          <p:cNvPr id="52" name="Straight Arrow Connector 51"/>
+          <p:cNvCxnSpPr>
+            <a:stCxn id="30" idx="3"/>
+            <a:endCxn id="34" idx="1"/>
+          </p:cNvCxnSpPr>
+          <p:nvPr/>
+        </p:nvCxnSpPr>
+        <p:spPr>
+          <a:xfrm flipV="1">
+            <a:off x="20707350" y="17434560"/>
+            <a:ext cx="787400" cy="1270"/>
+          </a:xfrm>
+          <a:prstGeom prst="straightConnector1">
+            <a:avLst/>
+          </a:prstGeom>
+          <a:ln w="38100">
+            <a:tailEnd type="arrow"/>
+          </a:ln>
+        </p:spPr>
+        <p:style>
+          <a:lnRef idx="1">
+            <a:schemeClr val="accent1"/>
+          </a:lnRef>
+          <a:fillRef idx="0">
+            <a:schemeClr val="accent1"/>
+          </a:fillRef>
+          <a:effectRef idx="0">
+            <a:schemeClr val="accent1"/>
+          </a:effectRef>
+          <a:fontRef idx="minor">
+            <a:schemeClr val="tx1"/>
+          </a:fontRef>
+        </p:style>
+      </p:cxnSp>
+      <p:sp>
+        <p:nvSpPr>
+          <p:cNvPr id="53" name="Oval 52"/>
+          <p:cNvSpPr/>
+          <p:nvPr/>
+        </p:nvSpPr>
+        <p:spPr>
+          <a:xfrm>
+            <a:off x="15068550" y="17125950"/>
+            <a:ext cx="45719" cy="76200"/>
+          </a:xfrm>
+          <a:prstGeom prst="ellipse">
+            <a:avLst/>
+          </a:prstGeom>
+          <a:ln w="38100"/>
+        </p:spPr>
+        <p:style>
+          <a:lnRef idx="2">
+            <a:schemeClr val="accent1">
+              <a:shade val="50000"/>
+            </a:schemeClr>
+          </a:lnRef>
+          <a:fillRef idx="1">
+            <a:schemeClr val="accent1"/>
+          </a:fillRef>
+          <a:effectRef idx="0">
+            <a:schemeClr val="accent1"/>
+          </a:effectRef>
+          <a:fontRef idx="minor">
+            <a:schemeClr val="lt1"/>
+          </a:fontRef>
+        </p:style>
+        <p:txBody>
+          <a:bodyPr rtlCol="0" anchor="ctr"/>
+          <a:lstStyle/>
+          <a:p>
+            <a:pPr algn="ctr"/>
+            <a:endParaRPr lang="en-US"/>
+          </a:p>
+        </p:txBody>
+      </p:sp>
+      <p:sp>
+        <p:nvSpPr>
+          <p:cNvPr id="54" name="Oval 53"/>
+          <p:cNvSpPr/>
+          <p:nvPr/>
+        </p:nvSpPr>
+        <p:spPr>
+          <a:xfrm>
+            <a:off x="15220950" y="17278350"/>
+            <a:ext cx="45719" cy="76200"/>
+          </a:xfrm>
+          <a:prstGeom prst="ellipse">
+            <a:avLst/>
+          </a:prstGeom>
+          <a:ln w="38100"/>
+        </p:spPr>
+        <p:style>
+          <a:lnRef idx="2">
+            <a:schemeClr val="accent1">
+              <a:shade val="50000"/>
+            </a:schemeClr>
+          </a:lnRef>
+          <a:fillRef idx="1">
+            <a:schemeClr val="accent1"/>
+          </a:fillRef>
+          <a:effectRef idx="0">
+            <a:schemeClr val="accent1"/>
+          </a:effectRef>
+          <a:fontRef idx="minor">
+            <a:schemeClr val="lt1"/>
+          </a:fontRef>
+        </p:style>
+        <p:txBody>
+          <a:bodyPr rtlCol="0" anchor="ctr"/>
+          <a:lstStyle/>
+          <a:p>
+            <a:pPr algn="ctr"/>
+            <a:endParaRPr lang="en-US"/>
+          </a:p>
+        </p:txBody>
+      </p:sp>
+      <p:sp>
+        <p:nvSpPr>
+          <p:cNvPr id="55" name="Oval 54"/>
+          <p:cNvSpPr/>
+          <p:nvPr/>
+        </p:nvSpPr>
+        <p:spPr>
+          <a:xfrm>
+            <a:off x="15373350" y="17430750"/>
+            <a:ext cx="45719" cy="76200"/>
+          </a:xfrm>
+          <a:prstGeom prst="ellipse">
+            <a:avLst/>
+          </a:prstGeom>
+          <a:ln w="38100"/>
+        </p:spPr>
+        <p:style>
+          <a:lnRef idx="2">
+            <a:schemeClr val="accent1">
+              <a:shade val="50000"/>
+            </a:schemeClr>
+          </a:lnRef>
+          <a:fillRef idx="1">
+            <a:schemeClr val="accent1"/>
+          </a:fillRef>
+          <a:effectRef idx="0">
+            <a:schemeClr val="accent1"/>
+          </a:effectRef>
+          <a:fontRef idx="minor">
+            <a:schemeClr val="lt1"/>
+          </a:fontRef>
+        </p:style>
+        <p:txBody>
+          <a:bodyPr rtlCol="0" anchor="ctr"/>
+          <a:lstStyle/>
+          <a:p>
+            <a:pPr algn="ctr"/>
+            <a:endParaRPr lang="en-US"/>
+          </a:p>
+        </p:txBody>
+      </p:sp>
+      <p:sp>
+        <p:nvSpPr>
+          <p:cNvPr id="56" name="TextBox 55"/>
+          <p:cNvSpPr txBox="1"/>
+          <p:nvPr/>
+        </p:nvSpPr>
+        <p:spPr>
+          <a:xfrm>
+            <a:off x="16973550" y="19716750"/>
+            <a:ext cx="1380314" cy="707886"/>
+          </a:xfrm>
+          <a:prstGeom prst="rect">
+            <a:avLst/>
+          </a:prstGeom>
+          <a:noFill/>
+          <a:ln w="38100">
+            <a:noFill/>
+          </a:ln>
+        </p:spPr>
+        <p:txBody>
+          <a:bodyPr wrap="none" rtlCol="0">
+            <a:spAutoFit/>
+          </a:bodyPr>
+          <a:lstStyle/>
+          <a:p>
+            <a:r>
+              <a:rPr lang="en-US" sz="2000" dirty="0" smtClean="0"/>
+              <a:t>No</a:t>
+            </a:r>
+          </a:p>
+          <a:p>
+            <a:r>
+              <a:rPr lang="en-US" sz="2000" dirty="0" smtClean="0"/>
+              <a:t>(Train Path)</a:t>
+            </a:r>
+            <a:endParaRPr lang="en-US" sz="2000" dirty="0"/>
+          </a:p>
+        </p:txBody>
+      </p:sp>
+      <p:sp>
+        <p:nvSpPr>
+          <p:cNvPr id="57" name="Rectangle 56"/>
+          <p:cNvSpPr/>
+          <p:nvPr/>
+        </p:nvSpPr>
+        <p:spPr>
+          <a:xfrm>
+            <a:off x="19699817" y="21103590"/>
+            <a:ext cx="1693333" cy="670560"/>
+          </a:xfrm>
+          <a:prstGeom prst="rect">
+            <a:avLst/>
+          </a:prstGeom>
+          <a:solidFill>
+            <a:schemeClr val="bg1"/>
+          </a:solidFill>
+          <a:ln w="38100"/>
+        </p:spPr>
+        <p:style>
+          <a:lnRef idx="2">
+            <a:schemeClr val="accent1">
+              <a:shade val="50000"/>
+            </a:schemeClr>
+          </a:lnRef>
+          <a:fillRef idx="1">
+            <a:schemeClr val="accent1"/>
+          </a:fillRef>
+          <a:effectRef idx="0">
+            <a:schemeClr val="accent1"/>
+          </a:effectRef>
+          <a:fontRef idx="minor">
+            <a:schemeClr val="lt1"/>
+          </a:fontRef>
+        </p:style>
+        <p:txBody>
+          <a:bodyPr lIns="125401" tIns="62700" rIns="125401" bIns="62700" rtlCol="0" anchor="ctr"/>
+          <a:lstStyle/>
+          <a:p>
+            <a:pPr algn="ctr"/>
+            <a:r>
+              <a:rPr lang="en-US" sz="1800" dirty="0" smtClean="0">
+                <a:solidFill>
+                  <a:schemeClr val="tx1"/>
+                </a:solidFill>
+              </a:rPr>
+              <a:t>Do PCA</a:t>
+            </a:r>
+            <a:endParaRPr lang="en-US" sz="1800" dirty="0">
+              <a:solidFill>
+                <a:schemeClr val="tx1"/>
+              </a:solidFill>
+            </a:endParaRPr>
+          </a:p>
+        </p:txBody>
+      </p:sp>
+      <p:sp>
+        <p:nvSpPr>
+          <p:cNvPr id="58" name="Rectangle 57"/>
+          <p:cNvSpPr/>
+          <p:nvPr/>
+        </p:nvSpPr>
+        <p:spPr>
+          <a:xfrm>
+            <a:off x="19699817" y="21850350"/>
+            <a:ext cx="1693333" cy="670560"/>
+          </a:xfrm>
+          <a:prstGeom prst="rect">
+            <a:avLst/>
+          </a:prstGeom>
+          <a:solidFill>
+            <a:schemeClr val="bg1"/>
+          </a:solidFill>
+          <a:ln w="38100"/>
+        </p:spPr>
+        <p:style>
+          <a:lnRef idx="2">
+            <a:schemeClr val="accent1">
+              <a:shade val="50000"/>
+            </a:schemeClr>
+          </a:lnRef>
+          <a:fillRef idx="1">
+            <a:schemeClr val="accent1"/>
+          </a:fillRef>
+          <a:effectRef idx="0">
+            <a:schemeClr val="accent1"/>
+          </a:effectRef>
+          <a:fontRef idx="minor">
+            <a:schemeClr val="lt1"/>
+          </a:fontRef>
+        </p:style>
+        <p:txBody>
+          <a:bodyPr lIns="125401" tIns="62700" rIns="125401" bIns="62700" rtlCol="0" anchor="ctr"/>
+          <a:lstStyle/>
+          <a:p>
+            <a:pPr algn="ctr"/>
+            <a:r>
+              <a:rPr lang="en-US" sz="1800" dirty="0" smtClean="0">
+                <a:solidFill>
+                  <a:schemeClr val="tx1"/>
+                </a:solidFill>
+              </a:rPr>
+              <a:t>Do </a:t>
+            </a:r>
+            <a:r>
+              <a:rPr lang="en-US" sz="1800" dirty="0" err="1" smtClean="0">
+                <a:solidFill>
+                  <a:schemeClr val="tx1"/>
+                </a:solidFill>
+              </a:rPr>
+              <a:t>GoDec</a:t>
+            </a:r>
+            <a:endParaRPr lang="en-US" sz="1800" dirty="0">
+              <a:solidFill>
+                <a:schemeClr val="tx1"/>
+              </a:solidFill>
+            </a:endParaRPr>
+          </a:p>
+        </p:txBody>
+      </p:sp>
+      <p:sp>
+        <p:nvSpPr>
+          <p:cNvPr id="59" name="Flowchart: Decision 58"/>
+          <p:cNvSpPr/>
+          <p:nvPr/>
+        </p:nvSpPr>
+        <p:spPr>
+          <a:xfrm>
+            <a:off x="17735550" y="21012150"/>
+            <a:ext cx="1828800" cy="838200"/>
+          </a:xfrm>
+          <a:prstGeom prst="flowChartDecision">
+            <a:avLst/>
+          </a:prstGeom>
+          <a:solidFill>
+            <a:schemeClr val="bg1"/>
+          </a:solidFill>
+          <a:ln w="38100"/>
+        </p:spPr>
+        <p:style>
+          <a:lnRef idx="2">
+            <a:schemeClr val="accent1">
+              <a:shade val="50000"/>
+            </a:schemeClr>
+          </a:lnRef>
+          <a:fillRef idx="1">
+            <a:schemeClr val="accent1"/>
+          </a:fillRef>
+          <a:effectRef idx="0">
+            <a:schemeClr val="accent1"/>
+          </a:effectRef>
+          <a:fontRef idx="minor">
+            <a:schemeClr val="lt1"/>
+          </a:fontRef>
+        </p:style>
+        <p:txBody>
+          <a:bodyPr lIns="125401" tIns="62700" rIns="125401" bIns="62700" rtlCol="0" anchor="ctr"/>
+          <a:lstStyle/>
+          <a:p>
+            <a:pPr algn="ctr"/>
+            <a:r>
+              <a:rPr lang="en-US" sz="1800" dirty="0" smtClean="0">
+                <a:solidFill>
+                  <a:schemeClr val="tx1"/>
+                </a:solidFill>
+              </a:rPr>
+              <a:t>Type of DR</a:t>
+            </a:r>
+            <a:endParaRPr lang="en-US" sz="1800" dirty="0">
+              <a:solidFill>
+                <a:schemeClr val="tx1"/>
+              </a:solidFill>
+            </a:endParaRPr>
+          </a:p>
+        </p:txBody>
+      </p:sp>
+      <p:sp>
+        <p:nvSpPr>
+          <p:cNvPr id="60" name="Rectangle 59"/>
+          <p:cNvSpPr/>
+          <p:nvPr/>
+        </p:nvSpPr>
+        <p:spPr>
+          <a:xfrm>
+            <a:off x="17583150" y="20935950"/>
+            <a:ext cx="4191000" cy="1676400"/>
+          </a:xfrm>
+          <a:prstGeom prst="rect">
+            <a:avLst/>
+          </a:prstGeom>
+          <a:noFill/>
+          <a:ln w="38100">
+            <a:prstDash val="sysDot"/>
+          </a:ln>
+        </p:spPr>
+        <p:style>
+          <a:lnRef idx="2">
+            <a:schemeClr val="accent1">
+              <a:shade val="50000"/>
+            </a:schemeClr>
+          </a:lnRef>
+          <a:fillRef idx="1">
+            <a:schemeClr val="accent1"/>
+          </a:fillRef>
+          <a:effectRef idx="0">
+            <a:schemeClr val="accent1"/>
+          </a:effectRef>
+          <a:fontRef idx="minor">
+            <a:schemeClr val="lt1"/>
+          </a:fontRef>
+        </p:style>
+        <p:txBody>
+          <a:bodyPr rtlCol="0" anchor="ctr"/>
+          <a:lstStyle/>
+          <a:p>
+            <a:pPr algn="ctr"/>
+            <a:endParaRPr lang="en-US"/>
+          </a:p>
+        </p:txBody>
+      </p:sp>
+      <p:sp>
+        <p:nvSpPr>
+          <p:cNvPr id="61" name="Flowchart: Decision 60"/>
+          <p:cNvSpPr/>
+          <p:nvPr/>
+        </p:nvSpPr>
+        <p:spPr>
+          <a:xfrm>
+            <a:off x="15932150" y="22917150"/>
+            <a:ext cx="2184400" cy="762000"/>
+          </a:xfrm>
+          <a:prstGeom prst="flowChartDecision">
+            <a:avLst/>
+          </a:prstGeom>
+          <a:solidFill>
+            <a:schemeClr val="bg1"/>
+          </a:solidFill>
+          <a:ln w="38100"/>
+        </p:spPr>
+        <p:style>
+          <a:lnRef idx="2">
+            <a:schemeClr val="accent1">
+              <a:shade val="50000"/>
+            </a:schemeClr>
+          </a:lnRef>
+          <a:fillRef idx="1">
+            <a:schemeClr val="accent1"/>
+          </a:fillRef>
+          <a:effectRef idx="0">
+            <a:schemeClr val="accent1"/>
+          </a:effectRef>
+          <a:fontRef idx="minor">
+            <a:schemeClr val="lt1"/>
+          </a:fontRef>
+        </p:style>
+        <p:txBody>
+          <a:bodyPr lIns="125401" tIns="62700" rIns="125401" bIns="62700" rtlCol="0" anchor="ctr"/>
+          <a:lstStyle/>
+          <a:p>
+            <a:pPr algn="ctr"/>
+            <a:r>
+              <a:rPr lang="en-US" sz="1800" dirty="0" smtClean="0">
+                <a:solidFill>
+                  <a:schemeClr val="tx1"/>
+                </a:solidFill>
+              </a:rPr>
+              <a:t>Virtual Data?</a:t>
+            </a:r>
+            <a:endParaRPr lang="en-US" sz="1800" dirty="0">
+              <a:solidFill>
+                <a:schemeClr val="tx1"/>
+              </a:solidFill>
+            </a:endParaRPr>
+          </a:p>
+        </p:txBody>
+      </p:sp>
+      <p:sp>
+        <p:nvSpPr>
+          <p:cNvPr id="62" name="Rectangle 61"/>
+          <p:cNvSpPr/>
+          <p:nvPr/>
+        </p:nvSpPr>
+        <p:spPr>
+          <a:xfrm>
+            <a:off x="18480617" y="24593550"/>
+            <a:ext cx="1693333" cy="670560"/>
+          </a:xfrm>
+          <a:prstGeom prst="rect">
+            <a:avLst/>
+          </a:prstGeom>
+          <a:solidFill>
+            <a:schemeClr val="bg1"/>
+          </a:solidFill>
+          <a:ln w="38100"/>
+        </p:spPr>
+        <p:style>
+          <a:lnRef idx="2">
+            <a:schemeClr val="accent1">
+              <a:shade val="50000"/>
+            </a:schemeClr>
+          </a:lnRef>
+          <a:fillRef idx="1">
+            <a:schemeClr val="accent1"/>
+          </a:fillRef>
+          <a:effectRef idx="0">
+            <a:schemeClr val="accent1"/>
+          </a:effectRef>
+          <a:fontRef idx="minor">
+            <a:schemeClr val="lt1"/>
+          </a:fontRef>
+        </p:style>
+        <p:txBody>
+          <a:bodyPr lIns="125401" tIns="62700" rIns="125401" bIns="62700" rtlCol="0" anchor="ctr"/>
+          <a:lstStyle/>
+          <a:p>
+            <a:pPr algn="ctr"/>
+            <a:r>
+              <a:rPr lang="en-US" sz="1800" dirty="0" smtClean="0">
+                <a:solidFill>
+                  <a:schemeClr val="tx1"/>
+                </a:solidFill>
+              </a:rPr>
+              <a:t>SVM Train</a:t>
+            </a:r>
+            <a:endParaRPr lang="en-US" sz="1800" dirty="0">
+              <a:solidFill>
+                <a:schemeClr val="tx1"/>
+              </a:solidFill>
+            </a:endParaRPr>
+          </a:p>
+        </p:txBody>
+      </p:sp>
+      <p:sp>
+        <p:nvSpPr>
+          <p:cNvPr id="63" name="Rectangle 62"/>
+          <p:cNvSpPr/>
+          <p:nvPr/>
+        </p:nvSpPr>
+        <p:spPr>
+          <a:xfrm>
+            <a:off x="18480617" y="25431750"/>
+            <a:ext cx="1693333" cy="670560"/>
+          </a:xfrm>
+          <a:prstGeom prst="rect">
+            <a:avLst/>
+          </a:prstGeom>
+          <a:solidFill>
+            <a:schemeClr val="bg1"/>
+          </a:solidFill>
+          <a:ln w="38100"/>
+        </p:spPr>
+        <p:style>
+          <a:lnRef idx="2">
+            <a:schemeClr val="accent1">
+              <a:shade val="50000"/>
+            </a:schemeClr>
+          </a:lnRef>
+          <a:fillRef idx="1">
+            <a:schemeClr val="accent1"/>
+          </a:fillRef>
+          <a:effectRef idx="0">
+            <a:schemeClr val="accent1"/>
+          </a:effectRef>
+          <a:fontRef idx="minor">
+            <a:schemeClr val="lt1"/>
+          </a:fontRef>
+        </p:style>
+        <p:txBody>
+          <a:bodyPr lIns="125401" tIns="62700" rIns="125401" bIns="62700" rtlCol="0" anchor="ctr"/>
+          <a:lstStyle/>
+          <a:p>
+            <a:pPr algn="ctr"/>
+            <a:r>
+              <a:rPr lang="en-US" sz="1800" dirty="0" smtClean="0">
+                <a:solidFill>
+                  <a:schemeClr val="tx1"/>
+                </a:solidFill>
+              </a:rPr>
+              <a:t>NB Train</a:t>
+            </a:r>
+            <a:endParaRPr lang="en-US" sz="1800" dirty="0">
+              <a:solidFill>
+                <a:schemeClr val="tx1"/>
+              </a:solidFill>
+            </a:endParaRPr>
+          </a:p>
+        </p:txBody>
+      </p:sp>
+      <p:sp>
+        <p:nvSpPr>
+          <p:cNvPr id="64" name="Flowchart: Decision 63"/>
+          <p:cNvSpPr/>
+          <p:nvPr/>
+        </p:nvSpPr>
+        <p:spPr>
+          <a:xfrm>
+            <a:off x="15906750" y="25050750"/>
+            <a:ext cx="2286000" cy="838200"/>
+          </a:xfrm>
+          <a:prstGeom prst="flowChartDecision">
+            <a:avLst/>
+          </a:prstGeom>
+          <a:solidFill>
+            <a:schemeClr val="bg1"/>
+          </a:solidFill>
+          <a:ln w="38100"/>
+        </p:spPr>
+        <p:style>
+          <a:lnRef idx="2">
+            <a:schemeClr val="accent1">
+              <a:shade val="50000"/>
+            </a:schemeClr>
+          </a:lnRef>
+          <a:fillRef idx="1">
+            <a:schemeClr val="accent1"/>
+          </a:fillRef>
+          <a:effectRef idx="0">
+            <a:schemeClr val="accent1"/>
+          </a:effectRef>
+          <a:fontRef idx="minor">
+            <a:schemeClr val="lt1"/>
+          </a:fontRef>
+        </p:style>
+        <p:txBody>
+          <a:bodyPr lIns="125401" tIns="62700" rIns="125401" bIns="62700" rtlCol="0" anchor="ctr"/>
+          <a:lstStyle/>
+          <a:p>
+            <a:pPr algn="ctr"/>
+            <a:r>
+              <a:rPr lang="en-US" sz="1800" dirty="0" smtClean="0">
+                <a:solidFill>
+                  <a:schemeClr val="tx1"/>
+                </a:solidFill>
+              </a:rPr>
+              <a:t>Classifier</a:t>
+            </a:r>
+          </a:p>
+          <a:p>
+            <a:pPr algn="ctr"/>
+            <a:r>
+              <a:rPr lang="en-US" sz="1800" dirty="0" smtClean="0">
+                <a:solidFill>
+                  <a:schemeClr val="tx1"/>
+                </a:solidFill>
+              </a:rPr>
+              <a:t>Type</a:t>
+            </a:r>
+            <a:endParaRPr lang="en-US" sz="1800" dirty="0">
+              <a:solidFill>
+                <a:schemeClr val="tx1"/>
+              </a:solidFill>
+            </a:endParaRPr>
+          </a:p>
+        </p:txBody>
+      </p:sp>
+      <p:sp>
+        <p:nvSpPr>
+          <p:cNvPr id="65" name="Rectangle 64"/>
+          <p:cNvSpPr/>
+          <p:nvPr/>
+        </p:nvSpPr>
+        <p:spPr>
+          <a:xfrm>
+            <a:off x="16194617" y="23907750"/>
+            <a:ext cx="1693333" cy="670560"/>
+          </a:xfrm>
+          <a:prstGeom prst="rect">
+            <a:avLst/>
+          </a:prstGeom>
+          <a:solidFill>
+            <a:schemeClr val="bg1"/>
+          </a:solidFill>
+          <a:ln w="38100"/>
+        </p:spPr>
+        <p:style>
+          <a:lnRef idx="2">
+            <a:schemeClr val="accent1">
+              <a:shade val="50000"/>
+            </a:schemeClr>
+          </a:lnRef>
+          <a:fillRef idx="1">
+            <a:schemeClr val="accent1"/>
+          </a:fillRef>
+          <a:effectRef idx="0">
+            <a:schemeClr val="accent1"/>
+          </a:effectRef>
+          <a:fontRef idx="minor">
+            <a:schemeClr val="lt1"/>
+          </a:fontRef>
+        </p:style>
+        <p:txBody>
+          <a:bodyPr lIns="125401" tIns="62700" rIns="125401" bIns="62700" rtlCol="0" anchor="ctr"/>
+          <a:lstStyle/>
+          <a:p>
+            <a:pPr algn="ctr"/>
+            <a:r>
+              <a:rPr lang="en-US" sz="1800" dirty="0" smtClean="0">
+                <a:solidFill>
+                  <a:schemeClr val="tx1"/>
+                </a:solidFill>
+              </a:rPr>
+              <a:t>Create Virtual Data</a:t>
+            </a:r>
+            <a:endParaRPr lang="en-US" sz="1800" dirty="0">
+              <a:solidFill>
+                <a:schemeClr val="tx1"/>
+              </a:solidFill>
+            </a:endParaRPr>
+          </a:p>
+        </p:txBody>
+      </p:sp>
+      <p:cxnSp>
+        <p:nvCxnSpPr>
+          <p:cNvPr id="66" name="Straight Arrow Connector 65"/>
+          <p:cNvCxnSpPr>
+            <a:stCxn id="59" idx="3"/>
+            <a:endCxn id="57" idx="1"/>
+          </p:cNvCxnSpPr>
+          <p:nvPr/>
+        </p:nvCxnSpPr>
+        <p:spPr>
+          <a:xfrm>
+            <a:off x="19564350" y="21431250"/>
+            <a:ext cx="135467" cy="7620"/>
+          </a:xfrm>
+          <a:prstGeom prst="straightConnector1">
+            <a:avLst/>
+          </a:prstGeom>
+          <a:ln w="38100">
+            <a:tailEnd type="arrow"/>
+          </a:ln>
+        </p:spPr>
+        <p:style>
+          <a:lnRef idx="1">
+            <a:schemeClr val="accent1"/>
+          </a:lnRef>
+          <a:fillRef idx="0">
+            <a:schemeClr val="accent1"/>
+          </a:fillRef>
+          <a:effectRef idx="0">
+            <a:schemeClr val="accent1"/>
+          </a:effectRef>
+          <a:fontRef idx="minor">
+            <a:schemeClr val="tx1"/>
+          </a:fontRef>
+        </p:style>
+      </p:cxnSp>
+      <p:cxnSp>
+        <p:nvCxnSpPr>
+          <p:cNvPr id="67" name="Shape 66"/>
+          <p:cNvCxnSpPr>
+            <a:stCxn id="59" idx="2"/>
+            <a:endCxn id="58" idx="1"/>
+          </p:cNvCxnSpPr>
+          <p:nvPr/>
+        </p:nvCxnSpPr>
+        <p:spPr>
+          <a:xfrm rot="16200000" flipH="1">
+            <a:off x="19007243" y="21493056"/>
+            <a:ext cx="335280" cy="1049867"/>
+          </a:xfrm>
+          <a:prstGeom prst="bentConnector2">
+            <a:avLst/>
+          </a:prstGeom>
+          <a:ln w="38100">
+            <a:tailEnd type="arrow"/>
+          </a:ln>
+        </p:spPr>
+        <p:style>
+          <a:lnRef idx="1">
+            <a:schemeClr val="accent1"/>
+          </a:lnRef>
+          <a:fillRef idx="0">
+            <a:schemeClr val="accent1"/>
+          </a:fillRef>
+          <a:effectRef idx="0">
+            <a:schemeClr val="accent1"/>
+          </a:effectRef>
+          <a:fontRef idx="minor">
+            <a:schemeClr val="tx1"/>
+          </a:fontRef>
+        </p:style>
+      </p:cxnSp>
+      <p:cxnSp>
+        <p:nvCxnSpPr>
+          <p:cNvPr id="68" name="Straight Arrow Connector 67"/>
+          <p:cNvCxnSpPr/>
+          <p:nvPr/>
+        </p:nvCxnSpPr>
+        <p:spPr>
+          <a:xfrm>
+            <a:off x="21393150" y="22155150"/>
+            <a:ext cx="228600" cy="0"/>
+          </a:xfrm>
+          <a:prstGeom prst="straightConnector1">
+            <a:avLst/>
+          </a:prstGeom>
+          <a:ln w="38100">
+            <a:tailEnd type="arrow"/>
+          </a:ln>
+        </p:spPr>
+        <p:style>
+          <a:lnRef idx="1">
+            <a:schemeClr val="accent1"/>
+          </a:lnRef>
+          <a:fillRef idx="0">
+            <a:schemeClr val="accent1"/>
+          </a:fillRef>
+          <a:effectRef idx="0">
+            <a:schemeClr val="accent1"/>
+          </a:effectRef>
+          <a:fontRef idx="minor">
+            <a:schemeClr val="tx1"/>
+          </a:fontRef>
+        </p:style>
+      </p:cxnSp>
+      <p:cxnSp>
+        <p:nvCxnSpPr>
+          <p:cNvPr id="69" name="Shape 68"/>
+          <p:cNvCxnSpPr>
+            <a:stCxn id="37" idx="1"/>
+            <a:endCxn id="61" idx="0"/>
+          </p:cNvCxnSpPr>
+          <p:nvPr/>
+        </p:nvCxnSpPr>
+        <p:spPr>
+          <a:xfrm rot="10800000" flipV="1">
+            <a:off x="17024350" y="20097750"/>
+            <a:ext cx="1168400" cy="2819400"/>
+          </a:xfrm>
+          <a:prstGeom prst="bentConnector2">
+            <a:avLst/>
+          </a:prstGeom>
+          <a:ln w="38100">
+            <a:tailEnd type="arrow"/>
+          </a:ln>
+        </p:spPr>
+        <p:style>
+          <a:lnRef idx="1">
+            <a:schemeClr val="accent1"/>
+          </a:lnRef>
+          <a:fillRef idx="0">
+            <a:schemeClr val="accent1"/>
+          </a:fillRef>
+          <a:effectRef idx="0">
+            <a:schemeClr val="accent1"/>
+          </a:effectRef>
+          <a:fontRef idx="minor">
+            <a:schemeClr val="tx1"/>
+          </a:fontRef>
+        </p:style>
+      </p:cxnSp>
+      <p:sp>
+        <p:nvSpPr>
+          <p:cNvPr id="70" name="TextBox 69"/>
+          <p:cNvSpPr txBox="1"/>
+          <p:nvPr/>
+        </p:nvSpPr>
+        <p:spPr>
+          <a:xfrm>
+            <a:off x="18573750" y="20478750"/>
+            <a:ext cx="520527" cy="400110"/>
+          </a:xfrm>
+          <a:prstGeom prst="rect">
+            <a:avLst/>
+          </a:prstGeom>
+          <a:noFill/>
+          <a:ln w="38100">
+            <a:noFill/>
+          </a:ln>
+        </p:spPr>
+        <p:txBody>
+          <a:bodyPr wrap="none" rtlCol="0">
+            <a:spAutoFit/>
+          </a:bodyPr>
+          <a:lstStyle/>
+          <a:p>
+            <a:r>
+              <a:rPr lang="en-US" sz="2000" dirty="0" smtClean="0"/>
+              <a:t>Yes</a:t>
+            </a:r>
+            <a:endParaRPr lang="en-US" sz="2000" dirty="0"/>
+          </a:p>
+        </p:txBody>
+      </p:sp>
+      <p:cxnSp>
+        <p:nvCxnSpPr>
+          <p:cNvPr id="71" name="Straight Arrow Connector 70"/>
+          <p:cNvCxnSpPr>
+            <a:stCxn id="61" idx="2"/>
+            <a:endCxn id="65" idx="0"/>
+          </p:cNvCxnSpPr>
+          <p:nvPr/>
+        </p:nvCxnSpPr>
+        <p:spPr>
+          <a:xfrm>
+            <a:off x="17024350" y="23679150"/>
+            <a:ext cx="16934" cy="228600"/>
+          </a:xfrm>
+          <a:prstGeom prst="straightConnector1">
+            <a:avLst/>
+          </a:prstGeom>
+          <a:ln w="38100">
+            <a:tailEnd type="arrow"/>
+          </a:ln>
+        </p:spPr>
+        <p:style>
+          <a:lnRef idx="1">
+            <a:schemeClr val="accent1"/>
+          </a:lnRef>
+          <a:fillRef idx="0">
+            <a:schemeClr val="accent1"/>
+          </a:fillRef>
+          <a:effectRef idx="0">
+            <a:schemeClr val="accent1"/>
+          </a:effectRef>
+          <a:fontRef idx="minor">
+            <a:schemeClr val="tx1"/>
+          </a:fontRef>
+        </p:style>
+      </p:cxnSp>
+      <p:cxnSp>
+        <p:nvCxnSpPr>
+          <p:cNvPr id="72" name="Straight Arrow Connector 71"/>
+          <p:cNvCxnSpPr>
+            <a:stCxn id="65" idx="2"/>
+            <a:endCxn id="64" idx="0"/>
+          </p:cNvCxnSpPr>
+          <p:nvPr/>
+        </p:nvCxnSpPr>
+        <p:spPr>
+          <a:xfrm>
+            <a:off x="17041284" y="24578310"/>
+            <a:ext cx="8466" cy="472440"/>
+          </a:xfrm>
+          <a:prstGeom prst="straightConnector1">
+            <a:avLst/>
+          </a:prstGeom>
+          <a:ln w="38100">
+            <a:tailEnd type="arrow"/>
+          </a:ln>
+        </p:spPr>
+        <p:style>
+          <a:lnRef idx="1">
+            <a:schemeClr val="accent1"/>
+          </a:lnRef>
+          <a:fillRef idx="0">
+            <a:schemeClr val="accent1"/>
+          </a:fillRef>
+          <a:effectRef idx="0">
+            <a:schemeClr val="accent1"/>
+          </a:effectRef>
+          <a:fontRef idx="minor">
+            <a:schemeClr val="tx1"/>
+          </a:fontRef>
+        </p:style>
+      </p:cxnSp>
+      <p:cxnSp>
+        <p:nvCxnSpPr>
+          <p:cNvPr id="73" name="Shape 72"/>
+          <p:cNvCxnSpPr>
+            <a:stCxn id="64" idx="2"/>
+            <a:endCxn id="63" idx="1"/>
+          </p:cNvCxnSpPr>
+          <p:nvPr/>
+        </p:nvCxnSpPr>
+        <p:spPr>
+          <a:xfrm rot="5400000" flipH="1" flipV="1">
+            <a:off x="17704223" y="25112556"/>
+            <a:ext cx="121920" cy="1430867"/>
+          </a:xfrm>
+          <a:prstGeom prst="bentConnector4">
+            <a:avLst>
+              <a:gd name="adj1" fmla="val -187500"/>
+              <a:gd name="adj2" fmla="val 89941"/>
+            </a:avLst>
+          </a:prstGeom>
+          <a:ln w="38100">
+            <a:tailEnd type="arrow"/>
+          </a:ln>
+        </p:spPr>
+        <p:style>
+          <a:lnRef idx="1">
+            <a:schemeClr val="accent1"/>
+          </a:lnRef>
+          <a:fillRef idx="0">
+            <a:schemeClr val="accent1"/>
+          </a:fillRef>
+          <a:effectRef idx="0">
+            <a:schemeClr val="accent1"/>
+          </a:effectRef>
+          <a:fontRef idx="minor">
+            <a:schemeClr val="tx1"/>
+          </a:fontRef>
+        </p:style>
+      </p:cxnSp>
+      <p:cxnSp>
+        <p:nvCxnSpPr>
+          <p:cNvPr id="74" name="Shape 73"/>
+          <p:cNvCxnSpPr>
+            <a:stCxn id="61" idx="1"/>
+            <a:endCxn id="64" idx="0"/>
+          </p:cNvCxnSpPr>
+          <p:nvPr/>
+        </p:nvCxnSpPr>
+        <p:spPr>
+          <a:xfrm rot="10800000" flipH="1" flipV="1">
+            <a:off x="15932150" y="23298150"/>
+            <a:ext cx="1117600" cy="1752600"/>
+          </a:xfrm>
+          <a:prstGeom prst="bentConnector4">
+            <a:avLst>
+              <a:gd name="adj1" fmla="val -20455"/>
+              <a:gd name="adj2" fmla="val 82609"/>
+            </a:avLst>
+          </a:prstGeom>
+          <a:ln w="38100">
+            <a:tailEnd type="arrow"/>
+          </a:ln>
+        </p:spPr>
+        <p:style>
+          <a:lnRef idx="1">
+            <a:schemeClr val="accent1"/>
+          </a:lnRef>
+          <a:fillRef idx="0">
+            <a:schemeClr val="accent1"/>
+          </a:fillRef>
+          <a:effectRef idx="0">
+            <a:schemeClr val="accent1"/>
+          </a:effectRef>
+          <a:fontRef idx="minor">
+            <a:schemeClr val="tx1"/>
+          </a:fontRef>
+        </p:style>
+      </p:cxnSp>
+      <p:sp>
+        <p:nvSpPr>
+          <p:cNvPr id="75" name="TextBox 74"/>
+          <p:cNvSpPr txBox="1"/>
+          <p:nvPr/>
+        </p:nvSpPr>
+        <p:spPr>
+          <a:xfrm>
+            <a:off x="16986423" y="23583840"/>
+            <a:ext cx="520527" cy="400110"/>
+          </a:xfrm>
+          <a:prstGeom prst="rect">
+            <a:avLst/>
+          </a:prstGeom>
+          <a:noFill/>
+          <a:ln w="38100">
+            <a:noFill/>
+          </a:ln>
+        </p:spPr>
+        <p:txBody>
+          <a:bodyPr wrap="none" rtlCol="0">
+            <a:spAutoFit/>
+          </a:bodyPr>
+          <a:lstStyle/>
+          <a:p>
+            <a:r>
+              <a:rPr lang="en-US" sz="2000" dirty="0" smtClean="0"/>
+              <a:t>Yes</a:t>
+            </a:r>
+            <a:endParaRPr lang="en-US" sz="2000" dirty="0"/>
+          </a:p>
+        </p:txBody>
+      </p:sp>
+      <p:sp>
+        <p:nvSpPr>
+          <p:cNvPr id="76" name="TextBox 75"/>
+          <p:cNvSpPr txBox="1"/>
+          <p:nvPr/>
+        </p:nvSpPr>
+        <p:spPr>
+          <a:xfrm>
+            <a:off x="15498522" y="22974240"/>
+            <a:ext cx="484428" cy="400110"/>
+          </a:xfrm>
+          <a:prstGeom prst="rect">
+            <a:avLst/>
+          </a:prstGeom>
+          <a:noFill/>
+          <a:ln w="38100">
+            <a:noFill/>
+          </a:ln>
+        </p:spPr>
+        <p:txBody>
+          <a:bodyPr wrap="none" rtlCol="0">
+            <a:spAutoFit/>
+          </a:bodyPr>
+          <a:lstStyle/>
+          <a:p>
+            <a:r>
+              <a:rPr lang="en-US" sz="2000" dirty="0" smtClean="0"/>
+              <a:t>No</a:t>
+            </a:r>
+            <a:endParaRPr lang="en-US" sz="2000" dirty="0"/>
+          </a:p>
+        </p:txBody>
+      </p:sp>
+      <p:cxnSp>
+        <p:nvCxnSpPr>
+          <p:cNvPr id="77" name="Elbow Connector 76"/>
+          <p:cNvCxnSpPr>
+            <a:stCxn id="64" idx="3"/>
+            <a:endCxn id="62" idx="1"/>
+          </p:cNvCxnSpPr>
+          <p:nvPr/>
+        </p:nvCxnSpPr>
+        <p:spPr>
+          <a:xfrm flipV="1">
+            <a:off x="18192750" y="24928830"/>
+            <a:ext cx="287867" cy="541020"/>
+          </a:xfrm>
+          <a:prstGeom prst="bentConnector3">
+            <a:avLst>
+              <a:gd name="adj1" fmla="val 50000"/>
+            </a:avLst>
+          </a:prstGeom>
+          <a:ln w="38100">
+            <a:tailEnd type="arrow"/>
+          </a:ln>
+        </p:spPr>
+        <p:style>
+          <a:lnRef idx="1">
+            <a:schemeClr val="accent1"/>
+          </a:lnRef>
+          <a:fillRef idx="0">
+            <a:schemeClr val="accent1"/>
+          </a:fillRef>
+          <a:effectRef idx="0">
+            <a:schemeClr val="accent1"/>
+          </a:effectRef>
+          <a:fontRef idx="minor">
+            <a:schemeClr val="tx1"/>
+          </a:fontRef>
+        </p:style>
+      </p:cxnSp>
+      <p:sp>
+        <p:nvSpPr>
+          <p:cNvPr id="78" name="Rectangle 77"/>
+          <p:cNvSpPr/>
+          <p:nvPr/>
+        </p:nvSpPr>
+        <p:spPr>
+          <a:xfrm>
+            <a:off x="21223817" y="25050750"/>
+            <a:ext cx="1693333" cy="670560"/>
+          </a:xfrm>
+          <a:prstGeom prst="rect">
+            <a:avLst/>
+          </a:prstGeom>
+          <a:solidFill>
+            <a:schemeClr val="bg1"/>
+          </a:solidFill>
+          <a:ln w="38100"/>
+        </p:spPr>
+        <p:style>
+          <a:lnRef idx="2">
+            <a:schemeClr val="accent1">
+              <a:shade val="50000"/>
+            </a:schemeClr>
+          </a:lnRef>
+          <a:fillRef idx="1">
+            <a:schemeClr val="accent1"/>
+          </a:fillRef>
+          <a:effectRef idx="0">
+            <a:schemeClr val="accent1"/>
+          </a:effectRef>
+          <a:fontRef idx="minor">
+            <a:schemeClr val="lt1"/>
+          </a:fontRef>
+        </p:style>
+        <p:txBody>
+          <a:bodyPr lIns="125401" tIns="62700" rIns="125401" bIns="62700" rtlCol="0" anchor="ctr"/>
+          <a:lstStyle/>
+          <a:p>
+            <a:pPr algn="ctr"/>
+            <a:r>
+              <a:rPr lang="en-US" sz="1800" dirty="0" smtClean="0">
+                <a:solidFill>
+                  <a:schemeClr val="tx1"/>
+                </a:solidFill>
+              </a:rPr>
+              <a:t>Classify</a:t>
+            </a:r>
+            <a:endParaRPr lang="en-US" sz="1800" dirty="0">
+              <a:solidFill>
+                <a:schemeClr val="tx1"/>
+              </a:solidFill>
+            </a:endParaRPr>
+          </a:p>
+        </p:txBody>
+      </p:sp>
+      <p:cxnSp>
+        <p:nvCxnSpPr>
+          <p:cNvPr id="79" name="Elbow Connector 78"/>
+          <p:cNvCxnSpPr>
+            <a:stCxn id="62" idx="3"/>
+            <a:endCxn id="78" idx="1"/>
+          </p:cNvCxnSpPr>
+          <p:nvPr/>
+        </p:nvCxnSpPr>
+        <p:spPr>
+          <a:xfrm>
+            <a:off x="20173950" y="24928830"/>
+            <a:ext cx="1049867" cy="457200"/>
+          </a:xfrm>
+          <a:prstGeom prst="bentConnector3">
+            <a:avLst>
+              <a:gd name="adj1" fmla="val 50000"/>
+            </a:avLst>
+          </a:prstGeom>
+          <a:ln w="38100">
+            <a:tailEnd type="arrow"/>
+          </a:ln>
+        </p:spPr>
+        <p:style>
+          <a:lnRef idx="1">
+            <a:schemeClr val="accent1"/>
+          </a:lnRef>
+          <a:fillRef idx="0">
+            <a:schemeClr val="accent1"/>
+          </a:fillRef>
+          <a:effectRef idx="0">
+            <a:schemeClr val="accent1"/>
+          </a:effectRef>
+          <a:fontRef idx="minor">
+            <a:schemeClr val="tx1"/>
+          </a:fontRef>
+        </p:style>
+      </p:cxnSp>
+      <p:cxnSp>
+        <p:nvCxnSpPr>
+          <p:cNvPr id="80" name="Elbow Connector 79"/>
+          <p:cNvCxnSpPr>
+            <a:stCxn id="63" idx="3"/>
+            <a:endCxn id="78" idx="1"/>
+          </p:cNvCxnSpPr>
+          <p:nvPr/>
+        </p:nvCxnSpPr>
+        <p:spPr>
+          <a:xfrm flipV="1">
+            <a:off x="20173950" y="25386030"/>
+            <a:ext cx="1049867" cy="381000"/>
+          </a:xfrm>
+          <a:prstGeom prst="bentConnector3">
+            <a:avLst>
+              <a:gd name="adj1" fmla="val 50000"/>
+            </a:avLst>
+          </a:prstGeom>
+          <a:ln w="38100">
+            <a:tailEnd type="arrow"/>
+          </a:ln>
+        </p:spPr>
+        <p:style>
+          <a:lnRef idx="1">
+            <a:schemeClr val="accent1"/>
+          </a:lnRef>
+          <a:fillRef idx="0">
+            <a:schemeClr val="accent1"/>
+          </a:fillRef>
+          <a:effectRef idx="0">
+            <a:schemeClr val="accent1"/>
+          </a:effectRef>
+          <a:fontRef idx="minor">
+            <a:schemeClr val="tx1"/>
+          </a:fontRef>
+        </p:style>
+      </p:cxnSp>
+      <p:sp>
+        <p:nvSpPr>
+          <p:cNvPr id="81" name="Rectangle 80"/>
+          <p:cNvSpPr/>
+          <p:nvPr/>
+        </p:nvSpPr>
+        <p:spPr>
+          <a:xfrm>
+            <a:off x="21697950" y="26803350"/>
+            <a:ext cx="1066800" cy="914400"/>
+          </a:xfrm>
+          <a:prstGeom prst="rect">
+            <a:avLst/>
+          </a:prstGeom>
+          <a:solidFill>
+            <a:schemeClr val="bg1"/>
+          </a:solidFill>
+          <a:ln w="38100"/>
+        </p:spPr>
+        <p:style>
+          <a:lnRef idx="2">
+            <a:schemeClr val="accent1">
+              <a:shade val="50000"/>
+            </a:schemeClr>
+          </a:lnRef>
+          <a:fillRef idx="1">
+            <a:schemeClr val="accent1"/>
+          </a:fillRef>
+          <a:effectRef idx="0">
+            <a:schemeClr val="accent1"/>
+          </a:effectRef>
+          <a:fontRef idx="minor">
+            <a:schemeClr val="lt1"/>
+          </a:fontRef>
+        </p:style>
+        <p:txBody>
+          <a:bodyPr rtlCol="0" anchor="ctr"/>
+          <a:lstStyle/>
+          <a:p>
+            <a:pPr algn="ctr"/>
+            <a:endParaRPr lang="en-US"/>
+          </a:p>
+        </p:txBody>
+      </p:sp>
+      <p:cxnSp>
+        <p:nvCxnSpPr>
+          <p:cNvPr id="82" name="Straight Connector 81"/>
+          <p:cNvCxnSpPr>
+            <a:stCxn id="81" idx="0"/>
+            <a:endCxn id="81" idx="2"/>
+          </p:cNvCxnSpPr>
+          <p:nvPr/>
+        </p:nvCxnSpPr>
+        <p:spPr>
+          <a:xfrm>
+            <a:off x="22231350" y="26803350"/>
+            <a:ext cx="0" cy="914400"/>
+          </a:xfrm>
+          <a:prstGeom prst="line">
+            <a:avLst/>
+          </a:prstGeom>
+          <a:ln w="38100"/>
+        </p:spPr>
+        <p:style>
+          <a:lnRef idx="1">
+            <a:schemeClr val="accent1"/>
+          </a:lnRef>
+          <a:fillRef idx="0">
+            <a:schemeClr val="accent1"/>
+          </a:fillRef>
+          <a:effectRef idx="0">
+            <a:schemeClr val="accent1"/>
+          </a:effectRef>
+          <a:fontRef idx="minor">
+            <a:schemeClr val="tx1"/>
+          </a:fontRef>
+        </p:style>
+      </p:cxnSp>
+      <p:cxnSp>
+        <p:nvCxnSpPr>
+          <p:cNvPr id="83" name="Straight Connector 82"/>
+          <p:cNvCxnSpPr>
+            <a:stCxn id="81" idx="1"/>
+            <a:endCxn id="81" idx="3"/>
+          </p:cNvCxnSpPr>
+          <p:nvPr/>
+        </p:nvCxnSpPr>
+        <p:spPr>
+          <a:xfrm>
+            <a:off x="21697950" y="27260550"/>
+            <a:ext cx="1066800" cy="0"/>
+          </a:xfrm>
+          <a:prstGeom prst="line">
+            <a:avLst/>
+          </a:prstGeom>
+          <a:ln w="38100"/>
+        </p:spPr>
+        <p:style>
+          <a:lnRef idx="1">
+            <a:schemeClr val="accent1"/>
+          </a:lnRef>
+          <a:fillRef idx="0">
+            <a:schemeClr val="accent1"/>
+          </a:fillRef>
+          <a:effectRef idx="0">
+            <a:schemeClr val="accent1"/>
+          </a:effectRef>
+          <a:fontRef idx="minor">
+            <a:schemeClr val="tx1"/>
+          </a:fontRef>
+        </p:style>
+      </p:cxnSp>
+      <p:sp>
+        <p:nvSpPr>
+          <p:cNvPr id="84" name="Rectangle 83"/>
+          <p:cNvSpPr/>
+          <p:nvPr/>
+        </p:nvSpPr>
+        <p:spPr>
+          <a:xfrm>
+            <a:off x="22155150" y="27260550"/>
+            <a:ext cx="1066800" cy="914400"/>
+          </a:xfrm>
+          <a:prstGeom prst="rect">
+            <a:avLst/>
+          </a:prstGeom>
+          <a:solidFill>
+            <a:schemeClr val="bg1"/>
+          </a:solidFill>
+          <a:ln w="38100"/>
+        </p:spPr>
+        <p:style>
+          <a:lnRef idx="2">
+            <a:schemeClr val="accent1">
+              <a:shade val="50000"/>
+            </a:schemeClr>
+          </a:lnRef>
+          <a:fillRef idx="1">
+            <a:schemeClr val="accent1"/>
+          </a:fillRef>
+          <a:effectRef idx="0">
+            <a:schemeClr val="accent1"/>
+          </a:effectRef>
+          <a:fontRef idx="minor">
+            <a:schemeClr val="lt1"/>
+          </a:fontRef>
+        </p:style>
+        <p:txBody>
+          <a:bodyPr rtlCol="0" anchor="ctr"/>
+          <a:lstStyle/>
+          <a:p>
+            <a:pPr algn="ctr"/>
+            <a:endParaRPr lang="en-US"/>
+          </a:p>
+        </p:txBody>
+      </p:sp>
+      <p:cxnSp>
+        <p:nvCxnSpPr>
+          <p:cNvPr id="85" name="Straight Connector 84"/>
+          <p:cNvCxnSpPr>
+            <a:stCxn id="84" idx="0"/>
+            <a:endCxn id="84" idx="2"/>
+          </p:cNvCxnSpPr>
+          <p:nvPr/>
+        </p:nvCxnSpPr>
+        <p:spPr>
+          <a:xfrm>
+            <a:off x="22688550" y="27260550"/>
+            <a:ext cx="0" cy="914400"/>
+          </a:xfrm>
+          <a:prstGeom prst="line">
+            <a:avLst/>
+          </a:prstGeom>
+          <a:ln w="38100"/>
+        </p:spPr>
+        <p:style>
+          <a:lnRef idx="1">
+            <a:schemeClr val="accent1"/>
+          </a:lnRef>
+          <a:fillRef idx="0">
+            <a:schemeClr val="accent1"/>
+          </a:fillRef>
+          <a:effectRef idx="0">
+            <a:schemeClr val="accent1"/>
+          </a:effectRef>
+          <a:fontRef idx="minor">
+            <a:schemeClr val="tx1"/>
+          </a:fontRef>
+        </p:style>
+      </p:cxnSp>
+      <p:cxnSp>
+        <p:nvCxnSpPr>
+          <p:cNvPr id="86" name="Straight Connector 85"/>
+          <p:cNvCxnSpPr>
+            <a:stCxn id="84" idx="1"/>
+            <a:endCxn id="84" idx="3"/>
+          </p:cNvCxnSpPr>
+          <p:nvPr/>
+        </p:nvCxnSpPr>
+        <p:spPr>
+          <a:xfrm>
+            <a:off x="22155150" y="27717750"/>
+            <a:ext cx="1066800" cy="0"/>
+          </a:xfrm>
+          <a:prstGeom prst="line">
+            <a:avLst/>
+          </a:prstGeom>
+          <a:ln w="38100"/>
+        </p:spPr>
+        <p:style>
+          <a:lnRef idx="1">
+            <a:schemeClr val="accent1"/>
+          </a:lnRef>
+          <a:fillRef idx="0">
+            <a:schemeClr val="accent1"/>
+          </a:fillRef>
+          <a:effectRef idx="0">
+            <a:schemeClr val="accent1"/>
+          </a:effectRef>
+          <a:fontRef idx="minor">
+            <a:schemeClr val="tx1"/>
+          </a:fontRef>
+        </p:style>
+      </p:cxnSp>
+      <p:sp>
+        <p:nvSpPr>
+          <p:cNvPr id="87" name="Rectangle 86"/>
+          <p:cNvSpPr/>
+          <p:nvPr/>
+        </p:nvSpPr>
+        <p:spPr>
+          <a:xfrm>
+            <a:off x="22307550" y="27412950"/>
+            <a:ext cx="1066800" cy="914400"/>
+          </a:xfrm>
+          <a:prstGeom prst="rect">
+            <a:avLst/>
+          </a:prstGeom>
+          <a:solidFill>
+            <a:schemeClr val="bg1"/>
+          </a:solidFill>
+          <a:ln w="38100"/>
+        </p:spPr>
+        <p:style>
+          <a:lnRef idx="2">
+            <a:schemeClr val="accent1">
+              <a:shade val="50000"/>
+            </a:schemeClr>
+          </a:lnRef>
+          <a:fillRef idx="1">
+            <a:schemeClr val="accent1"/>
+          </a:fillRef>
+          <a:effectRef idx="0">
+            <a:schemeClr val="accent1"/>
+          </a:effectRef>
+          <a:fontRef idx="minor">
+            <a:schemeClr val="lt1"/>
+          </a:fontRef>
+        </p:style>
+        <p:txBody>
+          <a:bodyPr rtlCol="0" anchor="ctr"/>
+          <a:lstStyle/>
+          <a:p>
+            <a:pPr algn="ctr"/>
+            <a:endParaRPr lang="en-US"/>
+          </a:p>
+        </p:txBody>
+      </p:sp>
+      <p:cxnSp>
+        <p:nvCxnSpPr>
+          <p:cNvPr id="88" name="Straight Connector 87"/>
+          <p:cNvCxnSpPr>
+            <a:stCxn id="87" idx="0"/>
+            <a:endCxn id="87" idx="2"/>
+          </p:cNvCxnSpPr>
+          <p:nvPr/>
+        </p:nvCxnSpPr>
+        <p:spPr>
+          <a:xfrm>
+            <a:off x="22840950" y="27412950"/>
+            <a:ext cx="0" cy="914400"/>
+          </a:xfrm>
+          <a:prstGeom prst="line">
+            <a:avLst/>
+          </a:prstGeom>
+          <a:ln w="38100"/>
+        </p:spPr>
+        <p:style>
+          <a:lnRef idx="1">
+            <a:schemeClr val="accent1"/>
+          </a:lnRef>
+          <a:fillRef idx="0">
+            <a:schemeClr val="accent1"/>
+          </a:fillRef>
+          <a:effectRef idx="0">
+            <a:schemeClr val="accent1"/>
+          </a:effectRef>
+          <a:fontRef idx="minor">
+            <a:schemeClr val="tx1"/>
+          </a:fontRef>
+        </p:style>
+      </p:cxnSp>
+      <p:cxnSp>
+        <p:nvCxnSpPr>
+          <p:cNvPr id="89" name="Straight Connector 88"/>
+          <p:cNvCxnSpPr>
+            <a:stCxn id="87" idx="1"/>
+            <a:endCxn id="87" idx="3"/>
+          </p:cNvCxnSpPr>
+          <p:nvPr/>
+        </p:nvCxnSpPr>
+        <p:spPr>
+          <a:xfrm>
+            <a:off x="22307550" y="27870150"/>
+            <a:ext cx="1066800" cy="0"/>
+          </a:xfrm>
+          <a:prstGeom prst="line">
+            <a:avLst/>
+          </a:prstGeom>
+          <a:ln w="38100"/>
+        </p:spPr>
+        <p:style>
+          <a:lnRef idx="1">
+            <a:schemeClr val="accent1"/>
+          </a:lnRef>
+          <a:fillRef idx="0">
+            <a:schemeClr val="accent1"/>
+          </a:fillRef>
+          <a:effectRef idx="0">
+            <a:schemeClr val="accent1"/>
+          </a:effectRef>
+          <a:fontRef idx="minor">
+            <a:schemeClr val="tx1"/>
+          </a:fontRef>
+        </p:style>
+      </p:cxnSp>
+      <p:sp>
+        <p:nvSpPr>
+          <p:cNvPr id="90" name="TextBox 89"/>
+          <p:cNvSpPr txBox="1"/>
+          <p:nvPr/>
+        </p:nvSpPr>
+        <p:spPr>
+          <a:xfrm>
+            <a:off x="18573750" y="27267753"/>
+            <a:ext cx="2895600" cy="830997"/>
+          </a:xfrm>
+          <a:prstGeom prst="rect">
+            <a:avLst/>
+          </a:prstGeom>
+          <a:noFill/>
+          <a:ln w="38100">
+            <a:solidFill>
+              <a:schemeClr val="tx1"/>
+            </a:solidFill>
+          </a:ln>
+        </p:spPr>
+        <p:txBody>
+          <a:bodyPr wrap="square" rtlCol="0">
+            <a:spAutoFit/>
+          </a:bodyPr>
+          <a:lstStyle/>
+          <a:p>
+            <a:r>
+              <a:rPr lang="en-US" sz="2400" dirty="0" smtClean="0"/>
+              <a:t>Calculate Statistics on Confusion Matrices </a:t>
+            </a:r>
+            <a:endParaRPr lang="en-US" sz="2400" dirty="0"/>
+          </a:p>
+        </p:txBody>
+      </p:sp>
+      <p:cxnSp>
+        <p:nvCxnSpPr>
+          <p:cNvPr id="91" name="Straight Arrow Connector 90"/>
+          <p:cNvCxnSpPr>
+            <a:stCxn id="78" idx="2"/>
+          </p:cNvCxnSpPr>
+          <p:nvPr/>
+        </p:nvCxnSpPr>
+        <p:spPr>
+          <a:xfrm>
+            <a:off x="22070484" y="25721310"/>
+            <a:ext cx="8466" cy="929640"/>
+          </a:xfrm>
+          <a:prstGeom prst="straightConnector1">
+            <a:avLst/>
+          </a:prstGeom>
+          <a:ln w="38100">
+            <a:tailEnd type="arrow"/>
+          </a:ln>
+        </p:spPr>
+        <p:style>
+          <a:lnRef idx="1">
+            <a:schemeClr val="accent1"/>
+          </a:lnRef>
+          <a:fillRef idx="0">
+            <a:schemeClr val="accent1"/>
+          </a:fillRef>
+          <a:effectRef idx="0">
+            <a:schemeClr val="accent1"/>
+          </a:effectRef>
+          <a:fontRef idx="minor">
+            <a:schemeClr val="tx1"/>
+          </a:fontRef>
+        </p:style>
+      </p:cxnSp>
+      <p:sp>
+        <p:nvSpPr>
+          <p:cNvPr id="92" name="Oval 91"/>
+          <p:cNvSpPr/>
+          <p:nvPr/>
+        </p:nvSpPr>
+        <p:spPr>
+          <a:xfrm>
+            <a:off x="21804631" y="26955750"/>
+            <a:ext cx="45719" cy="76200"/>
+          </a:xfrm>
+          <a:prstGeom prst="ellipse">
+            <a:avLst/>
+          </a:prstGeom>
+          <a:ln w="38100"/>
+        </p:spPr>
+        <p:style>
+          <a:lnRef idx="2">
+            <a:schemeClr val="accent1">
+              <a:shade val="50000"/>
+            </a:schemeClr>
+          </a:lnRef>
+          <a:fillRef idx="1">
+            <a:schemeClr val="accent1"/>
+          </a:fillRef>
+          <a:effectRef idx="0">
+            <a:schemeClr val="accent1"/>
+          </a:effectRef>
+          <a:fontRef idx="minor">
+            <a:schemeClr val="lt1"/>
+          </a:fontRef>
+        </p:style>
+        <p:txBody>
+          <a:bodyPr rtlCol="0" anchor="ctr"/>
+          <a:lstStyle/>
+          <a:p>
+            <a:pPr algn="ctr"/>
+            <a:endParaRPr lang="en-US"/>
+          </a:p>
+        </p:txBody>
+      </p:sp>
+      <p:sp>
+        <p:nvSpPr>
+          <p:cNvPr id="93" name="Oval 92"/>
+          <p:cNvSpPr/>
+          <p:nvPr/>
+        </p:nvSpPr>
+        <p:spPr>
+          <a:xfrm>
+            <a:off x="21957031" y="27108150"/>
+            <a:ext cx="45719" cy="76200"/>
+          </a:xfrm>
+          <a:prstGeom prst="ellipse">
+            <a:avLst/>
+          </a:prstGeom>
+          <a:ln w="38100"/>
+        </p:spPr>
+        <p:style>
+          <a:lnRef idx="2">
+            <a:schemeClr val="accent1">
+              <a:shade val="50000"/>
+            </a:schemeClr>
+          </a:lnRef>
+          <a:fillRef idx="1">
+            <a:schemeClr val="accent1"/>
+          </a:fillRef>
+          <a:effectRef idx="0">
+            <a:schemeClr val="accent1"/>
+          </a:effectRef>
+          <a:fontRef idx="minor">
+            <a:schemeClr val="lt1"/>
+          </a:fontRef>
+        </p:style>
+        <p:txBody>
+          <a:bodyPr rtlCol="0" anchor="ctr"/>
+          <a:lstStyle/>
+          <a:p>
+            <a:pPr algn="ctr"/>
+            <a:endParaRPr lang="en-US"/>
+          </a:p>
+        </p:txBody>
+      </p:sp>
+      <p:sp>
+        <p:nvSpPr>
+          <p:cNvPr id="94" name="Oval 93"/>
+          <p:cNvSpPr/>
+          <p:nvPr/>
+        </p:nvSpPr>
+        <p:spPr>
+          <a:xfrm>
+            <a:off x="22109431" y="27260550"/>
+            <a:ext cx="45719" cy="76200"/>
+          </a:xfrm>
+          <a:prstGeom prst="ellipse">
+            <a:avLst/>
+          </a:prstGeom>
+          <a:ln w="38100"/>
+        </p:spPr>
+        <p:style>
+          <a:lnRef idx="2">
+            <a:schemeClr val="accent1">
+              <a:shade val="50000"/>
+            </a:schemeClr>
+          </a:lnRef>
+          <a:fillRef idx="1">
+            <a:schemeClr val="accent1"/>
+          </a:fillRef>
+          <a:effectRef idx="0">
+            <a:schemeClr val="accent1"/>
+          </a:effectRef>
+          <a:fontRef idx="minor">
+            <a:schemeClr val="lt1"/>
+          </a:fontRef>
+        </p:style>
+        <p:txBody>
+          <a:bodyPr rtlCol="0" anchor="ctr"/>
+          <a:lstStyle/>
+          <a:p>
+            <a:pPr algn="ctr"/>
+            <a:endParaRPr lang="en-US"/>
+          </a:p>
+        </p:txBody>
+      </p:sp>
+      <p:cxnSp>
+        <p:nvCxnSpPr>
+          <p:cNvPr id="95" name="Elbow Connector 94"/>
+          <p:cNvCxnSpPr>
+            <a:stCxn id="36" idx="2"/>
+            <a:endCxn id="37" idx="0"/>
+          </p:cNvCxnSpPr>
+          <p:nvPr/>
+        </p:nvCxnSpPr>
+        <p:spPr>
+          <a:xfrm rot="16200000" flipH="1">
+            <a:off x="18136447" y="18225347"/>
+            <a:ext cx="243840" cy="2586566"/>
+          </a:xfrm>
+          <a:prstGeom prst="bentConnector3">
+            <a:avLst>
+              <a:gd name="adj1" fmla="val 50000"/>
+            </a:avLst>
+          </a:prstGeom>
+          <a:ln w="38100">
+            <a:tailEnd type="arrow"/>
+          </a:ln>
+        </p:spPr>
+        <p:style>
+          <a:lnRef idx="1">
+            <a:schemeClr val="accent1"/>
+          </a:lnRef>
+          <a:fillRef idx="0">
+            <a:schemeClr val="accent1"/>
+          </a:fillRef>
+          <a:effectRef idx="0">
+            <a:schemeClr val="accent1"/>
+          </a:effectRef>
+          <a:fontRef idx="minor">
+            <a:schemeClr val="tx1"/>
+          </a:fontRef>
+        </p:style>
+      </p:cxnSp>
+      <p:cxnSp>
+        <p:nvCxnSpPr>
+          <p:cNvPr id="96" name="Elbow Connector 95"/>
+          <p:cNvCxnSpPr>
+            <a:stCxn id="34" idx="2"/>
+            <a:endCxn id="37" idx="0"/>
+          </p:cNvCxnSpPr>
+          <p:nvPr/>
+        </p:nvCxnSpPr>
+        <p:spPr>
+          <a:xfrm rot="5400000">
+            <a:off x="20005675" y="17357725"/>
+            <a:ext cx="1828800" cy="2736850"/>
+          </a:xfrm>
+          <a:prstGeom prst="bentConnector3">
+            <a:avLst>
+              <a:gd name="adj1" fmla="val 93750"/>
+            </a:avLst>
+          </a:prstGeom>
+          <a:ln w="38100">
+            <a:tailEnd type="arrow"/>
+          </a:ln>
+        </p:spPr>
+        <p:style>
+          <a:lnRef idx="1">
+            <a:schemeClr val="accent1"/>
+          </a:lnRef>
+          <a:fillRef idx="0">
+            <a:schemeClr val="accent1"/>
+          </a:fillRef>
+          <a:effectRef idx="0">
+            <a:schemeClr val="accent1"/>
+          </a:effectRef>
+          <a:fontRef idx="minor">
+            <a:schemeClr val="tx1"/>
+          </a:fontRef>
+        </p:style>
+      </p:cxnSp>
+      <p:cxnSp>
+        <p:nvCxnSpPr>
+          <p:cNvPr id="97" name="Shape 96"/>
+          <p:cNvCxnSpPr>
+            <a:stCxn id="37" idx="3"/>
+            <a:endCxn id="78" idx="0"/>
+          </p:cNvCxnSpPr>
+          <p:nvPr/>
+        </p:nvCxnSpPr>
+        <p:spPr>
+          <a:xfrm>
+            <a:off x="20910550" y="20097750"/>
+            <a:ext cx="1159934" cy="4953000"/>
+          </a:xfrm>
+          <a:prstGeom prst="bentConnector2">
+            <a:avLst/>
+          </a:prstGeom>
+          <a:ln w="38100">
+            <a:tailEnd type="arrow"/>
+          </a:ln>
+        </p:spPr>
+        <p:style>
+          <a:lnRef idx="1">
+            <a:schemeClr val="accent1"/>
+          </a:lnRef>
+          <a:fillRef idx="0">
+            <a:schemeClr val="accent1"/>
+          </a:fillRef>
+          <a:effectRef idx="0">
+            <a:schemeClr val="accent1"/>
+          </a:effectRef>
+          <a:fontRef idx="minor">
+            <a:schemeClr val="tx1"/>
+          </a:fontRef>
+        </p:style>
+      </p:cxnSp>
+      <p:sp>
+        <p:nvSpPr>
+          <p:cNvPr id="98" name="TextBox 97"/>
+          <p:cNvSpPr txBox="1"/>
+          <p:nvPr/>
+        </p:nvSpPr>
+        <p:spPr>
+          <a:xfrm>
+            <a:off x="20783550" y="19770864"/>
+            <a:ext cx="1284454" cy="707886"/>
+          </a:xfrm>
+          <a:prstGeom prst="rect">
+            <a:avLst/>
+          </a:prstGeom>
+          <a:noFill/>
+          <a:ln w="38100">
+            <a:noFill/>
+          </a:ln>
+        </p:spPr>
+        <p:txBody>
+          <a:bodyPr wrap="none" rtlCol="0">
+            <a:spAutoFit/>
+          </a:bodyPr>
+          <a:lstStyle/>
+          <a:p>
+            <a:r>
+              <a:rPr lang="en-US" sz="2000" dirty="0" smtClean="0"/>
+              <a:t>No</a:t>
+            </a:r>
+          </a:p>
+          <a:p>
+            <a:r>
+              <a:rPr lang="en-US" sz="2000" dirty="0" smtClean="0"/>
+              <a:t>(Test Path)</a:t>
+            </a:r>
+            <a:endParaRPr lang="en-US" sz="2000" dirty="0"/>
+          </a:p>
+        </p:txBody>
+      </p:sp>
+      <p:cxnSp>
+        <p:nvCxnSpPr>
+          <p:cNvPr id="99" name="Elbow Connector 98"/>
+          <p:cNvCxnSpPr/>
+          <p:nvPr/>
+        </p:nvCxnSpPr>
+        <p:spPr>
+          <a:xfrm rot="10800000" flipV="1">
+            <a:off x="17049752" y="21469350"/>
+            <a:ext cx="4571999" cy="1295400"/>
+          </a:xfrm>
+          <a:prstGeom prst="bentConnector3">
+            <a:avLst>
+              <a:gd name="adj1" fmla="val -667"/>
+            </a:avLst>
+          </a:prstGeom>
+          <a:ln w="38100">
+            <a:tailEnd type="arrow"/>
+          </a:ln>
+        </p:spPr>
+        <p:style>
+          <a:lnRef idx="1">
+            <a:schemeClr val="accent1"/>
+          </a:lnRef>
+          <a:fillRef idx="0">
+            <a:schemeClr val="accent1"/>
+          </a:fillRef>
+          <a:effectRef idx="0">
+            <a:schemeClr val="accent1"/>
+          </a:effectRef>
+          <a:fontRef idx="minor">
+            <a:schemeClr val="tx1"/>
+          </a:fontRef>
+        </p:style>
+      </p:cxnSp>
+      <p:cxnSp>
+        <p:nvCxnSpPr>
+          <p:cNvPr id="100" name="Straight Arrow Connector 99"/>
+          <p:cNvCxnSpPr/>
+          <p:nvPr/>
+        </p:nvCxnSpPr>
+        <p:spPr>
+          <a:xfrm>
+            <a:off x="21393150" y="21469350"/>
+            <a:ext cx="228600" cy="0"/>
+          </a:xfrm>
+          <a:prstGeom prst="straightConnector1">
+            <a:avLst/>
+          </a:prstGeom>
+          <a:ln w="38100">
+            <a:tailEnd type="arrow"/>
+          </a:ln>
+        </p:spPr>
+        <p:style>
+          <a:lnRef idx="1">
+            <a:schemeClr val="accent1"/>
+          </a:lnRef>
+          <a:fillRef idx="0">
+            <a:schemeClr val="accent1"/>
+          </a:fillRef>
+          <a:effectRef idx="0">
+            <a:schemeClr val="accent1"/>
+          </a:effectRef>
+          <a:fontRef idx="minor">
+            <a:schemeClr val="tx1"/>
+          </a:fontRef>
+        </p:style>
+      </p:cxnSp>
+      <p:cxnSp>
+        <p:nvCxnSpPr>
+          <p:cNvPr id="101" name="Straight Arrow Connector 100"/>
+          <p:cNvCxnSpPr/>
+          <p:nvPr/>
+        </p:nvCxnSpPr>
+        <p:spPr>
+          <a:xfrm>
+            <a:off x="21545550" y="22764750"/>
+            <a:ext cx="533400" cy="0"/>
+          </a:xfrm>
+          <a:prstGeom prst="straightConnector1">
+            <a:avLst/>
+          </a:prstGeom>
+          <a:ln w="38100">
+            <a:tailEnd type="arrow"/>
+          </a:ln>
+        </p:spPr>
+        <p:style>
+          <a:lnRef idx="1">
+            <a:schemeClr val="accent1"/>
+          </a:lnRef>
+          <a:fillRef idx="0">
+            <a:schemeClr val="accent1"/>
+          </a:fillRef>
+          <a:effectRef idx="0">
+            <a:schemeClr val="accent1"/>
+          </a:effectRef>
+          <a:fontRef idx="minor">
+            <a:schemeClr val="tx1"/>
+          </a:fontRef>
+        </p:style>
+      </p:cxnSp>
+      <p:cxnSp>
+        <p:nvCxnSpPr>
+          <p:cNvPr id="102" name="Elbow Connector 101"/>
+          <p:cNvCxnSpPr>
+            <a:stCxn id="37" idx="2"/>
+            <a:endCxn id="59" idx="0"/>
+          </p:cNvCxnSpPr>
+          <p:nvPr/>
+        </p:nvCxnSpPr>
+        <p:spPr>
+          <a:xfrm rot="5400000">
+            <a:off x="18872200" y="20332700"/>
+            <a:ext cx="457200" cy="901700"/>
+          </a:xfrm>
+          <a:prstGeom prst="bentConnector3">
+            <a:avLst>
+              <a:gd name="adj1" fmla="val 50000"/>
+            </a:avLst>
+          </a:prstGeom>
+          <a:ln w="38100">
+            <a:tailEnd type="arrow"/>
+          </a:ln>
+        </p:spPr>
+        <p:style>
+          <a:lnRef idx="1">
+            <a:schemeClr val="accent1"/>
+          </a:lnRef>
+          <a:fillRef idx="0">
+            <a:schemeClr val="accent1"/>
+          </a:fillRef>
+          <a:effectRef idx="0">
+            <a:schemeClr val="accent1"/>
+          </a:effectRef>
+          <a:fontRef idx="minor">
+            <a:schemeClr val="tx1"/>
+          </a:fontRef>
+        </p:style>
+      </p:cxnSp>
+      <p:sp>
+        <p:nvSpPr>
+          <p:cNvPr id="103" name="TextBox 102"/>
+          <p:cNvSpPr txBox="1"/>
+          <p:nvPr/>
+        </p:nvSpPr>
+        <p:spPr>
+          <a:xfrm>
+            <a:off x="20250150" y="22745640"/>
+            <a:ext cx="2988062" cy="400110"/>
+          </a:xfrm>
+          <a:prstGeom prst="rect">
+            <a:avLst/>
+          </a:prstGeom>
+          <a:noFill/>
+          <a:ln w="38100">
+            <a:noFill/>
+          </a:ln>
+        </p:spPr>
+        <p:txBody>
+          <a:bodyPr wrap="none" rtlCol="0">
+            <a:spAutoFit/>
+          </a:bodyPr>
+          <a:lstStyle/>
+          <a:p>
+            <a:r>
+              <a:rPr lang="en-US" sz="2000" dirty="0" smtClean="0"/>
+              <a:t>Train path             Test path</a:t>
+            </a:r>
+            <a:endParaRPr lang="en-US" sz="2000" dirty="0"/>
+          </a:p>
+        </p:txBody>
+      </p:sp>
+      <p:sp>
+        <p:nvSpPr>
+          <p:cNvPr id="104" name="Right Arrow 103"/>
+          <p:cNvSpPr/>
+          <p:nvPr/>
+        </p:nvSpPr>
+        <p:spPr>
+          <a:xfrm>
+            <a:off x="21774150" y="22840950"/>
+            <a:ext cx="152400" cy="152400"/>
+          </a:xfrm>
+          <a:prstGeom prst="rightArrow">
+            <a:avLst/>
+          </a:prstGeom>
+          <a:noFill/>
+          <a:ln w="38100"/>
+        </p:spPr>
+        <p:style>
+          <a:lnRef idx="2">
+            <a:schemeClr val="accent1">
+              <a:shade val="50000"/>
+            </a:schemeClr>
+          </a:lnRef>
+          <a:fillRef idx="1">
+            <a:schemeClr val="accent1"/>
+          </a:fillRef>
+          <a:effectRef idx="0">
+            <a:schemeClr val="accent1"/>
+          </a:effectRef>
+          <a:fontRef idx="minor">
+            <a:schemeClr val="lt1"/>
+          </a:fontRef>
+        </p:style>
+        <p:txBody>
+          <a:bodyPr rtlCol="0" anchor="ctr"/>
+          <a:lstStyle/>
+          <a:p>
+            <a:pPr algn="ctr"/>
+            <a:endParaRPr lang="en-US"/>
+          </a:p>
+        </p:txBody>
+      </p:sp>
+      <p:sp>
+        <p:nvSpPr>
+          <p:cNvPr id="105" name="Right Arrow 104"/>
+          <p:cNvSpPr/>
+          <p:nvPr/>
+        </p:nvSpPr>
+        <p:spPr>
+          <a:xfrm rot="10800000">
+            <a:off x="21393151" y="22840950"/>
+            <a:ext cx="152400" cy="152400"/>
+          </a:xfrm>
+          <a:prstGeom prst="rightArrow">
+            <a:avLst/>
+          </a:prstGeom>
+          <a:noFill/>
+          <a:ln w="38100"/>
+        </p:spPr>
+        <p:style>
+          <a:lnRef idx="2">
+            <a:schemeClr val="accent1">
+              <a:shade val="50000"/>
+            </a:schemeClr>
+          </a:lnRef>
+          <a:fillRef idx="1">
+            <a:schemeClr val="accent1"/>
+          </a:fillRef>
+          <a:effectRef idx="0">
+            <a:schemeClr val="accent1"/>
+          </a:effectRef>
+          <a:fontRef idx="minor">
+            <a:schemeClr val="lt1"/>
+          </a:fontRef>
+        </p:style>
+        <p:txBody>
+          <a:bodyPr rtlCol="0" anchor="ctr"/>
+          <a:lstStyle/>
+          <a:p>
+            <a:pPr algn="ctr"/>
+            <a:endParaRPr lang="en-US"/>
+          </a:p>
+        </p:txBody>
+      </p:sp>
+      <p:sp>
+        <p:nvSpPr>
+          <p:cNvPr id="106" name="TextBox 105"/>
+          <p:cNvSpPr txBox="1"/>
+          <p:nvPr/>
+        </p:nvSpPr>
+        <p:spPr>
+          <a:xfrm>
+            <a:off x="17291049" y="15957262"/>
+            <a:ext cx="3932767" cy="646331"/>
+          </a:xfrm>
+          <a:prstGeom prst="rect">
+            <a:avLst/>
+          </a:prstGeom>
+          <a:noFill/>
+        </p:spPr>
+        <p:txBody>
+          <a:bodyPr wrap="square" rtlCol="0">
+            <a:spAutoFit/>
+          </a:bodyPr>
+          <a:lstStyle/>
+          <a:p>
+            <a:r>
+              <a:rPr lang="en-US" sz="3600" u="sng" dirty="0" smtClean="0"/>
+              <a:t>Experiment Process</a:t>
+            </a:r>
+            <a:endParaRPr lang="en-US" sz="3600" u="sng" dirty="0"/>
+          </a:p>
+        </p:txBody>
+      </p:sp>
+      <p:sp>
+        <p:nvSpPr>
+          <p:cNvPr id="120" name="TextBox 119"/>
+          <p:cNvSpPr txBox="1"/>
+          <p:nvPr/>
+        </p:nvSpPr>
+        <p:spPr>
+          <a:xfrm>
+            <a:off x="24907596" y="19361150"/>
+            <a:ext cx="10849254" cy="3416320"/>
+          </a:xfrm>
+          <a:prstGeom prst="rect">
+            <a:avLst/>
+          </a:prstGeom>
+          <a:noFill/>
+        </p:spPr>
+        <p:txBody>
+          <a:bodyPr wrap="square" rtlCol="0">
+            <a:spAutoFit/>
+          </a:bodyPr>
+          <a:lstStyle/>
+          <a:p>
+            <a:r>
+              <a:rPr lang="en-US" sz="3600" dirty="0" smtClean="0"/>
+              <a:t>We would like to include model techniques that focus on model simplifications to reduce </a:t>
+            </a:r>
+            <a:r>
+              <a:rPr lang="en-US" sz="3600" dirty="0" err="1" smtClean="0"/>
+              <a:t>overfitting</a:t>
+            </a:r>
+            <a:r>
+              <a:rPr lang="en-US" sz="3600" dirty="0" smtClean="0"/>
+              <a:t>. However, these were not completed by the presentation date. </a:t>
+            </a:r>
+          </a:p>
+          <a:p>
+            <a:endParaRPr lang="en-US" sz="3600" dirty="0" smtClean="0"/>
+          </a:p>
+          <a:p>
+            <a:r>
+              <a:rPr lang="en-US" sz="3600" dirty="0" smtClean="0"/>
+              <a:t>Additionally, we would like to consider if boosting an be used in small data sets with any success. </a:t>
+            </a:r>
+            <a:endParaRPr lang="en-US" sz="3600" dirty="0"/>
           </a:p>
         </p:txBody>
       </p:sp>
@@ -5543,7 +8778,7 @@
   <p:timing>
     <p:tnLst>
       <p:par>
-        <p:cTn xmlns:p14="http://schemas.microsoft.com/office/powerpoint/2010/main" id="1" dur="indefinite" restart="never" nodeType="tmRoot"/>
+        <p:cTn id="1" dur="indefinite" restart="never" nodeType="tmRoot"/>
       </p:par>
     </p:tnLst>
   </p:timing>

</xml_diff>